<commit_message>
Made the music loop.
</commit_message>
<xml_diff>
--- a/CE301 Open Day Poster.pptx
+++ b/CE301 Open Day Poster.pptx
@@ -4115,7 +4115,7 @@
         <p:spPr bwMode="auto">
           <a:xfrm>
             <a:off x="216535" y="2301875"/>
-            <a:ext cx="7219315" cy="4243705"/>
+            <a:ext cx="7322820" cy="1823720"/>
           </a:xfrm>
           <a:prstGeom prst="rect">
             <a:avLst/>
@@ -4233,34 +4233,46 @@
           <a:p>
             <a:pPr algn="ctr" eaLnBrk="1" hangingPunct="1"/>
             <a:r>
-              <a:rPr lang="en-GB" altLang="en-US" sz="2000"/>
+              <a:rPr lang="en-GB" altLang="en-US" sz="1800"/>
               <a:t>What?</a:t>
             </a:r>
-            <a:endParaRPr lang="en-US" altLang="x-none" sz="2000"/>
+            <a:endParaRPr lang="en-US" altLang="x-none" sz="1800"/>
           </a:p>
           <a:p>
             <a:pPr algn="just" eaLnBrk="1" hangingPunct="1"/>
-            <a:endParaRPr lang="en-US" altLang="x-none" sz="1400"/>
-          </a:p>
-          <a:p>
-            <a:pPr algn="l" eaLnBrk="1" hangingPunct="1"/>
-            <a:r>
-              <a:rPr lang="en-US" altLang="x-none" sz="1800"/>
+            <a:r>
+              <a:rPr lang="en-US" altLang="x-none" sz="1600"/>
               <a:t>My project goals have been to create a </a:t>
             </a:r>
             <a:r>
-              <a:rPr lang="en-GB" altLang="en-US" sz="1800"/>
+              <a:rPr lang="en-GB" altLang="en-US" sz="1600"/>
               <a:t>side-scrolling 2D </a:t>
             </a:r>
             <a:r>
-              <a:rPr lang="en-US" altLang="x-none" sz="1800"/>
-              <a:t>Mario game with lite RPG-elements such as friendly NPCs, a text based story narrative and a basic inventory system. My focus has been on having a working game with collisions, enemy AI agents and other dynamic world features such as unlockable doors. I aim to have it be playable on Windows and Android platforms. For Android I aim to have the game published on the Android Google app store in the future. To create this game I had utilised mainly the LibGDX Java game development framework based  on OpenGL using the Android Studio IDE. I had uset TMX tiled-maps for the creation of my game levels. Furthermore I intend to add an online SQL based high-score system for the game to allow the players to compare their score to others.  Additionally I had added a wide range of animations and SFX into the game to give the game a more professional feel to it.</a:t>
-            </a:r>
-            <a:endParaRPr lang="en-US" altLang="x-none" sz="1800"/>
+              <a:rPr lang="en-US" altLang="x-none" sz="1600"/>
+              <a:t>Mario game with lite RPG-elements such as friendly NPCs, a text based story narrative and a basic inventory system. My focus has been on having a working game with collisions, enemy AI agents and other dynamic world features such as unlockable doors</a:t>
+            </a:r>
+            <a:r>
+              <a:rPr lang="en-GB" altLang="en-US" sz="1600"/>
+              <a:t>. </a:t>
+            </a:r>
+            <a:r>
+              <a:rPr lang="en-US" altLang="x-none" sz="1600"/>
+              <a:t>For Android I aim to have the game published on the Android Google app store in the future</a:t>
+            </a:r>
+            <a:r>
+              <a:rPr lang="en-GB" altLang="en-US" sz="1600"/>
+              <a:t>.</a:t>
+            </a:r>
+            <a:r>
+              <a:rPr lang="en-US" altLang="x-none" sz="1600"/>
+              <a:t> </a:t>
+            </a:r>
+            <a:endParaRPr lang="en-US" altLang="x-none" sz="1600"/>
           </a:p>
           <a:p>
             <a:pPr algn="just" eaLnBrk="1" hangingPunct="1"/>
-            <a:endParaRPr lang="en-US" altLang="x-none" sz="1800"/>
+            <a:endParaRPr lang="en-US" altLang="x-none" sz="1600"/>
           </a:p>
         </p:txBody>
       </p:sp>
@@ -4275,7 +4287,7 @@
         <p:spPr bwMode="auto">
           <a:xfrm>
             <a:off x="7672705" y="2301240"/>
-            <a:ext cx="7221220" cy="8035290"/>
+            <a:ext cx="7221220" cy="6457950"/>
           </a:xfrm>
           <a:prstGeom prst="rect">
             <a:avLst/>
@@ -4405,18 +4417,18 @@
           <a:p>
             <a:pPr algn="ctr" eaLnBrk="1" hangingPunct="1"/>
             <a:r>
-              <a:rPr lang="en-GB" altLang="x-none" sz="2000"/>
+              <a:rPr lang="en-GB" altLang="x-none" sz="1800"/>
               <a:t>Technical Achievements</a:t>
             </a:r>
-            <a:endParaRPr lang="en-GB" altLang="x-none" sz="2000"/>
+            <a:endParaRPr lang="en-GB" altLang="x-none" sz="1800"/>
           </a:p>
           <a:p>
             <a:pPr algn="l" eaLnBrk="1" hangingPunct="1"/>
             <a:r>
-              <a:rPr lang="en-GB" altLang="x-none" sz="1800"/>
+              <a:rPr lang="en-GB" altLang="x-none" sz="1600"/>
               <a:t>I had created the game using a game development framework for Java based on OpenGL called libGDX which allowed me to create the game loop and world and have it work on Android and Windows with minimal platform-specific code. </a:t>
             </a:r>
-            <a:endParaRPr lang="en-GB" altLang="x-none" sz="1800"/>
+            <a:endParaRPr lang="en-GB" altLang="x-none" sz="1600"/>
           </a:p>
           <a:p>
             <a:pPr marL="342900" indent="-342900" algn="l" eaLnBrk="1" hangingPunct="1">
@@ -4424,10 +4436,10 @@
               <a:buChar char="•"/>
             </a:pPr>
             <a:r>
-              <a:rPr lang="en-GB" altLang="x-none" sz="1600"/>
+              <a:rPr lang="en-GB" altLang="x-none" sz="1400"/>
               <a:t>2 Game modes</a:t>
             </a:r>
-            <a:endParaRPr lang="en-GB" altLang="x-none" sz="1600"/>
+            <a:endParaRPr lang="en-GB" altLang="x-none" sz="1400"/>
           </a:p>
           <a:p>
             <a:pPr marL="800100" lvl="1" indent="-342900" algn="l" eaLnBrk="1" hangingPunct="1">
@@ -4435,10 +4447,10 @@
               <a:buChar char="•"/>
             </a:pPr>
             <a:r>
-              <a:rPr lang="en-GB" altLang="x-none" sz="1600"/>
+              <a:rPr lang="en-GB" altLang="x-none" sz="1400"/>
               <a:t>Procedurally generated endless survival</a:t>
             </a:r>
-            <a:endParaRPr lang="en-GB" altLang="x-none" sz="1600"/>
+            <a:endParaRPr lang="en-GB" altLang="x-none" sz="1400"/>
           </a:p>
           <a:p>
             <a:pPr marL="800100" lvl="1" indent="-342900" algn="l" eaLnBrk="1" hangingPunct="1">
@@ -4446,10 +4458,10 @@
               <a:buChar char="•"/>
             </a:pPr>
             <a:r>
-              <a:rPr lang="en-GB" altLang="x-none" sz="1600"/>
+              <a:rPr lang="en-GB" altLang="x-none" sz="1400"/>
               <a:t>Campaign mode, currently 1 level but intending to have 3 by release.</a:t>
             </a:r>
-            <a:endParaRPr lang="en-GB" altLang="x-none" sz="1600"/>
+            <a:endParaRPr lang="en-GB" altLang="x-none" sz="1400"/>
           </a:p>
           <a:p>
             <a:pPr marL="342900" lvl="0" indent="-342900" algn="l" eaLnBrk="1" hangingPunct="1">
@@ -4457,10 +4469,10 @@
               <a:buChar char="•"/>
             </a:pPr>
             <a:r>
-              <a:rPr lang="en-GB" altLang="x-none" sz="1600"/>
+              <a:rPr lang="en-GB" altLang="x-none" sz="1400"/>
               <a:t>Dynamic objects</a:t>
             </a:r>
-            <a:endParaRPr lang="en-GB" altLang="x-none" sz="1600"/>
+            <a:endParaRPr lang="en-GB" altLang="x-none" sz="1400"/>
           </a:p>
           <a:p>
             <a:pPr marL="800100" lvl="1" indent="-342900" algn="l" eaLnBrk="1" hangingPunct="1">
@@ -4468,10 +4480,10 @@
               <a:buChar char="•"/>
             </a:pPr>
             <a:r>
-              <a:rPr lang="en-GB" altLang="x-none" sz="1600"/>
+              <a:rPr lang="en-GB" altLang="x-none" sz="1400"/>
               <a:t>Collisions</a:t>
             </a:r>
-            <a:endParaRPr lang="en-GB" altLang="x-none" sz="1600"/>
+            <a:endParaRPr lang="en-GB" altLang="x-none" sz="1400"/>
           </a:p>
           <a:p>
             <a:pPr marL="800100" lvl="1" indent="-342900" algn="l" eaLnBrk="1" hangingPunct="1">
@@ -4479,10 +4491,10 @@
               <a:buChar char="•"/>
             </a:pPr>
             <a:r>
-              <a:rPr lang="en-GB" altLang="x-none" sz="1600"/>
+              <a:rPr lang="en-GB" altLang="x-none" sz="1400"/>
               <a:t>Everything that moves is animated.</a:t>
             </a:r>
-            <a:endParaRPr lang="en-GB" altLang="x-none" sz="1600"/>
+            <a:endParaRPr lang="en-GB" altLang="x-none" sz="1400"/>
           </a:p>
           <a:p>
             <a:pPr marL="800100" lvl="1" indent="-342900" algn="l" eaLnBrk="1" hangingPunct="1">
@@ -4490,10 +4502,10 @@
               <a:buChar char="•"/>
             </a:pPr>
             <a:r>
-              <a:rPr lang="en-GB" altLang="x-none" sz="1600"/>
+              <a:rPr lang="en-GB" altLang="x-none" sz="1400"/>
               <a:t>Friendly NPCs with interactions such as dialogue and the purchasing of power-ups using coins.</a:t>
             </a:r>
-            <a:endParaRPr lang="en-GB" altLang="x-none" sz="1600"/>
+            <a:endParaRPr lang="en-GB" altLang="x-none" sz="1400"/>
           </a:p>
           <a:p>
             <a:pPr marL="800100" lvl="1" indent="-342900" algn="l" eaLnBrk="1" hangingPunct="1">
@@ -4501,10 +4513,10 @@
               <a:buChar char="•"/>
             </a:pPr>
             <a:r>
-              <a:rPr lang="en-GB" altLang="x-none" sz="1600"/>
+              <a:rPr lang="en-GB" altLang="x-none" sz="1400"/>
               <a:t>Collectibles</a:t>
             </a:r>
-            <a:endParaRPr lang="en-GB" altLang="x-none" sz="1600"/>
+            <a:endParaRPr lang="en-GB" altLang="x-none" sz="1400"/>
           </a:p>
           <a:p>
             <a:pPr marL="1257300" lvl="2" indent="-342900" algn="l" eaLnBrk="1" hangingPunct="1">
@@ -4512,10 +4524,10 @@
               <a:buChar char="•"/>
             </a:pPr>
             <a:r>
-              <a:rPr lang="en-GB" altLang="x-none" sz="1600"/>
+              <a:rPr lang="en-GB" altLang="x-none" sz="1400"/>
               <a:t>Power-ups</a:t>
             </a:r>
-            <a:endParaRPr lang="en-GB" altLang="x-none" sz="1600"/>
+            <a:endParaRPr lang="en-GB" altLang="x-none" sz="1400"/>
           </a:p>
           <a:p>
             <a:pPr marL="1257300" lvl="2" indent="-342900" algn="l" eaLnBrk="1" hangingPunct="1">
@@ -4523,10 +4535,10 @@
               <a:buChar char="•"/>
             </a:pPr>
             <a:r>
-              <a:rPr lang="en-GB" altLang="x-none" sz="1600"/>
+              <a:rPr lang="en-GB" altLang="x-none" sz="1400"/>
               <a:t>Coins</a:t>
             </a:r>
-            <a:endParaRPr lang="en-GB" altLang="x-none" sz="1600"/>
+            <a:endParaRPr lang="en-GB" altLang="x-none" sz="1400"/>
           </a:p>
           <a:p>
             <a:pPr marL="1257300" lvl="2" indent="-342900" algn="l" eaLnBrk="1" hangingPunct="1">
@@ -4534,10 +4546,10 @@
               <a:buChar char="•"/>
             </a:pPr>
             <a:r>
-              <a:rPr lang="en-GB" altLang="x-none" sz="1600"/>
+              <a:rPr lang="en-GB" altLang="x-none" sz="1400"/>
               <a:t>Keys (for unlocking doors)</a:t>
             </a:r>
-            <a:endParaRPr lang="en-GB" altLang="x-none" sz="1600"/>
+            <a:endParaRPr lang="en-GB" altLang="x-none" sz="1400"/>
           </a:p>
           <a:p>
             <a:pPr marL="800100" lvl="1" indent="-342900" algn="l" eaLnBrk="1" hangingPunct="1">
@@ -4545,10 +4557,10 @@
               <a:buChar char="•"/>
             </a:pPr>
             <a:r>
-              <a:rPr lang="en-GB" altLang="x-none" sz="1600"/>
+              <a:rPr lang="en-GB" altLang="x-none" sz="1400"/>
               <a:t>Different types of Enemy AI agents</a:t>
             </a:r>
-            <a:endParaRPr lang="en-GB" altLang="x-none" sz="1600"/>
+            <a:endParaRPr lang="en-GB" altLang="x-none" sz="1400"/>
           </a:p>
           <a:p>
             <a:pPr marL="342900" lvl="0" indent="-342900" algn="l" eaLnBrk="1" hangingPunct="1">
@@ -4556,10 +4568,10 @@
               <a:buChar char="•"/>
             </a:pPr>
             <a:r>
-              <a:rPr lang="en-GB" altLang="x-none" sz="1600"/>
+              <a:rPr lang="en-GB" altLang="x-none" sz="1400"/>
               <a:t>Basic inventory system</a:t>
             </a:r>
-            <a:endParaRPr lang="en-GB" altLang="x-none" sz="1600"/>
+            <a:endParaRPr lang="en-GB" altLang="x-none" sz="1400"/>
           </a:p>
           <a:p>
             <a:pPr marL="342900" lvl="0" indent="-342900" algn="l" eaLnBrk="1" hangingPunct="1">
@@ -4567,10 +4579,10 @@
               <a:buChar char="•"/>
             </a:pPr>
             <a:r>
-              <a:rPr lang="en-GB" altLang="x-none" sz="1600"/>
+              <a:rPr lang="en-GB" altLang="x-none" sz="1400"/>
               <a:t>Works on Windows and Android</a:t>
             </a:r>
-            <a:endParaRPr lang="en-GB" altLang="x-none" sz="1600"/>
+            <a:endParaRPr lang="en-GB" altLang="x-none" sz="1400"/>
           </a:p>
           <a:p>
             <a:pPr marL="342900" lvl="0" indent="-342900" algn="l" eaLnBrk="1" hangingPunct="1">
@@ -4578,21 +4590,32 @@
               <a:buChar char="•"/>
             </a:pPr>
             <a:r>
+              <a:rPr lang="en-GB" altLang="x-none" sz="1400"/>
+              <a:t>Wide range of texture assets, sprites, SFX employed.</a:t>
+            </a:r>
+            <a:endParaRPr lang="en-GB" altLang="x-none" sz="1400"/>
+          </a:p>
+          <a:p>
+            <a:pPr marL="342900" lvl="0" indent="-342900" algn="l" eaLnBrk="1" hangingPunct="1">
+              <a:buFont typeface="Arial" panose="020B0604020202020204" pitchFamily="34" charset="0"/>
+              <a:buChar char="•"/>
+            </a:pPr>
+            <a:r>
+              <a:rPr lang="en-GB" altLang="x-none" sz="1400"/>
+              <a:t>Online Highscores system using an SQL database (WIP)</a:t>
+            </a:r>
+            <a:endParaRPr lang="en-GB" altLang="x-none" sz="1400"/>
+          </a:p>
+          <a:p>
+            <a:pPr marL="0" lvl="0" indent="0" algn="l" eaLnBrk="1" hangingPunct="1">
+              <a:buFont typeface="Arial" panose="020B0604020202020204" pitchFamily="34" charset="0"/>
+              <a:buNone/>
+            </a:pPr>
+            <a:r>
               <a:rPr lang="en-GB" altLang="x-none" sz="1600"/>
-              <a:t>Online Highscores system using an SQL database (WIP)</a:t>
+              <a:t>Lastly I had built the game in a scalable way as to make adding additional content and game mechanics easy. For example to create a new Enemy type you simply extend Enemy abstract class, overriding its methods, then you place the new enemy on the TMX map of a level using a TMX file editor then you edit placeObjects() method in the GameScreen class so the new TMX map object is parsed and placed correctly using your new Java enemy class. </a:t>
             </a:r>
             <a:endParaRPr lang="en-GB" altLang="x-none" sz="1600"/>
-          </a:p>
-          <a:p>
-            <a:pPr marL="0" lvl="0" indent="0" algn="just" eaLnBrk="1" hangingPunct="1">
-              <a:buFont typeface="Arial" panose="020B0604020202020204" pitchFamily="34" charset="0"/>
-              <a:buNone/>
-            </a:pPr>
-            <a:r>
-              <a:rPr lang="en-GB" altLang="x-none" sz="1800"/>
-              <a:t>Lastly I had built the game in a scalable way as to make adding additional content and game mechanics easy. For example to create a new Enemy type you simply extend Enemy abstract class, overriding its methods, then you place the new enemy on the TMX map of a level using a TMX file editor then you edit placeDynamicObjects() method in the GameScreen class so the new TMX map object is parsed and placed correctly using your new Java enemy class. </a:t>
-            </a:r>
-            <a:endParaRPr lang="en-GB" altLang="x-none" sz="1800"/>
           </a:p>
           <a:p>
             <a:pPr marL="342900" lvl="0" indent="-342900" algn="l" eaLnBrk="1" hangingPunct="1">
@@ -4793,8 +4816,8 @@
         </p:nvSpPr>
         <p:spPr bwMode="auto">
           <a:xfrm>
-            <a:off x="216535" y="6922770"/>
-            <a:ext cx="7292975" cy="3413760"/>
+            <a:off x="189230" y="4266565"/>
+            <a:ext cx="7376795" cy="2341880"/>
           </a:xfrm>
           <a:prstGeom prst="rect">
             <a:avLst/>
@@ -4912,60 +4935,60 @@
           <a:p>
             <a:pPr algn="ctr" eaLnBrk="1" hangingPunct="1"/>
             <a:r>
-              <a:rPr lang="en-GB" altLang="en-US" sz="2000"/>
+              <a:rPr lang="en-GB" altLang="en-US" sz="1800"/>
               <a:t>Why?</a:t>
             </a:r>
-            <a:endParaRPr lang="en-GB" altLang="en-US" sz="2000"/>
+            <a:endParaRPr lang="en-GB" altLang="en-US" sz="1800"/>
           </a:p>
           <a:p>
             <a:pPr algn="just" eaLnBrk="1" hangingPunct="1"/>
             <a:r>
-              <a:rPr lang="en-GB" altLang="en-US" sz="1800">
+              <a:rPr lang="en-GB" altLang="en-US" sz="1600">
                 <a:sym typeface="+mn-ea"/>
               </a:rPr>
               <a:t>When I was younger I enjoyed platformers such as Donkey Kong and Mario. Although my issue with these games was that they were too basic and were missing something. </a:t>
             </a:r>
             <a:r>
-              <a:rPr lang="en-US" altLang="x-none" sz="1800">
+              <a:rPr lang="en-US" altLang="x-none" sz="1600">
                 <a:sym typeface="+mn-ea"/>
               </a:rPr>
               <a:t>This had </a:t>
             </a:r>
             <a:r>
-              <a:rPr lang="en-GB" altLang="en-US" sz="1800">
+              <a:rPr lang="en-GB" altLang="en-US" sz="1600">
                 <a:sym typeface="+mn-ea"/>
               </a:rPr>
               <a:t>influenced </a:t>
             </a:r>
             <a:r>
-              <a:rPr lang="en-US" altLang="x-none" sz="1800">
+              <a:rPr lang="en-US" altLang="x-none" sz="1600">
                 <a:sym typeface="+mn-ea"/>
               </a:rPr>
               <a:t>me to to recreate the classic side-scrolling Super Mario Bros experience with my own twist on the formula. My game will take a more complex</a:t>
             </a:r>
             <a:r>
-              <a:rPr lang="en-GB" altLang="en-US" sz="1800">
+              <a:rPr lang="en-GB" altLang="en-US" sz="1600">
                 <a:sym typeface="+mn-ea"/>
               </a:rPr>
               <a:t> and a different design</a:t>
             </a:r>
             <a:r>
-              <a:rPr lang="en-US" altLang="x-none" sz="1800">
+              <a:rPr lang="en-US" altLang="x-none" sz="1600">
                 <a:sym typeface="+mn-ea"/>
               </a:rPr>
               <a:t> approach. </a:t>
             </a:r>
             <a:r>
-              <a:rPr lang="en-GB" altLang="en-US" sz="1800">
+              <a:rPr lang="en-GB" altLang="en-US" sz="1600">
                 <a:sym typeface="+mn-ea"/>
               </a:rPr>
               <a:t>Furthermore despite the Mobile market being perfect for a casual side-scrolling platforming game there aren’t many such games. This made me choose to release the game on Android and Windows both. </a:t>
             </a:r>
-            <a:endParaRPr lang="en-US" altLang="x-none" sz="1800"/>
+            <a:endParaRPr lang="en-US" altLang="x-none" sz="1600"/>
           </a:p>
           <a:p>
             <a:pPr algn="ctr" eaLnBrk="1" hangingPunct="1"/>
-            <a:endParaRPr lang="en-GB" altLang="en-US" sz="1800"/>
+            <a:endParaRPr lang="en-US" altLang="x-none" sz="1600"/>
           </a:p>
         </p:txBody>
       </p:sp>

</xml_diff>

<commit_message>
Added an NPC to be rescued and expanded the dialogue system. Now context is saved. Old guy NPC gives you a quest to find and rescue his daughter, you find her then you go back to him to receive a rewards of 15 score points.
</commit_message>
<xml_diff>
--- a/CE301 Open Day Poster.pptx
+++ b/CE301 Open Day Poster.pptx
@@ -4104,6 +4104,30 @@
           </a:p>
         </p:txBody>
       </p:sp>
+      <p:pic>
+        <p:nvPicPr>
+          <p:cNvPr id="7" name="Picture 6"/>
+          <p:cNvPicPr>
+            <a:picLocks noChangeAspect="1"/>
+          </p:cNvPicPr>
+          <p:nvPr/>
+        </p:nvPicPr>
+        <p:blipFill>
+          <a:blip r:embed="rId3"/>
+          <a:stretch>
+            <a:fillRect/>
+          </a:stretch>
+        </p:blipFill>
+        <p:spPr>
+          <a:xfrm>
+            <a:off x="189230" y="2301240"/>
+            <a:ext cx="14677390" cy="8242935"/>
+          </a:xfrm>
+          <a:prstGeom prst="rect">
+            <a:avLst/>
+          </a:prstGeom>
+        </p:spPr>
+      </p:pic>
       <p:sp>
         <p:nvSpPr>
           <p:cNvPr id="2055" name="Rectangle 7"/>
@@ -4114,14 +4138,16 @@
         </p:nvSpPr>
         <p:spPr bwMode="auto">
           <a:xfrm>
-            <a:off x="216535" y="2301875"/>
-            <a:ext cx="7322820" cy="1823720"/>
+            <a:off x="216535" y="2322195"/>
+            <a:ext cx="7322820" cy="1971675"/>
           </a:xfrm>
           <a:prstGeom prst="rect">
             <a:avLst/>
           </a:prstGeom>
           <a:solidFill>
-            <a:schemeClr val="bg1"/>
+            <a:schemeClr val="bg1">
+              <a:alpha val="75000"/>
+            </a:schemeClr>
           </a:solidFill>
           <a:ln w="9525">
             <a:solidFill>
@@ -4233,46 +4259,34 @@
           <a:p>
             <a:pPr algn="ctr" eaLnBrk="1" hangingPunct="1"/>
             <a:r>
+              <a:rPr lang="en-GB" altLang="en-US" sz="2000"/>
+              <a:t>What?</a:t>
+            </a:r>
+            <a:endParaRPr lang="en-US" altLang="x-none" sz="2000"/>
+          </a:p>
+          <a:p>
+            <a:pPr algn="just" eaLnBrk="1" hangingPunct="1"/>
+            <a:r>
+              <a:rPr lang="en-US" altLang="x-none" sz="1800"/>
+              <a:t>My project goals have been to create a </a:t>
+            </a:r>
+            <a:r>
               <a:rPr lang="en-GB" altLang="en-US" sz="1800"/>
-              <a:t>What?</a:t>
+              <a:t>side-scrolling 2D </a:t>
+            </a:r>
+            <a:r>
+              <a:rPr lang="en-US" altLang="x-none" sz="1800"/>
+              <a:t>Mario game with lite RPG-elements such as friendly NPCs, a text based story narrative and a basic inventory system. My focus has been on having a working game with collisions, enemy AI agents and other dynamic world features such as unlockable doors</a:t>
+            </a:r>
+            <a:r>
+              <a:rPr lang="en-GB" altLang="en-US" sz="1800"/>
+              <a:t> and later trading/store mechanic.</a:t>
             </a:r>
             <a:endParaRPr lang="en-US" altLang="x-none" sz="1800"/>
           </a:p>
           <a:p>
             <a:pPr algn="just" eaLnBrk="1" hangingPunct="1"/>
-            <a:r>
-              <a:rPr lang="en-US" altLang="x-none" sz="1600"/>
-              <a:t>My project goals have been to create a </a:t>
-            </a:r>
-            <a:r>
-              <a:rPr lang="en-GB" altLang="en-US" sz="1600"/>
-              <a:t>side-scrolling 2D </a:t>
-            </a:r>
-            <a:r>
-              <a:rPr lang="en-US" altLang="x-none" sz="1600"/>
-              <a:t>Mario game with lite RPG-elements such as friendly NPCs, a text based story narrative and a basic inventory system. My focus has been on having a working game with collisions, enemy AI agents and other dynamic world features such as unlockable doors</a:t>
-            </a:r>
-            <a:r>
-              <a:rPr lang="en-GB" altLang="en-US" sz="1600"/>
-              <a:t>. </a:t>
-            </a:r>
-            <a:r>
-              <a:rPr lang="en-US" altLang="x-none" sz="1600"/>
-              <a:t>For Android I aim to have the game published on the Android Google app store in the future</a:t>
-            </a:r>
-            <a:r>
-              <a:rPr lang="en-GB" altLang="en-US" sz="1600"/>
-              <a:t>.</a:t>
-            </a:r>
-            <a:r>
-              <a:rPr lang="en-US" altLang="x-none" sz="1600"/>
-              <a:t> </a:t>
-            </a:r>
-            <a:endParaRPr lang="en-US" altLang="x-none" sz="1600"/>
-          </a:p>
-          <a:p>
-            <a:pPr algn="just" eaLnBrk="1" hangingPunct="1"/>
-            <a:endParaRPr lang="en-US" altLang="x-none" sz="1600"/>
+            <a:endParaRPr lang="en-US" altLang="x-none" sz="1800"/>
           </a:p>
         </p:txBody>
       </p:sp>
@@ -4286,18 +4300,22 @@
         </p:nvSpPr>
         <p:spPr bwMode="auto">
           <a:xfrm>
-            <a:off x="7672705" y="2301240"/>
-            <a:ext cx="7221220" cy="6457950"/>
+            <a:off x="7733030" y="2322195"/>
+            <a:ext cx="7082155" cy="8037830"/>
           </a:xfrm>
           <a:prstGeom prst="rect">
             <a:avLst/>
           </a:prstGeom>
-          <a:ln>
+          <a:solidFill>
+            <a:schemeClr val="bg1">
+              <a:alpha val="75000"/>
+            </a:schemeClr>
+          </a:solidFill>
+          <a:ln w="12700" cmpd="sng">
             <a:solidFill>
-              <a:schemeClr val="accent1">
-                <a:lumMod val="75000"/>
-              </a:schemeClr>
+              <a:schemeClr val="tx1"/>
             </a:solidFill>
+            <a:prstDash val="solid"/>
           </a:ln>
         </p:spPr>
         <p:style>
@@ -4417,18 +4435,34 @@
           <a:p>
             <a:pPr algn="ctr" eaLnBrk="1" hangingPunct="1"/>
             <a:r>
-              <a:rPr lang="en-GB" altLang="x-none" sz="1800"/>
+              <a:rPr lang="en-GB" altLang="x-none" sz="2000">
+                <a:solidFill>
+                  <a:schemeClr val="tx1"/>
+                </a:solidFill>
+              </a:rPr>
               <a:t>Technical Achievements</a:t>
             </a:r>
-            <a:endParaRPr lang="en-GB" altLang="x-none" sz="1800"/>
+            <a:endParaRPr lang="en-GB" altLang="x-none" sz="2000">
+              <a:solidFill>
+                <a:schemeClr val="tx1"/>
+              </a:solidFill>
+            </a:endParaRPr>
           </a:p>
           <a:p>
             <a:pPr algn="l" eaLnBrk="1" hangingPunct="1"/>
             <a:r>
-              <a:rPr lang="en-GB" altLang="x-none" sz="1600"/>
+              <a:rPr lang="en-GB" altLang="x-none" sz="1800">
+                <a:solidFill>
+                  <a:schemeClr val="tx1"/>
+                </a:solidFill>
+              </a:rPr>
               <a:t>I had created the game using a game development framework for Java based on OpenGL called libGDX which allowed me to create the game loop and world and have it work on Android and Windows with minimal platform-specific code. </a:t>
             </a:r>
-            <a:endParaRPr lang="en-GB" altLang="x-none" sz="1600"/>
+            <a:endParaRPr lang="en-GB" altLang="x-none" sz="1800">
+              <a:solidFill>
+                <a:schemeClr val="tx1"/>
+              </a:solidFill>
+            </a:endParaRPr>
           </a:p>
           <a:p>
             <a:pPr marL="342900" indent="-342900" algn="l" eaLnBrk="1" hangingPunct="1">
@@ -4436,10 +4470,75 @@
               <a:buChar char="•"/>
             </a:pPr>
             <a:r>
-              <a:rPr lang="en-GB" altLang="x-none" sz="1400"/>
-              <a:t>2 Game modes</a:t>
-            </a:r>
-            <a:endParaRPr lang="en-GB" altLang="x-none" sz="1400"/>
+              <a:rPr lang="en-GB" altLang="x-none" sz="1600">
+                <a:solidFill>
+                  <a:schemeClr val="tx1"/>
+                </a:solidFill>
+              </a:rPr>
+              <a:t>All moving objects/sprites are animated using my own animation code</a:t>
+            </a:r>
+            <a:endParaRPr lang="en-GB" altLang="x-none" sz="1600">
+              <a:solidFill>
+                <a:schemeClr val="tx1"/>
+              </a:solidFill>
+            </a:endParaRPr>
+          </a:p>
+          <a:p>
+            <a:pPr marL="342900" indent="-342900" algn="l" eaLnBrk="1" hangingPunct="1">
+              <a:buFont typeface="Arial" panose="020B0604020202020204" pitchFamily="34" charset="0"/>
+              <a:buChar char="•"/>
+            </a:pPr>
+            <a:r>
+              <a:rPr lang="en-GB" altLang="x-none" sz="1600">
+                <a:solidFill>
+                  <a:schemeClr val="tx1"/>
+                </a:solidFill>
+              </a:rPr>
+              <a:t>Works on Windows and Android</a:t>
+            </a:r>
+            <a:endParaRPr lang="en-GB" altLang="x-none" sz="1600">
+              <a:solidFill>
+                <a:schemeClr val="tx1"/>
+              </a:solidFill>
+            </a:endParaRPr>
+          </a:p>
+          <a:p>
+            <a:pPr marL="342900" indent="-342900" algn="l" eaLnBrk="1" hangingPunct="1">
+              <a:buFont typeface="Arial" panose="020B0604020202020204" pitchFamily="34" charset="0"/>
+              <a:buChar char="•"/>
+            </a:pPr>
+            <a:r>
+              <a:rPr lang="en-GB" altLang="x-none" sz="1600">
+                <a:solidFill>
+                  <a:schemeClr val="tx1"/>
+                </a:solidFill>
+              </a:rPr>
+              <a:t>Easy level creation using TMX tiled maps. </a:t>
+            </a:r>
+            <a:endParaRPr lang="en-GB" altLang="x-none" sz="1600">
+              <a:solidFill>
+                <a:schemeClr val="tx1"/>
+              </a:solidFill>
+            </a:endParaRPr>
+          </a:p>
+          <a:p>
+            <a:pPr marL="342900" lvl="0" indent="-342900" algn="l" eaLnBrk="1" hangingPunct="1">
+              <a:buFont typeface="Arial" panose="020B0604020202020204" pitchFamily="34" charset="0"/>
+              <a:buChar char="•"/>
+            </a:pPr>
+            <a:r>
+              <a:rPr lang="en-GB" altLang="x-none" sz="1600">
+                <a:solidFill>
+                  <a:schemeClr val="tx1"/>
+                </a:solidFill>
+              </a:rPr>
+              <a:t>Dynamic objects</a:t>
+            </a:r>
+            <a:endParaRPr lang="en-GB" altLang="x-none" sz="1600">
+              <a:solidFill>
+                <a:schemeClr val="tx1"/>
+              </a:solidFill>
+            </a:endParaRPr>
           </a:p>
           <a:p>
             <a:pPr marL="800100" lvl="1" indent="-342900" algn="l" eaLnBrk="1" hangingPunct="1">
@@ -4447,10 +4546,18 @@
               <a:buChar char="•"/>
             </a:pPr>
             <a:r>
-              <a:rPr lang="en-GB" altLang="x-none" sz="1400"/>
-              <a:t>Procedurally generated endless survival</a:t>
-            </a:r>
-            <a:endParaRPr lang="en-GB" altLang="x-none" sz="1400"/>
+              <a:rPr lang="en-GB" altLang="x-none" sz="1600">
+                <a:solidFill>
+                  <a:schemeClr val="tx1"/>
+                </a:solidFill>
+              </a:rPr>
+              <a:t>Collisions</a:t>
+            </a:r>
+            <a:endParaRPr lang="en-GB" altLang="x-none" sz="1600">
+              <a:solidFill>
+                <a:schemeClr val="tx1"/>
+              </a:solidFill>
+            </a:endParaRPr>
           </a:p>
           <a:p>
             <a:pPr marL="800100" lvl="1" indent="-342900" algn="l" eaLnBrk="1" hangingPunct="1">
@@ -4458,10 +4565,132 @@
               <a:buChar char="•"/>
             </a:pPr>
             <a:r>
-              <a:rPr lang="en-GB" altLang="x-none" sz="1400"/>
-              <a:t>Campaign mode, currently 1 level but intending to have 3 by release.</a:t>
-            </a:r>
-            <a:endParaRPr lang="en-GB" altLang="x-none" sz="1400"/>
+              <a:rPr lang="en-GB" altLang="x-none" sz="1600">
+                <a:solidFill>
+                  <a:schemeClr val="tx1"/>
+                </a:solidFill>
+              </a:rPr>
+              <a:t>Friendly NPCs with interactions such as dialogue</a:t>
+            </a:r>
+            <a:endParaRPr lang="en-GB" altLang="x-none" sz="1600">
+              <a:solidFill>
+                <a:schemeClr val="tx1"/>
+              </a:solidFill>
+            </a:endParaRPr>
+          </a:p>
+          <a:p>
+            <a:pPr marL="800100" lvl="1" indent="-342900" algn="l" eaLnBrk="1" hangingPunct="1">
+              <a:buFont typeface="Arial" panose="020B0604020202020204" pitchFamily="34" charset="0"/>
+              <a:buChar char="•"/>
+            </a:pPr>
+            <a:r>
+              <a:rPr lang="en-GB" altLang="x-none" sz="1600">
+                <a:solidFill>
+                  <a:schemeClr val="tx1"/>
+                </a:solidFill>
+              </a:rPr>
+              <a:t>Collectibles</a:t>
+            </a:r>
+            <a:endParaRPr lang="en-GB" altLang="x-none" sz="1600">
+              <a:solidFill>
+                <a:schemeClr val="tx1"/>
+              </a:solidFill>
+            </a:endParaRPr>
+          </a:p>
+          <a:p>
+            <a:pPr marL="1257300" lvl="2" indent="-342900" algn="l" eaLnBrk="1" hangingPunct="1">
+              <a:buFont typeface="Arial" panose="020B0604020202020204" pitchFamily="34" charset="0"/>
+              <a:buChar char="•"/>
+            </a:pPr>
+            <a:r>
+              <a:rPr lang="en-GB" altLang="x-none" sz="1600">
+                <a:solidFill>
+                  <a:schemeClr val="tx1"/>
+                </a:solidFill>
+              </a:rPr>
+              <a:t>Power-ups</a:t>
+            </a:r>
+            <a:endParaRPr lang="en-GB" altLang="x-none" sz="1600">
+              <a:solidFill>
+                <a:schemeClr val="tx1"/>
+              </a:solidFill>
+            </a:endParaRPr>
+          </a:p>
+          <a:p>
+            <a:pPr marL="1257300" lvl="2" indent="-342900" algn="l" eaLnBrk="1" hangingPunct="1">
+              <a:buFont typeface="Arial" panose="020B0604020202020204" pitchFamily="34" charset="0"/>
+              <a:buChar char="•"/>
+            </a:pPr>
+            <a:r>
+              <a:rPr lang="en-GB" altLang="x-none" sz="1600">
+                <a:solidFill>
+                  <a:schemeClr val="tx1"/>
+                </a:solidFill>
+              </a:rPr>
+              <a:t>Coins</a:t>
+            </a:r>
+            <a:endParaRPr lang="en-GB" altLang="x-none" sz="1600">
+              <a:solidFill>
+                <a:schemeClr val="tx1"/>
+              </a:solidFill>
+            </a:endParaRPr>
+          </a:p>
+          <a:p>
+            <a:pPr marL="1257300" lvl="2" indent="-342900" algn="l" eaLnBrk="1" hangingPunct="1">
+              <a:buFont typeface="Arial" panose="020B0604020202020204" pitchFamily="34" charset="0"/>
+              <a:buChar char="•"/>
+            </a:pPr>
+            <a:r>
+              <a:rPr lang="en-GB" altLang="x-none" sz="1600">
+                <a:solidFill>
+                  <a:schemeClr val="tx1"/>
+                </a:solidFill>
+              </a:rPr>
+              <a:t>Keys (for unlocking doors)</a:t>
+            </a:r>
+            <a:endParaRPr lang="en-GB" altLang="x-none" sz="1600">
+              <a:solidFill>
+                <a:schemeClr val="tx1"/>
+              </a:solidFill>
+            </a:endParaRPr>
+          </a:p>
+          <a:p>
+            <a:pPr marL="800100" lvl="1" indent="-342900" algn="l" eaLnBrk="1" hangingPunct="1">
+              <a:buFont typeface="Arial" panose="020B0604020202020204" pitchFamily="34" charset="0"/>
+              <a:buChar char="•"/>
+            </a:pPr>
+            <a:r>
+              <a:rPr lang="en-GB" altLang="x-none" sz="1600">
+                <a:solidFill>
+                  <a:schemeClr val="tx1"/>
+                </a:solidFill>
+              </a:rPr>
+              <a:t>Different types of Enemy AI agents</a:t>
+            </a:r>
+            <a:endParaRPr lang="en-GB" altLang="x-none" sz="1600">
+              <a:solidFill>
+                <a:schemeClr val="tx1"/>
+              </a:solidFill>
+            </a:endParaRPr>
+          </a:p>
+          <a:p>
+            <a:pPr marL="800100" lvl="1" indent="-342900" algn="l" eaLnBrk="1" hangingPunct="1">
+              <a:buFont typeface="Arial" panose="020B0604020202020204" pitchFamily="34" charset="0"/>
+              <a:buChar char="•"/>
+            </a:pPr>
+            <a:r>
+              <a:rPr lang="en-GB" altLang="x-none" sz="1600">
+                <a:solidFill>
+                  <a:schemeClr val="tx1"/>
+                </a:solidFill>
+              </a:rPr>
+              <a:t>Unlockable doors</a:t>
+            </a:r>
+            <a:endParaRPr lang="en-GB" altLang="x-none" sz="1600">
+              <a:solidFill>
+                <a:schemeClr val="tx1"/>
+              </a:solidFill>
+            </a:endParaRPr>
           </a:p>
           <a:p>
             <a:pPr marL="342900" lvl="0" indent="-342900" algn="l" eaLnBrk="1" hangingPunct="1">
@@ -4469,188 +4698,141 @@
               <a:buChar char="•"/>
             </a:pPr>
             <a:r>
-              <a:rPr lang="en-GB" altLang="x-none" sz="1400"/>
-              <a:t>Dynamic objects</a:t>
-            </a:r>
-            <a:endParaRPr lang="en-GB" altLang="x-none" sz="1400"/>
+              <a:rPr lang="en-GB" altLang="x-none" sz="1600">
+                <a:solidFill>
+                  <a:schemeClr val="tx1"/>
+                </a:solidFill>
+              </a:rPr>
+              <a:t>Basic inventory system</a:t>
+            </a:r>
+            <a:endParaRPr lang="en-GB" altLang="x-none" sz="1600">
+              <a:solidFill>
+                <a:schemeClr val="tx1"/>
+              </a:solidFill>
+            </a:endParaRPr>
+          </a:p>
+          <a:p>
+            <a:pPr marL="342900" lvl="0" indent="-342900" algn="l" eaLnBrk="1" hangingPunct="1">
+              <a:buFont typeface="Arial" panose="020B0604020202020204" pitchFamily="34" charset="0"/>
+              <a:buChar char="•"/>
+            </a:pPr>
+            <a:r>
+              <a:rPr lang="en-GB" altLang="x-none" sz="1600">
+                <a:solidFill>
+                  <a:schemeClr val="tx1"/>
+                </a:solidFill>
+              </a:rPr>
+              <a:t>Works on Windows and Android</a:t>
+            </a:r>
+            <a:endParaRPr lang="en-GB" altLang="x-none" sz="1600">
+              <a:solidFill>
+                <a:schemeClr val="tx1"/>
+              </a:solidFill>
+            </a:endParaRPr>
+          </a:p>
+          <a:p>
+            <a:pPr marL="342900" lvl="0" indent="-342900" algn="l" eaLnBrk="1" hangingPunct="1">
+              <a:buFont typeface="Arial" panose="020B0604020202020204" pitchFamily="34" charset="0"/>
+              <a:buChar char="•"/>
+            </a:pPr>
+            <a:r>
+              <a:rPr lang="en-GB" altLang="x-none" sz="1600">
+                <a:solidFill>
+                  <a:schemeClr val="tx1"/>
+                </a:solidFill>
+              </a:rPr>
+              <a:t>Wide range of texture assets, sprites, sound effects employed.</a:t>
+            </a:r>
+            <a:endParaRPr lang="en-GB" altLang="x-none" sz="1600">
+              <a:solidFill>
+                <a:schemeClr val="tx1"/>
+              </a:solidFill>
+            </a:endParaRPr>
+          </a:p>
+          <a:p>
+            <a:pPr marL="342900" lvl="0" indent="-342900" algn="l" eaLnBrk="1" hangingPunct="1">
+              <a:buFont typeface="Arial" panose="020B0604020202020204" pitchFamily="34" charset="0"/>
+              <a:buChar char="•"/>
+            </a:pPr>
+            <a:endParaRPr lang="en-GB" altLang="x-none" sz="1600">
+              <a:solidFill>
+                <a:schemeClr val="tx1"/>
+              </a:solidFill>
+            </a:endParaRPr>
+          </a:p>
+          <a:p>
+            <a:pPr marL="0" lvl="0" indent="0" algn="l" eaLnBrk="1" hangingPunct="1">
+              <a:buFont typeface="Arial" panose="020B0604020202020204" pitchFamily="34" charset="0"/>
+              <a:buNone/>
+            </a:pPr>
+            <a:r>
+              <a:rPr lang="en-GB" altLang="x-none" sz="1800">
+                <a:solidFill>
+                  <a:schemeClr val="tx1"/>
+                </a:solidFill>
+              </a:rPr>
+              <a:t>Lastly I had built the game in a scalable way as to make adding additional content and game mechanics easy. For example to create a new Enemy type you simply extend Enemy abstract class, overriding its methods, then you place the new enemy on the TMX map of a level using a TMX file editor then you edit placeObjects() method in the GameScreen class so the new TMX map object is parsed and placed correctly using your new Java enemy class. </a:t>
+            </a:r>
+            <a:endParaRPr lang="en-GB" altLang="x-none" sz="1800">
+              <a:solidFill>
+                <a:schemeClr val="tx1"/>
+              </a:solidFill>
+            </a:endParaRPr>
+          </a:p>
+          <a:p>
+            <a:pPr marL="342900" lvl="0" indent="-342900" algn="l" eaLnBrk="1" hangingPunct="1">
+              <a:buFont typeface="Arial" panose="020B0604020202020204" pitchFamily="34" charset="0"/>
+              <a:buChar char="•"/>
+            </a:pPr>
+            <a:endParaRPr lang="en-GB" altLang="x-none" sz="2400">
+              <a:solidFill>
+                <a:srgbClr val="002060"/>
+              </a:solidFill>
+            </a:endParaRPr>
+          </a:p>
+          <a:p>
+            <a:pPr marL="342900" lvl="0" indent="-342900" algn="l" eaLnBrk="1" hangingPunct="1">
+              <a:buFont typeface="Arial" panose="020B0604020202020204" pitchFamily="34" charset="0"/>
+              <a:buChar char="•"/>
+            </a:pPr>
+            <a:endParaRPr lang="en-GB" altLang="x-none" sz="2400">
+              <a:solidFill>
+                <a:srgbClr val="002060"/>
+              </a:solidFill>
+            </a:endParaRPr>
           </a:p>
           <a:p>
             <a:pPr marL="800100" lvl="1" indent="-342900" algn="l" eaLnBrk="1" hangingPunct="1">
               <a:buFont typeface="Arial" panose="020B0604020202020204" pitchFamily="34" charset="0"/>
               <a:buChar char="•"/>
             </a:pPr>
-            <a:r>
-              <a:rPr lang="en-GB" altLang="x-none" sz="1400"/>
-              <a:t>Collisions</a:t>
-            </a:r>
-            <a:endParaRPr lang="en-GB" altLang="x-none" sz="1400"/>
+            <a:endParaRPr lang="en-GB" altLang="x-none" sz="2400">
+              <a:solidFill>
+                <a:srgbClr val="002060"/>
+              </a:solidFill>
+            </a:endParaRPr>
           </a:p>
           <a:p>
             <a:pPr marL="800100" lvl="1" indent="-342900" algn="l" eaLnBrk="1" hangingPunct="1">
               <a:buFont typeface="Arial" panose="020B0604020202020204" pitchFamily="34" charset="0"/>
               <a:buChar char="•"/>
             </a:pPr>
-            <a:r>
-              <a:rPr lang="en-GB" altLang="x-none" sz="1400"/>
-              <a:t>Everything that moves is animated.</a:t>
-            </a:r>
-            <a:endParaRPr lang="en-GB" altLang="x-none" sz="1400"/>
+            <a:endParaRPr lang="en-GB" altLang="x-none" sz="2400">
+              <a:solidFill>
+                <a:srgbClr val="002060"/>
+              </a:solidFill>
+            </a:endParaRPr>
           </a:p>
           <a:p>
             <a:pPr marL="800100" lvl="1" indent="-342900" algn="l" eaLnBrk="1" hangingPunct="1">
               <a:buFont typeface="Arial" panose="020B0604020202020204" pitchFamily="34" charset="0"/>
               <a:buChar char="•"/>
             </a:pPr>
-            <a:r>
-              <a:rPr lang="en-GB" altLang="x-none" sz="1400"/>
-              <a:t>Friendly NPCs with interactions such as dialogue and the purchasing of power-ups using coins.</a:t>
-            </a:r>
-            <a:endParaRPr lang="en-GB" altLang="x-none" sz="1400"/>
-          </a:p>
-          <a:p>
-            <a:pPr marL="800100" lvl="1" indent="-342900" algn="l" eaLnBrk="1" hangingPunct="1">
-              <a:buFont typeface="Arial" panose="020B0604020202020204" pitchFamily="34" charset="0"/>
-              <a:buChar char="•"/>
-            </a:pPr>
-            <a:r>
-              <a:rPr lang="en-GB" altLang="x-none" sz="1400"/>
-              <a:t>Collectibles</a:t>
-            </a:r>
-            <a:endParaRPr lang="en-GB" altLang="x-none" sz="1400"/>
-          </a:p>
-          <a:p>
-            <a:pPr marL="1257300" lvl="2" indent="-342900" algn="l" eaLnBrk="1" hangingPunct="1">
-              <a:buFont typeface="Arial" panose="020B0604020202020204" pitchFamily="34" charset="0"/>
-              <a:buChar char="•"/>
-            </a:pPr>
-            <a:r>
-              <a:rPr lang="en-GB" altLang="x-none" sz="1400"/>
-              <a:t>Power-ups</a:t>
-            </a:r>
-            <a:endParaRPr lang="en-GB" altLang="x-none" sz="1400"/>
-          </a:p>
-          <a:p>
-            <a:pPr marL="1257300" lvl="2" indent="-342900" algn="l" eaLnBrk="1" hangingPunct="1">
-              <a:buFont typeface="Arial" panose="020B0604020202020204" pitchFamily="34" charset="0"/>
-              <a:buChar char="•"/>
-            </a:pPr>
-            <a:r>
-              <a:rPr lang="en-GB" altLang="x-none" sz="1400"/>
-              <a:t>Coins</a:t>
-            </a:r>
-            <a:endParaRPr lang="en-GB" altLang="x-none" sz="1400"/>
-          </a:p>
-          <a:p>
-            <a:pPr marL="1257300" lvl="2" indent="-342900" algn="l" eaLnBrk="1" hangingPunct="1">
-              <a:buFont typeface="Arial" panose="020B0604020202020204" pitchFamily="34" charset="0"/>
-              <a:buChar char="•"/>
-            </a:pPr>
-            <a:r>
-              <a:rPr lang="en-GB" altLang="x-none" sz="1400"/>
-              <a:t>Keys (for unlocking doors)</a:t>
-            </a:r>
-            <a:endParaRPr lang="en-GB" altLang="x-none" sz="1400"/>
-          </a:p>
-          <a:p>
-            <a:pPr marL="800100" lvl="1" indent="-342900" algn="l" eaLnBrk="1" hangingPunct="1">
-              <a:buFont typeface="Arial" panose="020B0604020202020204" pitchFamily="34" charset="0"/>
-              <a:buChar char="•"/>
-            </a:pPr>
-            <a:r>
-              <a:rPr lang="en-GB" altLang="x-none" sz="1400"/>
-              <a:t>Different types of Enemy AI agents</a:t>
-            </a:r>
-            <a:endParaRPr lang="en-GB" altLang="x-none" sz="1400"/>
-          </a:p>
-          <a:p>
-            <a:pPr marL="342900" lvl="0" indent="-342900" algn="l" eaLnBrk="1" hangingPunct="1">
-              <a:buFont typeface="Arial" panose="020B0604020202020204" pitchFamily="34" charset="0"/>
-              <a:buChar char="•"/>
-            </a:pPr>
-            <a:r>
-              <a:rPr lang="en-GB" altLang="x-none" sz="1400"/>
-              <a:t>Basic inventory system</a:t>
-            </a:r>
-            <a:endParaRPr lang="en-GB" altLang="x-none" sz="1400"/>
-          </a:p>
-          <a:p>
-            <a:pPr marL="342900" lvl="0" indent="-342900" algn="l" eaLnBrk="1" hangingPunct="1">
-              <a:buFont typeface="Arial" panose="020B0604020202020204" pitchFamily="34" charset="0"/>
-              <a:buChar char="•"/>
-            </a:pPr>
-            <a:r>
-              <a:rPr lang="en-GB" altLang="x-none" sz="1400"/>
-              <a:t>Works on Windows and Android</a:t>
-            </a:r>
-            <a:endParaRPr lang="en-GB" altLang="x-none" sz="1400"/>
-          </a:p>
-          <a:p>
-            <a:pPr marL="342900" lvl="0" indent="-342900" algn="l" eaLnBrk="1" hangingPunct="1">
-              <a:buFont typeface="Arial" panose="020B0604020202020204" pitchFamily="34" charset="0"/>
-              <a:buChar char="•"/>
-            </a:pPr>
-            <a:r>
-              <a:rPr lang="en-GB" altLang="x-none" sz="1400"/>
-              <a:t>Wide range of texture assets, sprites, SFX employed.</a:t>
-            </a:r>
-            <a:endParaRPr lang="en-GB" altLang="x-none" sz="1400"/>
-          </a:p>
-          <a:p>
-            <a:pPr marL="342900" lvl="0" indent="-342900" algn="l" eaLnBrk="1" hangingPunct="1">
-              <a:buFont typeface="Arial" panose="020B0604020202020204" pitchFamily="34" charset="0"/>
-              <a:buChar char="•"/>
-            </a:pPr>
-            <a:r>
-              <a:rPr lang="en-GB" altLang="x-none" sz="1400"/>
-              <a:t>Online Highscores system using an SQL database (WIP)</a:t>
-            </a:r>
-            <a:endParaRPr lang="en-GB" altLang="x-none" sz="1400"/>
-          </a:p>
-          <a:p>
-            <a:pPr marL="0" lvl="0" indent="0" algn="l" eaLnBrk="1" hangingPunct="1">
-              <a:buFont typeface="Arial" panose="020B0604020202020204" pitchFamily="34" charset="0"/>
-              <a:buNone/>
-            </a:pPr>
-            <a:r>
-              <a:rPr lang="en-GB" altLang="x-none" sz="1600"/>
-              <a:t>Lastly I had built the game in a scalable way as to make adding additional content and game mechanics easy. For example to create a new Enemy type you simply extend Enemy abstract class, overriding its methods, then you place the new enemy on the TMX map of a level using a TMX file editor then you edit placeObjects() method in the GameScreen class so the new TMX map object is parsed and placed correctly using your new Java enemy class. </a:t>
-            </a:r>
-            <a:endParaRPr lang="en-GB" altLang="x-none" sz="1600"/>
-          </a:p>
-          <a:p>
-            <a:pPr marL="342900" lvl="0" indent="-342900" algn="l" eaLnBrk="1" hangingPunct="1">
-              <a:buFont typeface="Arial" panose="020B0604020202020204" pitchFamily="34" charset="0"/>
-              <a:buChar char="•"/>
-            </a:pPr>
-            <a:endParaRPr lang="en-GB" altLang="x-none" sz="2000"/>
-          </a:p>
-          <a:p>
-            <a:pPr marL="342900" lvl="0" indent="-342900" algn="l" eaLnBrk="1" hangingPunct="1">
-              <a:buFont typeface="Arial" panose="020B0604020202020204" pitchFamily="34" charset="0"/>
-              <a:buChar char="•"/>
-            </a:pPr>
-            <a:endParaRPr lang="en-GB" altLang="x-none" sz="2000"/>
-          </a:p>
-          <a:p>
-            <a:pPr marL="800100" lvl="1" indent="-342900" algn="l" eaLnBrk="1" hangingPunct="1">
-              <a:buFont typeface="Arial" panose="020B0604020202020204" pitchFamily="34" charset="0"/>
-              <a:buChar char="•"/>
-            </a:pPr>
-            <a:endParaRPr lang="en-GB" altLang="x-none" sz="2000"/>
-          </a:p>
-          <a:p>
-            <a:pPr marL="800100" lvl="1" indent="-342900" algn="l" eaLnBrk="1" hangingPunct="1">
-              <a:buFont typeface="Arial" panose="020B0604020202020204" pitchFamily="34" charset="0"/>
-              <a:buChar char="•"/>
-            </a:pPr>
-            <a:endParaRPr lang="en-GB" altLang="x-none" sz="2000"/>
-          </a:p>
-          <a:p>
-            <a:pPr marL="800100" lvl="1" indent="-342900" algn="l" eaLnBrk="1" hangingPunct="1">
-              <a:buFont typeface="Arial" panose="020B0604020202020204" pitchFamily="34" charset="0"/>
-              <a:buChar char="•"/>
-            </a:pPr>
-            <a:endParaRPr lang="en-GB" altLang="x-none" sz="2000"/>
+            <a:endParaRPr lang="en-GB" altLang="x-none" sz="2400">
+              <a:solidFill>
+                <a:srgbClr val="002060"/>
+              </a:solidFill>
+            </a:endParaRPr>
           </a:p>
         </p:txBody>
       </p:sp>
@@ -4816,14 +4998,16 @@
         </p:nvSpPr>
         <p:spPr bwMode="auto">
           <a:xfrm>
-            <a:off x="189230" y="4266565"/>
-            <a:ext cx="7376795" cy="2341880"/>
+            <a:off x="216535" y="4410710"/>
+            <a:ext cx="7322820" cy="3140075"/>
           </a:xfrm>
           <a:prstGeom prst="rect">
             <a:avLst/>
           </a:prstGeom>
           <a:solidFill>
-            <a:schemeClr val="bg1"/>
+            <a:schemeClr val="bg1">
+              <a:alpha val="75000"/>
+            </a:schemeClr>
           </a:solidFill>
           <a:ln w="9525">
             <a:solidFill>
@@ -4935,60 +5119,275 @@
           <a:p>
             <a:pPr algn="ctr" eaLnBrk="1" hangingPunct="1"/>
             <a:r>
-              <a:rPr lang="en-GB" altLang="en-US" sz="1800"/>
+              <a:rPr lang="en-GB" altLang="en-US" sz="2000"/>
               <a:t>Why?</a:t>
             </a:r>
-            <a:endParaRPr lang="en-GB" altLang="en-US" sz="1800"/>
+            <a:endParaRPr lang="en-GB" altLang="en-US" sz="2000"/>
           </a:p>
           <a:p>
             <a:pPr algn="just" eaLnBrk="1" hangingPunct="1"/>
             <a:r>
-              <a:rPr lang="en-GB" altLang="en-US" sz="1600">
+              <a:rPr lang="en-GB" altLang="en-US" sz="1800">
                 <a:sym typeface="+mn-ea"/>
               </a:rPr>
               <a:t>When I was younger I enjoyed platformers such as Donkey Kong and Mario. Although my issue with these games was that they were too basic and were missing something. </a:t>
             </a:r>
             <a:r>
-              <a:rPr lang="en-US" altLang="x-none" sz="1600">
+              <a:rPr lang="en-US" altLang="x-none" sz="1800">
                 <a:sym typeface="+mn-ea"/>
               </a:rPr>
               <a:t>This had </a:t>
             </a:r>
             <a:r>
-              <a:rPr lang="en-GB" altLang="en-US" sz="1600">
+              <a:rPr lang="en-GB" altLang="en-US" sz="1800">
                 <a:sym typeface="+mn-ea"/>
               </a:rPr>
               <a:t>influenced </a:t>
             </a:r>
             <a:r>
-              <a:rPr lang="en-US" altLang="x-none" sz="1600">
+              <a:rPr lang="en-US" altLang="x-none" sz="1800">
                 <a:sym typeface="+mn-ea"/>
               </a:rPr>
               <a:t>me to to recreate the classic side-scrolling Super Mario Bros experience with my own twist on the formula. My game will take a more complex</a:t>
             </a:r>
             <a:r>
-              <a:rPr lang="en-GB" altLang="en-US" sz="1600">
+              <a:rPr lang="en-GB" altLang="en-US" sz="1800">
                 <a:sym typeface="+mn-ea"/>
               </a:rPr>
               <a:t> and a different design</a:t>
             </a:r>
             <a:r>
-              <a:rPr lang="en-US" altLang="x-none" sz="1600">
+              <a:rPr lang="en-US" altLang="x-none" sz="1800">
                 <a:sym typeface="+mn-ea"/>
               </a:rPr>
               <a:t> approach. </a:t>
             </a:r>
             <a:r>
-              <a:rPr lang="en-GB" altLang="en-US" sz="1600">
+              <a:rPr lang="en-GB" altLang="en-US" sz="1800">
                 <a:sym typeface="+mn-ea"/>
               </a:rPr>
               <a:t>Furthermore despite the Mobile market being perfect for a casual side-scrolling platforming game there aren’t many such games. This made me choose to release the game on Android and Windows both. </a:t>
             </a:r>
-            <a:endParaRPr lang="en-US" altLang="x-none" sz="1600"/>
+            <a:endParaRPr lang="en-US" altLang="x-none" sz="1800"/>
           </a:p>
           <a:p>
             <a:pPr algn="ctr" eaLnBrk="1" hangingPunct="1"/>
-            <a:endParaRPr lang="en-US" altLang="x-none" sz="1600"/>
+            <a:endParaRPr lang="en-US" altLang="x-none" sz="1800"/>
+          </a:p>
+        </p:txBody>
+      </p:sp>
+      <p:sp>
+        <p:nvSpPr>
+          <p:cNvPr id="9" name="Rectangle 7"/>
+          <p:cNvSpPr>
+            <a:spLocks noChangeArrowheads="1"/>
+          </p:cNvSpPr>
+          <p:nvPr/>
+        </p:nvSpPr>
+        <p:spPr bwMode="auto">
+          <a:xfrm>
+            <a:off x="217170" y="7651115"/>
+            <a:ext cx="7322185" cy="2524125"/>
+          </a:xfrm>
+          <a:prstGeom prst="rect">
+            <a:avLst/>
+          </a:prstGeom>
+          <a:solidFill>
+            <a:schemeClr val="bg1">
+              <a:alpha val="75000"/>
+            </a:schemeClr>
+          </a:solidFill>
+          <a:ln w="9525">
+            <a:solidFill>
+              <a:schemeClr val="tx1"/>
+            </a:solidFill>
+            <a:miter lim="800000"/>
+          </a:ln>
+        </p:spPr>
+        <p:txBody>
+          <a:bodyPr/>
+          <a:lstStyle>
+            <a:lvl1pPr eaLnBrk="0" hangingPunct="0">
+              <a:defRPr sz="2900">
+                <a:solidFill>
+                  <a:schemeClr val="tx1"/>
+                </a:solidFill>
+                <a:latin typeface="Arial" panose="020B0604020202020204" pitchFamily="34" charset="0"/>
+              </a:defRPr>
+            </a:lvl1pPr>
+            <a:lvl2pPr marL="742950" indent="-285750" eaLnBrk="0" hangingPunct="0">
+              <a:defRPr sz="2900">
+                <a:solidFill>
+                  <a:schemeClr val="tx1"/>
+                </a:solidFill>
+                <a:latin typeface="Arial" panose="020B0604020202020204" pitchFamily="34" charset="0"/>
+              </a:defRPr>
+            </a:lvl2pPr>
+            <a:lvl3pPr marL="1143000" indent="-228600" eaLnBrk="0" hangingPunct="0">
+              <a:defRPr sz="2900">
+                <a:solidFill>
+                  <a:schemeClr val="tx1"/>
+                </a:solidFill>
+                <a:latin typeface="Arial" panose="020B0604020202020204" pitchFamily="34" charset="0"/>
+              </a:defRPr>
+            </a:lvl3pPr>
+            <a:lvl4pPr marL="1600200" indent="-228600" eaLnBrk="0" hangingPunct="0">
+              <a:defRPr sz="2900">
+                <a:solidFill>
+                  <a:schemeClr val="tx1"/>
+                </a:solidFill>
+                <a:latin typeface="Arial" panose="020B0604020202020204" pitchFamily="34" charset="0"/>
+              </a:defRPr>
+            </a:lvl4pPr>
+            <a:lvl5pPr marL="2057400" indent="-228600" eaLnBrk="0" hangingPunct="0">
+              <a:defRPr sz="2900">
+                <a:solidFill>
+                  <a:schemeClr val="tx1"/>
+                </a:solidFill>
+                <a:latin typeface="Arial" panose="020B0604020202020204" pitchFamily="34" charset="0"/>
+              </a:defRPr>
+            </a:lvl5pPr>
+            <a:lvl6pPr marL="2514600" indent="-228600" eaLnBrk="0" fontAlgn="base" hangingPunct="0">
+              <a:spcBef>
+                <a:spcPct val="0"/>
+              </a:spcBef>
+              <a:spcAft>
+                <a:spcPct val="0"/>
+              </a:spcAft>
+              <a:defRPr sz="2900">
+                <a:solidFill>
+                  <a:schemeClr val="tx1"/>
+                </a:solidFill>
+                <a:latin typeface="Arial" panose="020B0604020202020204" pitchFamily="34" charset="0"/>
+              </a:defRPr>
+            </a:lvl6pPr>
+            <a:lvl7pPr marL="2971800" indent="-228600" eaLnBrk="0" fontAlgn="base" hangingPunct="0">
+              <a:spcBef>
+                <a:spcPct val="0"/>
+              </a:spcBef>
+              <a:spcAft>
+                <a:spcPct val="0"/>
+              </a:spcAft>
+              <a:defRPr sz="2900">
+                <a:solidFill>
+                  <a:schemeClr val="tx1"/>
+                </a:solidFill>
+                <a:latin typeface="Arial" panose="020B0604020202020204" pitchFamily="34" charset="0"/>
+              </a:defRPr>
+            </a:lvl7pPr>
+            <a:lvl8pPr marL="3429000" indent="-228600" eaLnBrk="0" fontAlgn="base" hangingPunct="0">
+              <a:spcBef>
+                <a:spcPct val="0"/>
+              </a:spcBef>
+              <a:spcAft>
+                <a:spcPct val="0"/>
+              </a:spcAft>
+              <a:defRPr sz="2900">
+                <a:solidFill>
+                  <a:schemeClr val="tx1"/>
+                </a:solidFill>
+                <a:latin typeface="Arial" panose="020B0604020202020204" pitchFamily="34" charset="0"/>
+              </a:defRPr>
+            </a:lvl8pPr>
+            <a:lvl9pPr marL="3886200" indent="-228600" eaLnBrk="0" fontAlgn="base" hangingPunct="0">
+              <a:spcBef>
+                <a:spcPct val="0"/>
+              </a:spcBef>
+              <a:spcAft>
+                <a:spcPct val="0"/>
+              </a:spcAft>
+              <a:defRPr sz="2900">
+                <a:solidFill>
+                  <a:schemeClr val="tx1"/>
+                </a:solidFill>
+                <a:latin typeface="Arial" panose="020B0604020202020204" pitchFamily="34" charset="0"/>
+              </a:defRPr>
+            </a:lvl9pPr>
+          </a:lstStyle>
+          <a:p>
+            <a:pPr algn="ctr" eaLnBrk="1" hangingPunct="1"/>
+            <a:r>
+              <a:rPr lang="en-GB" altLang="en-US" sz="2000"/>
+              <a:t>Aims</a:t>
+            </a:r>
+            <a:r>
+              <a:rPr lang="en-US" altLang="en-GB" sz="2000"/>
+              <a:t>  </a:t>
+            </a:r>
+            <a:endParaRPr lang="en-GB" altLang="en-US" sz="2000"/>
+          </a:p>
+          <a:p>
+            <a:pPr marL="285750" indent="-285750" algn="just" eaLnBrk="1" hangingPunct="1">
+              <a:buFont typeface="Arial" panose="020B0604020202020204" pitchFamily="34" charset="0"/>
+              <a:buChar char="•"/>
+            </a:pPr>
+            <a:r>
+              <a:rPr lang="en-GB" altLang="en-US" sz="1800">
+                <a:sym typeface="+mn-ea"/>
+              </a:rPr>
+              <a:t>To create a fun experience.</a:t>
+            </a:r>
+            <a:endParaRPr lang="en-GB" altLang="en-US" sz="1800">
+              <a:sym typeface="+mn-ea"/>
+            </a:endParaRPr>
+          </a:p>
+          <a:p>
+            <a:pPr marL="285750" indent="-285750" algn="just" eaLnBrk="1" hangingPunct="1">
+              <a:buFont typeface="Arial" panose="020B0604020202020204" pitchFamily="34" charset="0"/>
+              <a:buChar char="•"/>
+            </a:pPr>
+            <a:r>
+              <a:rPr lang="en-GB" altLang="en-US" sz="1800">
+                <a:sym typeface="+mn-ea"/>
+              </a:rPr>
+              <a:t>To release the game on the Android app store.</a:t>
+            </a:r>
+            <a:endParaRPr lang="en-GB" altLang="en-US" sz="1800">
+              <a:sym typeface="+mn-ea"/>
+            </a:endParaRPr>
+          </a:p>
+          <a:p>
+            <a:pPr marL="285750" indent="-285750" algn="just" eaLnBrk="1" hangingPunct="1">
+              <a:buFont typeface="Arial" panose="020B0604020202020204" pitchFamily="34" charset="0"/>
+              <a:buChar char="•"/>
+            </a:pPr>
+            <a:endParaRPr lang="en-GB" altLang="en-US" sz="1800">
+              <a:sym typeface="+mn-ea"/>
+            </a:endParaRPr>
+          </a:p>
+          <a:p>
+            <a:pPr marL="285750" indent="-285750" algn="just" eaLnBrk="1" hangingPunct="1">
+              <a:buFont typeface="Arial" panose="020B0604020202020204" pitchFamily="34" charset="0"/>
+              <a:buChar char="•"/>
+            </a:pPr>
+            <a:endParaRPr lang="en-GB" altLang="en-US" sz="1800">
+              <a:sym typeface="+mn-ea"/>
+            </a:endParaRPr>
+          </a:p>
+          <a:p>
+            <a:pPr marL="285750" indent="-285750" algn="just" eaLnBrk="1" hangingPunct="1">
+              <a:buFont typeface="Arial" panose="020B0604020202020204" pitchFamily="34" charset="0"/>
+              <a:buChar char="•"/>
+            </a:pPr>
+            <a:endParaRPr lang="en-GB" altLang="en-US" sz="1800">
+              <a:sym typeface="+mn-ea"/>
+            </a:endParaRPr>
+          </a:p>
+          <a:p>
+            <a:pPr marL="285750" indent="-285750" algn="just" eaLnBrk="1" hangingPunct="1">
+              <a:buFont typeface="Arial" panose="020B0604020202020204" pitchFamily="34" charset="0"/>
+              <a:buChar char="•"/>
+            </a:pPr>
+            <a:endParaRPr lang="en-GB" altLang="en-US" sz="1800">
+              <a:sym typeface="+mn-ea"/>
+            </a:endParaRPr>
+          </a:p>
+          <a:p>
+            <a:pPr marL="285750" indent="-285750" algn="just" eaLnBrk="1" hangingPunct="1">
+              <a:buFont typeface="Arial" panose="020B0604020202020204" pitchFamily="34" charset="0"/>
+              <a:buChar char="•"/>
+            </a:pPr>
+            <a:endParaRPr lang="en-US" altLang="x-none" sz="1800"/>
           </a:p>
         </p:txBody>
       </p:sp>

</xml_diff>

<commit_message>
Added 2 new powerups and a basic inventory system.
</commit_message>
<xml_diff>
--- a/CE301 Open Day Poster.pptx
+++ b/CE301 Open Day Poster.pptx
@@ -4276,16 +4276,8 @@
             </a:r>
             <a:r>
               <a:rPr lang="en-US" altLang="x-none" sz="1800"/>
-              <a:t>Mario game with lite RPG-elements such as friendly NPCs, a text based story narrative and a basic inventory system. My focus has been on having a working game with collisions, enemy AI agents and other dynamic world features such as unlockable doors</a:t>
-            </a:r>
-            <a:r>
-              <a:rPr lang="en-GB" altLang="en-US" sz="1800"/>
-              <a:t> and later trading/store mechanic.</a:t>
-            </a:r>
-            <a:endParaRPr lang="en-US" altLang="x-none" sz="1800"/>
-          </a:p>
-          <a:p>
-            <a:pPr algn="just" eaLnBrk="1" hangingPunct="1"/>
+              <a:t>Mario game with lite RPG-elements such as friendly NPCs, a text based story narrative and a basic inventory system. </a:t>
+            </a:r>
             <a:endParaRPr lang="en-US" altLang="x-none" sz="1800"/>
           </a:p>
         </p:txBody>
@@ -4572,6 +4564,14 @@
               </a:rPr>
               <a:t>Friendly NPCs with interactions such as dialogue</a:t>
             </a:r>
+            <a:r>
+              <a:rPr lang="en-US" altLang="en-GB" sz="1600">
+                <a:solidFill>
+                  <a:schemeClr val="tx1"/>
+                </a:solidFill>
+              </a:rPr>
+              <a:t> and quests</a:t>
+            </a:r>
             <a:endParaRPr lang="en-GB" altLang="x-none" sz="1600">
               <a:solidFill>
                 <a:schemeClr val="tx1"/>
@@ -5148,13 +5148,13 @@
               <a:rPr lang="en-US" altLang="x-none" sz="1800">
                 <a:sym typeface="+mn-ea"/>
               </a:rPr>
-              <a:t>me to to recreate the classic side-scrolling Super Mario Bros experience with my own twist on the formula. My game will take a more complex</a:t>
+              <a:t>me to to recreate the classic side-scrolling Super Mario Bros experience with my own twist on the formula. My game will take</a:t>
             </a:r>
             <a:r>
               <a:rPr lang="en-GB" altLang="en-US" sz="1800">
                 <a:sym typeface="+mn-ea"/>
               </a:rPr>
-              <a:t> and a different design</a:t>
+              <a:t> a different design</a:t>
             </a:r>
             <a:r>
               <a:rPr lang="en-US" altLang="x-none" sz="1800">
@@ -5166,7 +5166,7 @@
               <a:rPr lang="en-GB" altLang="en-US" sz="1800">
                 <a:sym typeface="+mn-ea"/>
               </a:rPr>
-              <a:t>Furthermore despite the Mobile market being perfect for a casual side-scrolling platforming game there aren’t many such games. This made me choose to release the game on Android and Windows both. </a:t>
+              <a:t>Furthermore despite the Mobile market being perfect for a casual side-scrolling platforming game there aren’t many such games. </a:t>
             </a:r>
             <a:endParaRPr lang="en-US" altLang="x-none" sz="1800"/>
           </a:p>
@@ -5187,7 +5187,7 @@
         <p:spPr bwMode="auto">
           <a:xfrm>
             <a:off x="217170" y="7651115"/>
-            <a:ext cx="7322185" cy="2524125"/>
+            <a:ext cx="7322185" cy="2708910"/>
           </a:xfrm>
           <a:prstGeom prst="rect">
             <a:avLst/>
@@ -5305,16 +5305,19 @@
             </a:lvl9pPr>
           </a:lstStyle>
           <a:p>
-            <a:pPr algn="ctr" eaLnBrk="1" hangingPunct="1"/>
-            <a:r>
-              <a:rPr lang="en-GB" altLang="en-US" sz="2000"/>
-              <a:t>Aims</a:t>
-            </a:r>
-            <a:r>
-              <a:rPr lang="en-US" altLang="en-GB" sz="2000"/>
-              <a:t>  </a:t>
-            </a:r>
-            <a:endParaRPr lang="en-GB" altLang="en-US" sz="2000"/>
+            <a:pPr marL="0" indent="0" algn="ctr" eaLnBrk="1" hangingPunct="1">
+              <a:buFont typeface="Arial" panose="020B0604020202020204" pitchFamily="34" charset="0"/>
+              <a:buNone/>
+            </a:pPr>
+            <a:r>
+              <a:rPr lang="en-US" altLang="en-GB" sz="1800">
+                <a:sym typeface="+mn-ea"/>
+              </a:rPr>
+              <a:t>Things still to do.</a:t>
+            </a:r>
+            <a:endParaRPr lang="en-GB" altLang="en-US" sz="1800">
+              <a:sym typeface="+mn-ea"/>
+            </a:endParaRPr>
           </a:p>
           <a:p>
             <a:pPr marL="285750" indent="-285750" algn="just" eaLnBrk="1" hangingPunct="1">
@@ -5322,10 +5325,16 @@
               <a:buChar char="•"/>
             </a:pPr>
             <a:r>
+              <a:rPr lang="en-US" altLang="en-GB" sz="1800">
+                <a:sym typeface="+mn-ea"/>
+              </a:rPr>
+              <a:t>R</a:t>
+            </a:r>
+            <a:r>
               <a:rPr lang="en-GB" altLang="en-US" sz="1800">
                 <a:sym typeface="+mn-ea"/>
               </a:rPr>
-              <a:t>To create a fun experience.</a:t>
+              <a:t>elease the game on the Android app store.</a:t>
             </a:r>
             <a:endParaRPr lang="en-GB" altLang="en-US" sz="1800">
               <a:sym typeface="+mn-ea"/>
@@ -5337,11 +5346,74 @@
               <a:buChar char="•"/>
             </a:pPr>
             <a:r>
-              <a:rPr lang="en-GB" altLang="en-US" sz="1800">
+              <a:rPr lang="en-US" altLang="en-GB" sz="1800">
                 <a:sym typeface="+mn-ea"/>
               </a:rPr>
-              <a:t>To release the game on the Android app store.</a:t>
-            </a:r>
+              <a:t>Online highscores saving using an SQL database.</a:t>
+            </a:r>
+            <a:endParaRPr lang="en-US" altLang="en-GB" sz="1800">
+              <a:sym typeface="+mn-ea"/>
+            </a:endParaRPr>
+          </a:p>
+          <a:p>
+            <a:pPr marL="285750" indent="-285750" algn="just" eaLnBrk="1" hangingPunct="1">
+              <a:buFont typeface="Arial" panose="020B0604020202020204" pitchFamily="34" charset="0"/>
+              <a:buChar char="•"/>
+            </a:pPr>
+            <a:r>
+              <a:rPr lang="en-US" altLang="en-GB" sz="1800">
+                <a:sym typeface="+mn-ea"/>
+              </a:rPr>
+              <a:t>More levels</a:t>
+            </a:r>
+            <a:endParaRPr lang="en-US" altLang="en-GB" sz="1800">
+              <a:sym typeface="+mn-ea"/>
+            </a:endParaRPr>
+          </a:p>
+          <a:p>
+            <a:pPr marL="285750" indent="-285750" algn="l" eaLnBrk="1" hangingPunct="1">
+              <a:buFont typeface="Arial" panose="020B0604020202020204" pitchFamily="34" charset="0"/>
+              <a:buChar char="•"/>
+            </a:pPr>
+            <a:r>
+              <a:rPr lang="en-US" altLang="en-GB" sz="1800">
+                <a:sym typeface="+mn-ea"/>
+              </a:rPr>
+              <a:t>Endless ‘survival’ game-mode with an infinite procedureally generated map.</a:t>
+            </a:r>
+            <a:endParaRPr lang="en-US" altLang="en-GB" sz="1800">
+              <a:sym typeface="+mn-ea"/>
+            </a:endParaRPr>
+          </a:p>
+          <a:p>
+            <a:pPr marL="285750" indent="-285750" algn="l" eaLnBrk="1" hangingPunct="1">
+              <a:buFont typeface="Arial" panose="020B0604020202020204" pitchFamily="34" charset="0"/>
+              <a:buChar char="•"/>
+            </a:pPr>
+            <a:r>
+              <a:rPr lang="en-US" altLang="en-GB" sz="1800">
+                <a:sym typeface="+mn-ea"/>
+              </a:rPr>
+              <a:t>More types of and better enemy AI</a:t>
+            </a:r>
+            <a:endParaRPr lang="en-US" altLang="en-GB" sz="1800">
+              <a:sym typeface="+mn-ea"/>
+            </a:endParaRPr>
+          </a:p>
+          <a:p>
+            <a:pPr marL="285750" indent="-285750" algn="just" eaLnBrk="1" hangingPunct="1">
+              <a:buFont typeface="Arial" panose="020B0604020202020204" pitchFamily="34" charset="0"/>
+              <a:buChar char="•"/>
+            </a:pPr>
+            <a:endParaRPr lang="en-US" altLang="en-GB" sz="1800">
+              <a:sym typeface="+mn-ea"/>
+            </a:endParaRPr>
+          </a:p>
+          <a:p>
+            <a:pPr marL="285750" indent="-285750" algn="just" eaLnBrk="1" hangingPunct="1">
+              <a:buFont typeface="Arial" panose="020B0604020202020204" pitchFamily="34" charset="0"/>
+              <a:buChar char="•"/>
+            </a:pPr>
             <a:endParaRPr lang="en-GB" altLang="en-US" sz="1800">
               <a:sym typeface="+mn-ea"/>
             </a:endParaRPr>

</xml_diff>

<commit_message>
Abstract and poster finalised
</commit_message>
<xml_diff>
--- a/CE301 Open Day Poster.pptx
+++ b/CE301 Open Day Poster.pptx
@@ -519,7 +519,18 @@
         <p:txBody>
           <a:bodyPr/>
           <a:p>
-            <a:endParaRPr lang="en-GB" altLang="en-US"/>
+            <a:r>
+              <a:rPr lang="en-US" altLang="en-GB"/>
+              <a:t>aims and objectives, diagram of sorts for technical achievements, more visual description of tech achievements BREAK it down more, break it down into more sections, use symbols to show which tech I use.</a:t>
+            </a:r>
+            <a:endParaRPr lang="en-US" altLang="en-GB"/>
+          </a:p>
+          <a:p>
+            <a:r>
+              <a:rPr lang="en-US" altLang="en-GB"/>
+              <a:t>Break down into points rather than big paragraphs</a:t>
+            </a:r>
+            <a:endParaRPr lang="en-US" altLang="en-GB"/>
           </a:p>
         </p:txBody>
       </p:sp>
@@ -3616,9 +3627,7 @@
   <p:cSld>
     <p:bg>
       <p:bgPr>
-        <a:solidFill>
-          <a:schemeClr val="bg1"/>
-        </a:solidFill>
+        <a:noFill/>
         <a:effectLst/>
       </p:bgPr>
     </p:bg>
@@ -3739,7 +3748,7 @@
         </p:nvSpPr>
         <p:spPr bwMode="auto">
           <a:xfrm>
-            <a:off x="0" y="1425575"/>
+            <a:off x="12700" y="1425575"/>
             <a:ext cx="15122525" cy="9267825"/>
           </a:xfrm>
           <a:prstGeom prst="rect">
@@ -4128,6 +4137,30 @@
           </a:prstGeom>
         </p:spPr>
       </p:pic>
+      <p:pic>
+        <p:nvPicPr>
+          <p:cNvPr id="12" name="Picture 11"/>
+          <p:cNvPicPr>
+            <a:picLocks noChangeAspect="1"/>
+          </p:cNvPicPr>
+          <p:nvPr/>
+        </p:nvPicPr>
+        <p:blipFill>
+          <a:blip r:embed="rId4"/>
+          <a:stretch>
+            <a:fillRect/>
+          </a:stretch>
+        </p:blipFill>
+        <p:spPr>
+          <a:xfrm>
+            <a:off x="288290" y="5818505"/>
+            <a:ext cx="3923665" cy="2111375"/>
+          </a:xfrm>
+          <a:prstGeom prst="rect">
+            <a:avLst/>
+          </a:prstGeom>
+        </p:spPr>
+      </p:pic>
       <p:sp>
         <p:nvSpPr>
           <p:cNvPr id="2055" name="Rectangle 7"/>
@@ -4139,7 +4172,7 @@
         <p:spPr bwMode="auto">
           <a:xfrm>
             <a:off x="216535" y="2322195"/>
-            <a:ext cx="7322820" cy="1971675"/>
+            <a:ext cx="7322820" cy="1482090"/>
           </a:xfrm>
           <a:prstGeom prst="rect">
             <a:avLst/>
@@ -4259,10 +4292,10 @@
           <a:p>
             <a:pPr algn="ctr" eaLnBrk="1" hangingPunct="1"/>
             <a:r>
-              <a:rPr lang="en-GB" altLang="en-US" sz="2000"/>
+              <a:rPr lang="en-GB" altLang="en-US" sz="2000" b="1"/>
               <a:t>What?</a:t>
             </a:r>
-            <a:endParaRPr lang="en-US" altLang="x-none" sz="2000"/>
+            <a:endParaRPr lang="en-US" altLang="x-none" sz="2000" b="1"/>
           </a:p>
           <a:p>
             <a:pPr algn="just" eaLnBrk="1" hangingPunct="1"/>
@@ -4284,16 +4317,649 @@
       </p:sp>
       <p:sp>
         <p:nvSpPr>
-          <p:cNvPr id="2057" name="Rectangle 9"/>
-          <p:cNvSpPr>
+          <p:cNvPr id="2059" name="TextBox 11"/>
+          <p:cNvSpPr txBox="1">
             <a:spLocks noChangeArrowheads="1"/>
           </p:cNvSpPr>
           <p:nvPr/>
         </p:nvSpPr>
         <p:spPr bwMode="auto">
           <a:xfrm>
-            <a:off x="7733030" y="2322195"/>
-            <a:ext cx="7082155" cy="8037830"/>
+            <a:off x="4989513" y="346075"/>
+            <a:ext cx="5286375" cy="983615"/>
+          </a:xfrm>
+          <a:prstGeom prst="rect">
+            <a:avLst/>
+          </a:prstGeom>
+          <a:noFill/>
+          <a:ln>
+            <a:noFill/>
+          </a:ln>
+          <a:extLst>
+            <a:ext uri="{909E8E84-426E-40DD-AFC4-6F175D3DCCD1}">
+              <a14:hiddenFill xmlns:a14="http://schemas.microsoft.com/office/drawing/2010/main">
+                <a:solidFill>
+                  <a:srgbClr val="FFFFFF"/>
+                </a:solidFill>
+              </a14:hiddenFill>
+            </a:ext>
+            <a:ext uri="{91240B29-F687-4F45-9708-019B960494DF}">
+              <a14:hiddenLine xmlns:a14="http://schemas.microsoft.com/office/drawing/2010/main" w="9525">
+                <a:solidFill>
+                  <a:srgbClr val="000000"/>
+                </a:solidFill>
+                <a:miter lim="800000"/>
+                <a:headEnd/>
+                <a:tailEnd/>
+              </a14:hiddenLine>
+            </a:ext>
+          </a:extLst>
+        </p:spPr>
+        <p:txBody>
+          <a:bodyPr>
+            <a:spAutoFit/>
+          </a:bodyPr>
+          <a:lstStyle>
+            <a:lvl1pPr eaLnBrk="0" hangingPunct="0">
+              <a:defRPr sz="2900">
+                <a:solidFill>
+                  <a:schemeClr val="tx1"/>
+                </a:solidFill>
+                <a:latin typeface="Arial" panose="020B0604020202020204" pitchFamily="34" charset="0"/>
+              </a:defRPr>
+            </a:lvl1pPr>
+            <a:lvl2pPr marL="742950" indent="-285750" eaLnBrk="0" hangingPunct="0">
+              <a:defRPr sz="2900">
+                <a:solidFill>
+                  <a:schemeClr val="tx1"/>
+                </a:solidFill>
+                <a:latin typeface="Arial" panose="020B0604020202020204" pitchFamily="34" charset="0"/>
+              </a:defRPr>
+            </a:lvl2pPr>
+            <a:lvl3pPr marL="1143000" indent="-228600" eaLnBrk="0" hangingPunct="0">
+              <a:defRPr sz="2900">
+                <a:solidFill>
+                  <a:schemeClr val="tx1"/>
+                </a:solidFill>
+                <a:latin typeface="Arial" panose="020B0604020202020204" pitchFamily="34" charset="0"/>
+              </a:defRPr>
+            </a:lvl3pPr>
+            <a:lvl4pPr marL="1600200" indent="-228600" eaLnBrk="0" hangingPunct="0">
+              <a:defRPr sz="2900">
+                <a:solidFill>
+                  <a:schemeClr val="tx1"/>
+                </a:solidFill>
+                <a:latin typeface="Arial" panose="020B0604020202020204" pitchFamily="34" charset="0"/>
+              </a:defRPr>
+            </a:lvl4pPr>
+            <a:lvl5pPr marL="2057400" indent="-228600" eaLnBrk="0" hangingPunct="0">
+              <a:defRPr sz="2900">
+                <a:solidFill>
+                  <a:schemeClr val="tx1"/>
+                </a:solidFill>
+                <a:latin typeface="Arial" panose="020B0604020202020204" pitchFamily="34" charset="0"/>
+              </a:defRPr>
+            </a:lvl5pPr>
+            <a:lvl6pPr marL="2514600" indent="-228600" eaLnBrk="0" fontAlgn="base" hangingPunct="0">
+              <a:spcBef>
+                <a:spcPct val="0"/>
+              </a:spcBef>
+              <a:spcAft>
+                <a:spcPct val="0"/>
+              </a:spcAft>
+              <a:defRPr sz="2900">
+                <a:solidFill>
+                  <a:schemeClr val="tx1"/>
+                </a:solidFill>
+                <a:latin typeface="Arial" panose="020B0604020202020204" pitchFamily="34" charset="0"/>
+              </a:defRPr>
+            </a:lvl6pPr>
+            <a:lvl7pPr marL="2971800" indent="-228600" eaLnBrk="0" fontAlgn="base" hangingPunct="0">
+              <a:spcBef>
+                <a:spcPct val="0"/>
+              </a:spcBef>
+              <a:spcAft>
+                <a:spcPct val="0"/>
+              </a:spcAft>
+              <a:defRPr sz="2900">
+                <a:solidFill>
+                  <a:schemeClr val="tx1"/>
+                </a:solidFill>
+                <a:latin typeface="Arial" panose="020B0604020202020204" pitchFamily="34" charset="0"/>
+              </a:defRPr>
+            </a:lvl7pPr>
+            <a:lvl8pPr marL="3429000" indent="-228600" eaLnBrk="0" fontAlgn="base" hangingPunct="0">
+              <a:spcBef>
+                <a:spcPct val="0"/>
+              </a:spcBef>
+              <a:spcAft>
+                <a:spcPct val="0"/>
+              </a:spcAft>
+              <a:defRPr sz="2900">
+                <a:solidFill>
+                  <a:schemeClr val="tx1"/>
+                </a:solidFill>
+                <a:latin typeface="Arial" panose="020B0604020202020204" pitchFamily="34" charset="0"/>
+              </a:defRPr>
+            </a:lvl8pPr>
+            <a:lvl9pPr marL="3886200" indent="-228600" eaLnBrk="0" fontAlgn="base" hangingPunct="0">
+              <a:spcBef>
+                <a:spcPct val="0"/>
+              </a:spcBef>
+              <a:spcAft>
+                <a:spcPct val="0"/>
+              </a:spcAft>
+              <a:defRPr sz="2900">
+                <a:solidFill>
+                  <a:schemeClr val="tx1"/>
+                </a:solidFill>
+                <a:latin typeface="Arial" panose="020B0604020202020204" pitchFamily="34" charset="0"/>
+              </a:defRPr>
+            </a:lvl9pPr>
+          </a:lstStyle>
+          <a:p>
+            <a:pPr algn="ctr" eaLnBrk="1" hangingPunct="1"/>
+            <a:r>
+              <a:rPr lang="en-GB" altLang="en-US"/>
+              <a:t>Recreate a classic arcade game</a:t>
+            </a:r>
+            <a:endParaRPr lang="en-GB" altLang="en-US"/>
+          </a:p>
+        </p:txBody>
+      </p:sp>
+      <p:pic>
+        <p:nvPicPr>
+          <p:cNvPr id="57" name="Picture 56"/>
+          <p:cNvPicPr>
+            <a:picLocks noChangeAspect="1"/>
+          </p:cNvPicPr>
+          <p:nvPr/>
+        </p:nvPicPr>
+        <p:blipFill>
+          <a:blip r:embed="rId5"/>
+          <a:stretch>
+            <a:fillRect/>
+          </a:stretch>
+        </p:blipFill>
+        <p:spPr>
+          <a:xfrm>
+            <a:off x="4248785" y="5818505"/>
+            <a:ext cx="2553335" cy="2042160"/>
+          </a:xfrm>
+          <a:prstGeom prst="rect">
+            <a:avLst/>
+          </a:prstGeom>
+        </p:spPr>
+      </p:pic>
+      <p:sp>
+        <p:nvSpPr>
+          <p:cNvPr id="2" name="Rectangle 7"/>
+          <p:cNvSpPr>
+            <a:spLocks noChangeArrowheads="1"/>
+          </p:cNvSpPr>
+          <p:nvPr/>
+        </p:nvSpPr>
+        <p:spPr bwMode="auto">
+          <a:xfrm>
+            <a:off x="217170" y="3978910"/>
+            <a:ext cx="7322820" cy="1866265"/>
+          </a:xfrm>
+          <a:prstGeom prst="rect">
+            <a:avLst/>
+          </a:prstGeom>
+          <a:solidFill>
+            <a:schemeClr val="bg1">
+              <a:alpha val="75000"/>
+            </a:schemeClr>
+          </a:solidFill>
+          <a:ln w="9525">
+            <a:solidFill>
+              <a:schemeClr val="tx1"/>
+            </a:solidFill>
+            <a:miter lim="800000"/>
+          </a:ln>
+        </p:spPr>
+        <p:txBody>
+          <a:bodyPr/>
+          <a:lstStyle>
+            <a:lvl1pPr eaLnBrk="0" hangingPunct="0">
+              <a:defRPr sz="2900">
+                <a:solidFill>
+                  <a:schemeClr val="tx1"/>
+                </a:solidFill>
+                <a:latin typeface="Arial" panose="020B0604020202020204" pitchFamily="34" charset="0"/>
+              </a:defRPr>
+            </a:lvl1pPr>
+            <a:lvl2pPr marL="742950" indent="-285750" eaLnBrk="0" hangingPunct="0">
+              <a:defRPr sz="2900">
+                <a:solidFill>
+                  <a:schemeClr val="tx1"/>
+                </a:solidFill>
+                <a:latin typeface="Arial" panose="020B0604020202020204" pitchFamily="34" charset="0"/>
+              </a:defRPr>
+            </a:lvl2pPr>
+            <a:lvl3pPr marL="1143000" indent="-228600" eaLnBrk="0" hangingPunct="0">
+              <a:defRPr sz="2900">
+                <a:solidFill>
+                  <a:schemeClr val="tx1"/>
+                </a:solidFill>
+                <a:latin typeface="Arial" panose="020B0604020202020204" pitchFamily="34" charset="0"/>
+              </a:defRPr>
+            </a:lvl3pPr>
+            <a:lvl4pPr marL="1600200" indent="-228600" eaLnBrk="0" hangingPunct="0">
+              <a:defRPr sz="2900">
+                <a:solidFill>
+                  <a:schemeClr val="tx1"/>
+                </a:solidFill>
+                <a:latin typeface="Arial" panose="020B0604020202020204" pitchFamily="34" charset="0"/>
+              </a:defRPr>
+            </a:lvl4pPr>
+            <a:lvl5pPr marL="2057400" indent="-228600" eaLnBrk="0" hangingPunct="0">
+              <a:defRPr sz="2900">
+                <a:solidFill>
+                  <a:schemeClr val="tx1"/>
+                </a:solidFill>
+                <a:latin typeface="Arial" panose="020B0604020202020204" pitchFamily="34" charset="0"/>
+              </a:defRPr>
+            </a:lvl5pPr>
+            <a:lvl6pPr marL="2514600" indent="-228600" eaLnBrk="0" fontAlgn="base" hangingPunct="0">
+              <a:spcBef>
+                <a:spcPct val="0"/>
+              </a:spcBef>
+              <a:spcAft>
+                <a:spcPct val="0"/>
+              </a:spcAft>
+              <a:defRPr sz="2900">
+                <a:solidFill>
+                  <a:schemeClr val="tx1"/>
+                </a:solidFill>
+                <a:latin typeface="Arial" panose="020B0604020202020204" pitchFamily="34" charset="0"/>
+              </a:defRPr>
+            </a:lvl6pPr>
+            <a:lvl7pPr marL="2971800" indent="-228600" eaLnBrk="0" fontAlgn="base" hangingPunct="0">
+              <a:spcBef>
+                <a:spcPct val="0"/>
+              </a:spcBef>
+              <a:spcAft>
+                <a:spcPct val="0"/>
+              </a:spcAft>
+              <a:defRPr sz="2900">
+                <a:solidFill>
+                  <a:schemeClr val="tx1"/>
+                </a:solidFill>
+                <a:latin typeface="Arial" panose="020B0604020202020204" pitchFamily="34" charset="0"/>
+              </a:defRPr>
+            </a:lvl7pPr>
+            <a:lvl8pPr marL="3429000" indent="-228600" eaLnBrk="0" fontAlgn="base" hangingPunct="0">
+              <a:spcBef>
+                <a:spcPct val="0"/>
+              </a:spcBef>
+              <a:spcAft>
+                <a:spcPct val="0"/>
+              </a:spcAft>
+              <a:defRPr sz="2900">
+                <a:solidFill>
+                  <a:schemeClr val="tx1"/>
+                </a:solidFill>
+                <a:latin typeface="Arial" panose="020B0604020202020204" pitchFamily="34" charset="0"/>
+              </a:defRPr>
+            </a:lvl8pPr>
+            <a:lvl9pPr marL="3886200" indent="-228600" eaLnBrk="0" fontAlgn="base" hangingPunct="0">
+              <a:spcBef>
+                <a:spcPct val="0"/>
+              </a:spcBef>
+              <a:spcAft>
+                <a:spcPct val="0"/>
+              </a:spcAft>
+              <a:defRPr sz="2900">
+                <a:solidFill>
+                  <a:schemeClr val="tx1"/>
+                </a:solidFill>
+                <a:latin typeface="Arial" panose="020B0604020202020204" pitchFamily="34" charset="0"/>
+              </a:defRPr>
+            </a:lvl9pPr>
+          </a:lstStyle>
+          <a:p>
+            <a:pPr algn="ctr" eaLnBrk="1" hangingPunct="1"/>
+            <a:r>
+              <a:rPr lang="en-GB" altLang="en-US" sz="2000" b="1"/>
+              <a:t>Why?</a:t>
+            </a:r>
+            <a:endParaRPr lang="en-GB" altLang="en-US" sz="2000" b="1"/>
+          </a:p>
+          <a:p>
+            <a:pPr algn="just" eaLnBrk="1" hangingPunct="1"/>
+            <a:r>
+              <a:rPr lang="en-GB" altLang="en-US" sz="1800">
+                <a:sym typeface="+mn-ea"/>
+              </a:rPr>
+              <a:t>When I was younger I enjoyed platformers such as Donkey Kong and Mario. Although my issue with these games was that they were too basic and were missing something. </a:t>
+            </a:r>
+            <a:r>
+              <a:rPr lang="en-US" altLang="x-none" sz="1800">
+                <a:sym typeface="+mn-ea"/>
+              </a:rPr>
+              <a:t>This had </a:t>
+            </a:r>
+            <a:r>
+              <a:rPr lang="en-GB" altLang="en-US" sz="1800">
+                <a:sym typeface="+mn-ea"/>
+              </a:rPr>
+              <a:t>influenced </a:t>
+            </a:r>
+            <a:r>
+              <a:rPr lang="en-US" altLang="x-none" sz="1800">
+                <a:sym typeface="+mn-ea"/>
+              </a:rPr>
+              <a:t>me to to recreate the classic side-scrolling Super Mario Bros experience with my own twist on the formula. </a:t>
+            </a:r>
+            <a:endParaRPr lang="en-US" altLang="x-none" sz="1800"/>
+          </a:p>
+          <a:p>
+            <a:pPr algn="ctr" eaLnBrk="1" hangingPunct="1"/>
+            <a:endParaRPr lang="en-US" altLang="x-none" sz="1800"/>
+          </a:p>
+        </p:txBody>
+      </p:sp>
+      <p:sp>
+        <p:nvSpPr>
+          <p:cNvPr id="9" name="Rectangle 7"/>
+          <p:cNvSpPr>
+            <a:spLocks noChangeArrowheads="1"/>
+          </p:cNvSpPr>
+          <p:nvPr/>
+        </p:nvSpPr>
+        <p:spPr bwMode="auto">
+          <a:xfrm>
+            <a:off x="189230" y="7867015"/>
+            <a:ext cx="7322185" cy="2605405"/>
+          </a:xfrm>
+          <a:prstGeom prst="rect">
+            <a:avLst/>
+          </a:prstGeom>
+          <a:solidFill>
+            <a:schemeClr val="bg1">
+              <a:alpha val="75000"/>
+            </a:schemeClr>
+          </a:solidFill>
+          <a:ln w="9525">
+            <a:solidFill>
+              <a:schemeClr val="tx1"/>
+            </a:solidFill>
+            <a:miter lim="800000"/>
+          </a:ln>
+        </p:spPr>
+        <p:txBody>
+          <a:bodyPr/>
+          <a:lstStyle>
+            <a:lvl1pPr eaLnBrk="0" hangingPunct="0">
+              <a:defRPr sz="2900">
+                <a:solidFill>
+                  <a:schemeClr val="tx1"/>
+                </a:solidFill>
+                <a:latin typeface="Arial" panose="020B0604020202020204" pitchFamily="34" charset="0"/>
+              </a:defRPr>
+            </a:lvl1pPr>
+            <a:lvl2pPr marL="742950" indent="-285750" eaLnBrk="0" hangingPunct="0">
+              <a:defRPr sz="2900">
+                <a:solidFill>
+                  <a:schemeClr val="tx1"/>
+                </a:solidFill>
+                <a:latin typeface="Arial" panose="020B0604020202020204" pitchFamily="34" charset="0"/>
+              </a:defRPr>
+            </a:lvl2pPr>
+            <a:lvl3pPr marL="1143000" indent="-228600" eaLnBrk="0" hangingPunct="0">
+              <a:defRPr sz="2900">
+                <a:solidFill>
+                  <a:schemeClr val="tx1"/>
+                </a:solidFill>
+                <a:latin typeface="Arial" panose="020B0604020202020204" pitchFamily="34" charset="0"/>
+              </a:defRPr>
+            </a:lvl3pPr>
+            <a:lvl4pPr marL="1600200" indent="-228600" eaLnBrk="0" hangingPunct="0">
+              <a:defRPr sz="2900">
+                <a:solidFill>
+                  <a:schemeClr val="tx1"/>
+                </a:solidFill>
+                <a:latin typeface="Arial" panose="020B0604020202020204" pitchFamily="34" charset="0"/>
+              </a:defRPr>
+            </a:lvl4pPr>
+            <a:lvl5pPr marL="2057400" indent="-228600" eaLnBrk="0" hangingPunct="0">
+              <a:defRPr sz="2900">
+                <a:solidFill>
+                  <a:schemeClr val="tx1"/>
+                </a:solidFill>
+                <a:latin typeface="Arial" panose="020B0604020202020204" pitchFamily="34" charset="0"/>
+              </a:defRPr>
+            </a:lvl5pPr>
+            <a:lvl6pPr marL="2514600" indent="-228600" eaLnBrk="0" fontAlgn="base" hangingPunct="0">
+              <a:spcBef>
+                <a:spcPct val="0"/>
+              </a:spcBef>
+              <a:spcAft>
+                <a:spcPct val="0"/>
+              </a:spcAft>
+              <a:defRPr sz="2900">
+                <a:solidFill>
+                  <a:schemeClr val="tx1"/>
+                </a:solidFill>
+                <a:latin typeface="Arial" panose="020B0604020202020204" pitchFamily="34" charset="0"/>
+              </a:defRPr>
+            </a:lvl6pPr>
+            <a:lvl7pPr marL="2971800" indent="-228600" eaLnBrk="0" fontAlgn="base" hangingPunct="0">
+              <a:spcBef>
+                <a:spcPct val="0"/>
+              </a:spcBef>
+              <a:spcAft>
+                <a:spcPct val="0"/>
+              </a:spcAft>
+              <a:defRPr sz="2900">
+                <a:solidFill>
+                  <a:schemeClr val="tx1"/>
+                </a:solidFill>
+                <a:latin typeface="Arial" panose="020B0604020202020204" pitchFamily="34" charset="0"/>
+              </a:defRPr>
+            </a:lvl7pPr>
+            <a:lvl8pPr marL="3429000" indent="-228600" eaLnBrk="0" fontAlgn="base" hangingPunct="0">
+              <a:spcBef>
+                <a:spcPct val="0"/>
+              </a:spcBef>
+              <a:spcAft>
+                <a:spcPct val="0"/>
+              </a:spcAft>
+              <a:defRPr sz="2900">
+                <a:solidFill>
+                  <a:schemeClr val="tx1"/>
+                </a:solidFill>
+                <a:latin typeface="Arial" panose="020B0604020202020204" pitchFamily="34" charset="0"/>
+              </a:defRPr>
+            </a:lvl8pPr>
+            <a:lvl9pPr marL="3886200" indent="-228600" eaLnBrk="0" fontAlgn="base" hangingPunct="0">
+              <a:spcBef>
+                <a:spcPct val="0"/>
+              </a:spcBef>
+              <a:spcAft>
+                <a:spcPct val="0"/>
+              </a:spcAft>
+              <a:defRPr sz="2900">
+                <a:solidFill>
+                  <a:schemeClr val="tx1"/>
+                </a:solidFill>
+                <a:latin typeface="Arial" panose="020B0604020202020204" pitchFamily="34" charset="0"/>
+              </a:defRPr>
+            </a:lvl9pPr>
+          </a:lstStyle>
+          <a:p>
+            <a:pPr marL="457200" lvl="1" indent="0" algn="ctr" eaLnBrk="1" hangingPunct="1">
+              <a:buFont typeface="Arial" panose="020B0604020202020204" pitchFamily="34" charset="0"/>
+              <a:buNone/>
+            </a:pPr>
+            <a:r>
+              <a:rPr lang="en-US" altLang="en-GB" sz="2000" b="1">
+                <a:sym typeface="+mn-ea"/>
+              </a:rPr>
+              <a:t>Ongoing work</a:t>
+            </a:r>
+            <a:endParaRPr lang="en-US" altLang="en-GB" sz="2000" b="1">
+              <a:sym typeface="+mn-ea"/>
+            </a:endParaRPr>
+          </a:p>
+          <a:p>
+            <a:pPr marL="285750" indent="-285750" algn="just" eaLnBrk="1" hangingPunct="1">
+              <a:buFont typeface="Arial" panose="020B0604020202020204" pitchFamily="34" charset="0"/>
+              <a:buChar char="•"/>
+            </a:pPr>
+            <a:r>
+              <a:rPr lang="en-US" altLang="en-GB" sz="1800">
+                <a:sym typeface="+mn-ea"/>
+              </a:rPr>
+              <a:t>R</a:t>
+            </a:r>
+            <a:r>
+              <a:rPr lang="en-GB" altLang="en-US" sz="1800">
+                <a:sym typeface="+mn-ea"/>
+              </a:rPr>
+              <a:t>elease the game on the Android app store.</a:t>
+            </a:r>
+            <a:endParaRPr lang="en-GB" altLang="en-US" sz="1800">
+              <a:sym typeface="+mn-ea"/>
+            </a:endParaRPr>
+          </a:p>
+          <a:p>
+            <a:pPr marL="285750" indent="-285750" algn="just" eaLnBrk="1" hangingPunct="1">
+              <a:buFont typeface="Arial" panose="020B0604020202020204" pitchFamily="34" charset="0"/>
+              <a:buChar char="•"/>
+            </a:pPr>
+            <a:r>
+              <a:rPr lang="en-US" altLang="en-GB" sz="1800">
+                <a:sym typeface="+mn-ea"/>
+              </a:rPr>
+              <a:t>Online highscores saving using an SQL database.</a:t>
+            </a:r>
+            <a:endParaRPr lang="en-US" altLang="en-GB" sz="1800">
+              <a:sym typeface="+mn-ea"/>
+            </a:endParaRPr>
+          </a:p>
+          <a:p>
+            <a:pPr marL="285750" indent="-285750" algn="just" eaLnBrk="1" hangingPunct="1">
+              <a:buFont typeface="Arial" panose="020B0604020202020204" pitchFamily="34" charset="0"/>
+              <a:buChar char="•"/>
+            </a:pPr>
+            <a:r>
+              <a:rPr lang="en-US" altLang="en-GB" sz="1800">
+                <a:sym typeface="+mn-ea"/>
+              </a:rPr>
+              <a:t>More levels.</a:t>
+            </a:r>
+            <a:endParaRPr lang="en-US" altLang="en-GB" sz="1800">
+              <a:sym typeface="+mn-ea"/>
+            </a:endParaRPr>
+          </a:p>
+          <a:p>
+            <a:pPr marL="285750" indent="-285750" algn="l" eaLnBrk="1" hangingPunct="1">
+              <a:buFont typeface="Arial" panose="020B0604020202020204" pitchFamily="34" charset="0"/>
+              <a:buChar char="•"/>
+            </a:pPr>
+            <a:r>
+              <a:rPr lang="en-US" altLang="en-GB" sz="1800">
+                <a:sym typeface="+mn-ea"/>
+              </a:rPr>
+              <a:t>Endless ‘survival’ game-mode with an infinite procedureally generated map.</a:t>
+            </a:r>
+            <a:endParaRPr lang="en-US" altLang="en-GB" sz="1800">
+              <a:sym typeface="+mn-ea"/>
+            </a:endParaRPr>
+          </a:p>
+          <a:p>
+            <a:pPr marL="285750" indent="-285750" algn="l" eaLnBrk="1" hangingPunct="1">
+              <a:buFont typeface="Arial" panose="020B0604020202020204" pitchFamily="34" charset="0"/>
+              <a:buChar char="•"/>
+            </a:pPr>
+            <a:r>
+              <a:rPr lang="en-US" altLang="en-GB" sz="1800">
+                <a:sym typeface="+mn-ea"/>
+              </a:rPr>
+              <a:t>More types of and better enemy AI agents.</a:t>
+            </a:r>
+            <a:endParaRPr lang="en-US" altLang="en-GB" sz="1800">
+              <a:sym typeface="+mn-ea"/>
+            </a:endParaRPr>
+          </a:p>
+          <a:p>
+            <a:pPr marL="285750" indent="-285750" algn="just" eaLnBrk="1" hangingPunct="1">
+              <a:buFont typeface="Arial" panose="020B0604020202020204" pitchFamily="34" charset="0"/>
+              <a:buChar char="•"/>
+            </a:pPr>
+            <a:endParaRPr lang="en-US" altLang="en-GB" sz="1800">
+              <a:sym typeface="+mn-ea"/>
+            </a:endParaRPr>
+          </a:p>
+          <a:p>
+            <a:pPr marL="285750" indent="-285750" algn="just" eaLnBrk="1" hangingPunct="1">
+              <a:buFont typeface="Arial" panose="020B0604020202020204" pitchFamily="34" charset="0"/>
+              <a:buChar char="•"/>
+            </a:pPr>
+            <a:endParaRPr lang="en-GB" altLang="en-US" sz="1800">
+              <a:sym typeface="+mn-ea"/>
+            </a:endParaRPr>
+          </a:p>
+          <a:p>
+            <a:pPr marL="285750" indent="-285750" algn="just" eaLnBrk="1" hangingPunct="1">
+              <a:buFont typeface="Arial" panose="020B0604020202020204" pitchFamily="34" charset="0"/>
+              <a:buChar char="•"/>
+            </a:pPr>
+            <a:endParaRPr lang="en-GB" altLang="en-US" sz="1800">
+              <a:sym typeface="+mn-ea"/>
+            </a:endParaRPr>
+          </a:p>
+          <a:p>
+            <a:pPr marL="285750" indent="-285750" algn="just" eaLnBrk="1" hangingPunct="1">
+              <a:buFont typeface="Arial" panose="020B0604020202020204" pitchFamily="34" charset="0"/>
+              <a:buChar char="•"/>
+            </a:pPr>
+            <a:endParaRPr lang="en-GB" altLang="en-US" sz="1800">
+              <a:sym typeface="+mn-ea"/>
+            </a:endParaRPr>
+          </a:p>
+          <a:p>
+            <a:pPr marL="285750" indent="-285750" algn="just" eaLnBrk="1" hangingPunct="1">
+              <a:buFont typeface="Arial" panose="020B0604020202020204" pitchFamily="34" charset="0"/>
+              <a:buChar char="•"/>
+            </a:pPr>
+            <a:endParaRPr lang="en-GB" altLang="en-US" sz="1800">
+              <a:sym typeface="+mn-ea"/>
+            </a:endParaRPr>
+          </a:p>
+          <a:p>
+            <a:pPr marL="285750" indent="-285750" algn="just" eaLnBrk="1" hangingPunct="1">
+              <a:buFont typeface="Arial" panose="020B0604020202020204" pitchFamily="34" charset="0"/>
+              <a:buChar char="•"/>
+            </a:pPr>
+            <a:endParaRPr lang="en-GB" altLang="en-US" sz="1800">
+              <a:sym typeface="+mn-ea"/>
+            </a:endParaRPr>
+          </a:p>
+          <a:p>
+            <a:pPr marL="285750" indent="-285750" algn="just" eaLnBrk="1" hangingPunct="1">
+              <a:buFont typeface="Arial" panose="020B0604020202020204" pitchFamily="34" charset="0"/>
+              <a:buChar char="•"/>
+            </a:pPr>
+            <a:endParaRPr lang="en-US" altLang="x-none" sz="1800"/>
+          </a:p>
+        </p:txBody>
+      </p:sp>
+      <p:sp>
+        <p:nvSpPr>
+          <p:cNvPr id="2057" name="Rectangle 9"/>
+          <p:cNvSpPr>
+            <a:spLocks noChangeArrowheads="1"/>
+          </p:cNvSpPr>
+          <p:nvPr/>
+        </p:nvSpPr>
+        <p:spPr bwMode="auto">
+          <a:xfrm>
+            <a:off x="7741920" y="2301240"/>
+            <a:ext cx="7082155" cy="1503045"/>
           </a:xfrm>
           <a:prstGeom prst="rect">
             <a:avLst/>
@@ -4427,28 +5093,31 @@
           <a:p>
             <a:pPr algn="ctr" eaLnBrk="1" hangingPunct="1"/>
             <a:r>
-              <a:rPr lang="en-GB" altLang="x-none" sz="2000">
+              <a:rPr lang="en-GB" altLang="x-none" sz="2000" b="1">
                 <a:solidFill>
                   <a:schemeClr val="tx1"/>
                 </a:solidFill>
               </a:rPr>
               <a:t>Technical Achievements</a:t>
             </a:r>
-            <a:endParaRPr lang="en-GB" altLang="x-none" sz="2000">
+            <a:endParaRPr lang="en-GB" altLang="x-none" sz="1200">
               <a:solidFill>
                 <a:schemeClr val="tx1"/>
               </a:solidFill>
             </a:endParaRPr>
           </a:p>
           <a:p>
-            <a:pPr algn="l" eaLnBrk="1" hangingPunct="1"/>
+            <a:pPr marL="342900" indent="-342900" algn="l" eaLnBrk="1" hangingPunct="1">
+              <a:buFont typeface="Arial" panose="020B0604020202020204" pitchFamily="34" charset="0"/>
+              <a:buChar char="•"/>
+            </a:pPr>
             <a:r>
               <a:rPr lang="en-GB" altLang="x-none" sz="1800">
                 <a:solidFill>
                   <a:schemeClr val="tx1"/>
                 </a:solidFill>
               </a:rPr>
-              <a:t>I had created the game using a game development framework for Java based on OpenGL called libGDX which allowed me to create the game loop and world and have it work on Android and Windows with minimal platform-specific code. </a:t>
+              <a:t>All moving objects are animated using my own animation code</a:t>
             </a:r>
             <a:endParaRPr lang="en-GB" altLang="x-none" sz="1800">
               <a:solidFill>
@@ -4462,316 +5131,12 @@
               <a:buChar char="•"/>
             </a:pPr>
             <a:r>
-              <a:rPr lang="en-GB" altLang="x-none" sz="1600">
+              <a:rPr lang="en-GB" altLang="x-none" sz="1800">
                 <a:solidFill>
                   <a:schemeClr val="tx1"/>
                 </a:solidFill>
               </a:rPr>
-              <a:t>All moving objects/sprites are animated using my own animation code</a:t>
-            </a:r>
-            <a:endParaRPr lang="en-GB" altLang="x-none" sz="1600">
-              <a:solidFill>
-                <a:schemeClr val="tx1"/>
-              </a:solidFill>
-            </a:endParaRPr>
-          </a:p>
-          <a:p>
-            <a:pPr marL="342900" indent="-342900" algn="l" eaLnBrk="1" hangingPunct="1">
-              <a:buFont typeface="Arial" panose="020B0604020202020204" pitchFamily="34" charset="0"/>
-              <a:buChar char="•"/>
-            </a:pPr>
-            <a:r>
-              <a:rPr lang="en-GB" altLang="x-none" sz="1600">
-                <a:solidFill>
-                  <a:schemeClr val="tx1"/>
-                </a:solidFill>
-              </a:rPr>
-              <a:t>Works on Windows and Android</a:t>
-            </a:r>
-            <a:endParaRPr lang="en-GB" altLang="x-none" sz="1600">
-              <a:solidFill>
-                <a:schemeClr val="tx1"/>
-              </a:solidFill>
-            </a:endParaRPr>
-          </a:p>
-          <a:p>
-            <a:pPr marL="342900" indent="-342900" algn="l" eaLnBrk="1" hangingPunct="1">
-              <a:buFont typeface="Arial" panose="020B0604020202020204" pitchFamily="34" charset="0"/>
-              <a:buChar char="•"/>
-            </a:pPr>
-            <a:r>
-              <a:rPr lang="en-GB" altLang="x-none" sz="1600">
-                <a:solidFill>
-                  <a:schemeClr val="tx1"/>
-                </a:solidFill>
-              </a:rPr>
-              <a:t>Easy level creation using TMX tiled maps. </a:t>
-            </a:r>
-            <a:endParaRPr lang="en-GB" altLang="x-none" sz="1600">
-              <a:solidFill>
-                <a:schemeClr val="tx1"/>
-              </a:solidFill>
-            </a:endParaRPr>
-          </a:p>
-          <a:p>
-            <a:pPr marL="342900" lvl="0" indent="-342900" algn="l" eaLnBrk="1" hangingPunct="1">
-              <a:buFont typeface="Arial" panose="020B0604020202020204" pitchFamily="34" charset="0"/>
-              <a:buChar char="•"/>
-            </a:pPr>
-            <a:r>
-              <a:rPr lang="en-GB" altLang="x-none" sz="1600">
-                <a:solidFill>
-                  <a:schemeClr val="tx1"/>
-                </a:solidFill>
-              </a:rPr>
-              <a:t>Dynamic objects</a:t>
-            </a:r>
-            <a:endParaRPr lang="en-GB" altLang="x-none" sz="1600">
-              <a:solidFill>
-                <a:schemeClr val="tx1"/>
-              </a:solidFill>
-            </a:endParaRPr>
-          </a:p>
-          <a:p>
-            <a:pPr marL="800100" lvl="1" indent="-342900" algn="l" eaLnBrk="1" hangingPunct="1">
-              <a:buFont typeface="Arial" panose="020B0604020202020204" pitchFamily="34" charset="0"/>
-              <a:buChar char="•"/>
-            </a:pPr>
-            <a:r>
-              <a:rPr lang="en-GB" altLang="x-none" sz="1600">
-                <a:solidFill>
-                  <a:schemeClr val="tx1"/>
-                </a:solidFill>
-              </a:rPr>
-              <a:t>Collisions</a:t>
-            </a:r>
-            <a:endParaRPr lang="en-GB" altLang="x-none" sz="1600">
-              <a:solidFill>
-                <a:schemeClr val="tx1"/>
-              </a:solidFill>
-            </a:endParaRPr>
-          </a:p>
-          <a:p>
-            <a:pPr marL="800100" lvl="1" indent="-342900" algn="l" eaLnBrk="1" hangingPunct="1">
-              <a:buFont typeface="Arial" panose="020B0604020202020204" pitchFamily="34" charset="0"/>
-              <a:buChar char="•"/>
-            </a:pPr>
-            <a:r>
-              <a:rPr lang="en-GB" altLang="x-none" sz="1600">
-                <a:solidFill>
-                  <a:schemeClr val="tx1"/>
-                </a:solidFill>
-              </a:rPr>
-              <a:t>Friendly NPCs with interactions such as dialogue</a:t>
-            </a:r>
-            <a:r>
-              <a:rPr lang="en-US" altLang="en-GB" sz="1600">
-                <a:solidFill>
-                  <a:schemeClr val="tx1"/>
-                </a:solidFill>
-              </a:rPr>
-              <a:t> and quests</a:t>
-            </a:r>
-            <a:endParaRPr lang="en-GB" altLang="x-none" sz="1600">
-              <a:solidFill>
-                <a:schemeClr val="tx1"/>
-              </a:solidFill>
-            </a:endParaRPr>
-          </a:p>
-          <a:p>
-            <a:pPr marL="800100" lvl="1" indent="-342900" algn="l" eaLnBrk="1" hangingPunct="1">
-              <a:buFont typeface="Arial" panose="020B0604020202020204" pitchFamily="34" charset="0"/>
-              <a:buChar char="•"/>
-            </a:pPr>
-            <a:r>
-              <a:rPr lang="en-GB" altLang="x-none" sz="1600">
-                <a:solidFill>
-                  <a:schemeClr val="tx1"/>
-                </a:solidFill>
-              </a:rPr>
-              <a:t>Collectibles</a:t>
-            </a:r>
-            <a:endParaRPr lang="en-GB" altLang="x-none" sz="1600">
-              <a:solidFill>
-                <a:schemeClr val="tx1"/>
-              </a:solidFill>
-            </a:endParaRPr>
-          </a:p>
-          <a:p>
-            <a:pPr marL="1257300" lvl="2" indent="-342900" algn="l" eaLnBrk="1" hangingPunct="1">
-              <a:buFont typeface="Arial" panose="020B0604020202020204" pitchFamily="34" charset="0"/>
-              <a:buChar char="•"/>
-            </a:pPr>
-            <a:r>
-              <a:rPr lang="en-GB" altLang="x-none" sz="1600">
-                <a:solidFill>
-                  <a:schemeClr val="tx1"/>
-                </a:solidFill>
-              </a:rPr>
-              <a:t>Power-ups</a:t>
-            </a:r>
-            <a:endParaRPr lang="en-GB" altLang="x-none" sz="1600">
-              <a:solidFill>
-                <a:schemeClr val="tx1"/>
-              </a:solidFill>
-            </a:endParaRPr>
-          </a:p>
-          <a:p>
-            <a:pPr marL="1257300" lvl="2" indent="-342900" algn="l" eaLnBrk="1" hangingPunct="1">
-              <a:buFont typeface="Arial" panose="020B0604020202020204" pitchFamily="34" charset="0"/>
-              <a:buChar char="•"/>
-            </a:pPr>
-            <a:r>
-              <a:rPr lang="en-GB" altLang="x-none" sz="1600">
-                <a:solidFill>
-                  <a:schemeClr val="tx1"/>
-                </a:solidFill>
-              </a:rPr>
-              <a:t>Coins</a:t>
-            </a:r>
-            <a:endParaRPr lang="en-GB" altLang="x-none" sz="1600">
-              <a:solidFill>
-                <a:schemeClr val="tx1"/>
-              </a:solidFill>
-            </a:endParaRPr>
-          </a:p>
-          <a:p>
-            <a:pPr marL="1257300" lvl="2" indent="-342900" algn="l" eaLnBrk="1" hangingPunct="1">
-              <a:buFont typeface="Arial" panose="020B0604020202020204" pitchFamily="34" charset="0"/>
-              <a:buChar char="•"/>
-            </a:pPr>
-            <a:r>
-              <a:rPr lang="en-GB" altLang="x-none" sz="1600">
-                <a:solidFill>
-                  <a:schemeClr val="tx1"/>
-                </a:solidFill>
-              </a:rPr>
-              <a:t>Keys (for unlocking doors)</a:t>
-            </a:r>
-            <a:endParaRPr lang="en-GB" altLang="x-none" sz="1600">
-              <a:solidFill>
-                <a:schemeClr val="tx1"/>
-              </a:solidFill>
-            </a:endParaRPr>
-          </a:p>
-          <a:p>
-            <a:pPr marL="800100" lvl="1" indent="-342900" algn="l" eaLnBrk="1" hangingPunct="1">
-              <a:buFont typeface="Arial" panose="020B0604020202020204" pitchFamily="34" charset="0"/>
-              <a:buChar char="•"/>
-            </a:pPr>
-            <a:r>
-              <a:rPr lang="en-GB" altLang="x-none" sz="1600">
-                <a:solidFill>
-                  <a:schemeClr val="tx1"/>
-                </a:solidFill>
-              </a:rPr>
-              <a:t>Different types of Enemy AI agents</a:t>
-            </a:r>
-            <a:endParaRPr lang="en-GB" altLang="x-none" sz="1600">
-              <a:solidFill>
-                <a:schemeClr val="tx1"/>
-              </a:solidFill>
-            </a:endParaRPr>
-          </a:p>
-          <a:p>
-            <a:pPr marL="800100" lvl="1" indent="-342900" algn="l" eaLnBrk="1" hangingPunct="1">
-              <a:buFont typeface="Arial" panose="020B0604020202020204" pitchFamily="34" charset="0"/>
-              <a:buChar char="•"/>
-            </a:pPr>
-            <a:r>
-              <a:rPr lang="en-GB" altLang="x-none" sz="1600">
-                <a:solidFill>
-                  <a:schemeClr val="tx1"/>
-                </a:solidFill>
-              </a:rPr>
-              <a:t>Unlockable doors</a:t>
-            </a:r>
-            <a:endParaRPr lang="en-GB" altLang="x-none" sz="1600">
-              <a:solidFill>
-                <a:schemeClr val="tx1"/>
-              </a:solidFill>
-            </a:endParaRPr>
-          </a:p>
-          <a:p>
-            <a:pPr marL="342900" lvl="0" indent="-342900" algn="l" eaLnBrk="1" hangingPunct="1">
-              <a:buFont typeface="Arial" panose="020B0604020202020204" pitchFamily="34" charset="0"/>
-              <a:buChar char="•"/>
-            </a:pPr>
-            <a:r>
-              <a:rPr lang="en-GB" altLang="x-none" sz="1600">
-                <a:solidFill>
-                  <a:schemeClr val="tx1"/>
-                </a:solidFill>
-              </a:rPr>
-              <a:t>Basic inventory system</a:t>
-            </a:r>
-            <a:endParaRPr lang="en-GB" altLang="x-none" sz="1600">
-              <a:solidFill>
-                <a:schemeClr val="tx1"/>
-              </a:solidFill>
-            </a:endParaRPr>
-          </a:p>
-          <a:p>
-            <a:pPr marL="342900" lvl="0" indent="-342900" algn="l" eaLnBrk="1" hangingPunct="1">
-              <a:buFont typeface="Arial" panose="020B0604020202020204" pitchFamily="34" charset="0"/>
-              <a:buChar char="•"/>
-            </a:pPr>
-            <a:r>
-              <a:rPr lang="en-GB" altLang="x-none" sz="1600">
-                <a:solidFill>
-                  <a:schemeClr val="tx1"/>
-                </a:solidFill>
-              </a:rPr>
-              <a:t>Works on Windows and Android</a:t>
-            </a:r>
-            <a:endParaRPr lang="en-GB" altLang="x-none" sz="1600">
-              <a:solidFill>
-                <a:schemeClr val="tx1"/>
-              </a:solidFill>
-            </a:endParaRPr>
-          </a:p>
-          <a:p>
-            <a:pPr marL="342900" lvl="0" indent="-342900" algn="l" eaLnBrk="1" hangingPunct="1">
-              <a:buFont typeface="Arial" panose="020B0604020202020204" pitchFamily="34" charset="0"/>
-              <a:buChar char="•"/>
-            </a:pPr>
-            <a:r>
-              <a:rPr lang="en-GB" altLang="x-none" sz="1600">
-                <a:solidFill>
-                  <a:schemeClr val="tx1"/>
-                </a:solidFill>
-              </a:rPr>
-              <a:t>Wide range of texture assets, sprites, sound effects employed.</a:t>
-            </a:r>
-            <a:endParaRPr lang="en-GB" altLang="x-none" sz="1600">
-              <a:solidFill>
-                <a:schemeClr val="tx1"/>
-              </a:solidFill>
-            </a:endParaRPr>
-          </a:p>
-          <a:p>
-            <a:pPr marL="342900" lvl="0" indent="-342900" algn="l" eaLnBrk="1" hangingPunct="1">
-              <a:buFont typeface="Arial" panose="020B0604020202020204" pitchFamily="34" charset="0"/>
-              <a:buChar char="•"/>
-            </a:pPr>
-            <a:endParaRPr lang="en-GB" altLang="x-none" sz="1600">
-              <a:solidFill>
-                <a:schemeClr val="tx1"/>
-              </a:solidFill>
-            </a:endParaRPr>
-          </a:p>
-          <a:p>
-            <a:pPr marL="0" lvl="0" indent="0" algn="l" eaLnBrk="1" hangingPunct="1">
-              <a:buFont typeface="Arial" panose="020B0604020202020204" pitchFamily="34" charset="0"/>
-              <a:buNone/>
-            </a:pPr>
-            <a:r>
-              <a:rPr lang="en-GB" altLang="x-none" sz="1800">
-                <a:solidFill>
-                  <a:schemeClr val="tx1"/>
-                </a:solidFill>
-              </a:rPr>
-              <a:t>Lastly I had built the game in a scalable way as to make adding additional content and game mechanics easy. For example to create a new Enemy type you simply extend Enemy abstract class, overriding its methods, then you place the new enemy on the TMX map of a level using a TMX file editor then you edit placeObjects() method in the GameScreen class so the new TMX map object is parsed and placed correctly using your new Java enemy class. </a:t>
+              <a:t>Works on  </a:t>
             </a:r>
             <a:endParaRPr lang="en-GB" altLang="x-none" sz="1800">
               <a:solidFill>
@@ -4784,222 +5149,232 @@
               <a:buFont typeface="Arial" panose="020B0604020202020204" pitchFamily="34" charset="0"/>
               <a:buChar char="•"/>
             </a:pPr>
-            <a:endParaRPr lang="en-GB" altLang="x-none" sz="2400">
+            <a:r>
+              <a:rPr lang="en-GB" altLang="x-none" sz="1800">
+                <a:solidFill>
+                  <a:schemeClr val="tx1"/>
+                </a:solidFill>
+              </a:rPr>
+              <a:t>Wide range of texture assets</a:t>
+            </a:r>
+            <a:r>
+              <a:rPr lang="en-US" altLang="en-GB" sz="1800">
+                <a:solidFill>
+                  <a:schemeClr val="tx1"/>
+                </a:solidFill>
+              </a:rPr>
+              <a:t> &amp;</a:t>
+            </a:r>
+            <a:r>
+              <a:rPr lang="en-GB" altLang="x-none" sz="1800">
+                <a:solidFill>
+                  <a:schemeClr val="tx1"/>
+                </a:solidFill>
+              </a:rPr>
+              <a:t> sound effects employed.</a:t>
+            </a:r>
+            <a:endParaRPr lang="en-GB" altLang="x-none" sz="1800">
               <a:solidFill>
-                <a:srgbClr val="002060"/>
+                <a:schemeClr val="tx1"/>
               </a:solidFill>
             </a:endParaRPr>
           </a:p>
-          <a:p>
-            <a:pPr marL="342900" lvl="0" indent="-342900" algn="l" eaLnBrk="1" hangingPunct="1">
-              <a:buFont typeface="Arial" panose="020B0604020202020204" pitchFamily="34" charset="0"/>
-              <a:buChar char="•"/>
-            </a:pPr>
-            <a:endParaRPr lang="en-GB" altLang="x-none" sz="2400">
+        </p:txBody>
+      </p:sp>
+      <p:grpSp>
+        <p:nvGrpSpPr>
+          <p:cNvPr id="58" name="Group 57"/>
+          <p:cNvGrpSpPr/>
+          <p:nvPr/>
+        </p:nvGrpSpPr>
+        <p:grpSpPr>
+          <a:xfrm>
+            <a:off x="7722870" y="3978910"/>
+            <a:ext cx="7118350" cy="5194935"/>
+            <a:chOff x="12134" y="6266"/>
+            <a:chExt cx="11210" cy="7982"/>
+          </a:xfrm>
+        </p:grpSpPr>
+        <p:sp>
+          <p:nvSpPr>
+            <p:cNvPr id="52" name="Rectangle 7"/>
+            <p:cNvSpPr>
+              <a:spLocks noChangeArrowheads="1"/>
+            </p:cNvSpPr>
+            <p:nvPr/>
+          </p:nvSpPr>
+          <p:spPr bwMode="auto">
+            <a:xfrm>
+              <a:off x="12134" y="6266"/>
+              <a:ext cx="11196" cy="7983"/>
+            </a:xfrm>
+            <a:prstGeom prst="rect">
+              <a:avLst/>
+            </a:prstGeom>
+            <a:solidFill>
+              <a:schemeClr val="bg1">
+                <a:alpha val="75000"/>
+              </a:schemeClr>
+            </a:solidFill>
+            <a:ln w="9525">
               <a:solidFill>
-                <a:srgbClr val="002060"/>
+                <a:schemeClr val="tx1"/>
               </a:solidFill>
-            </a:endParaRPr>
-          </a:p>
-          <a:p>
-            <a:pPr marL="800100" lvl="1" indent="-342900" algn="l" eaLnBrk="1" hangingPunct="1">
-              <a:buFont typeface="Arial" panose="020B0604020202020204" pitchFamily="34" charset="0"/>
-              <a:buChar char="•"/>
-            </a:pPr>
-            <a:endParaRPr lang="en-GB" altLang="x-none" sz="2400">
-              <a:solidFill>
-                <a:srgbClr val="002060"/>
-              </a:solidFill>
-            </a:endParaRPr>
-          </a:p>
-          <a:p>
-            <a:pPr marL="800100" lvl="1" indent="-342900" algn="l" eaLnBrk="1" hangingPunct="1">
-              <a:buFont typeface="Arial" panose="020B0604020202020204" pitchFamily="34" charset="0"/>
-              <a:buChar char="•"/>
-            </a:pPr>
-            <a:endParaRPr lang="en-GB" altLang="x-none" sz="2400">
-              <a:solidFill>
-                <a:srgbClr val="002060"/>
-              </a:solidFill>
-            </a:endParaRPr>
-          </a:p>
-          <a:p>
-            <a:pPr marL="800100" lvl="1" indent="-342900" algn="l" eaLnBrk="1" hangingPunct="1">
-              <a:buFont typeface="Arial" panose="020B0604020202020204" pitchFamily="34" charset="0"/>
-              <a:buChar char="•"/>
-            </a:pPr>
-            <a:endParaRPr lang="en-GB" altLang="x-none" sz="2400">
-              <a:solidFill>
-                <a:srgbClr val="002060"/>
-              </a:solidFill>
-            </a:endParaRPr>
-          </a:p>
-        </p:txBody>
-      </p:sp>
-      <p:sp>
-        <p:nvSpPr>
-          <p:cNvPr id="2059" name="TextBox 11"/>
-          <p:cNvSpPr txBox="1">
+              <a:miter lim="800000"/>
+            </a:ln>
+          </p:spPr>
+          <p:txBody>
+            <a:bodyPr/>
+            <a:lstStyle>
+              <a:lvl1pPr eaLnBrk="0" hangingPunct="0">
+                <a:defRPr sz="2900">
+                  <a:solidFill>
+                    <a:schemeClr val="tx1"/>
+                  </a:solidFill>
+                  <a:latin typeface="Arial" panose="020B0604020202020204" pitchFamily="34" charset="0"/>
+                </a:defRPr>
+              </a:lvl1pPr>
+              <a:lvl2pPr marL="742950" indent="-285750" eaLnBrk="0" hangingPunct="0">
+                <a:defRPr sz="2900">
+                  <a:solidFill>
+                    <a:schemeClr val="tx1"/>
+                  </a:solidFill>
+                  <a:latin typeface="Arial" panose="020B0604020202020204" pitchFamily="34" charset="0"/>
+                </a:defRPr>
+              </a:lvl2pPr>
+              <a:lvl3pPr marL="1143000" indent="-228600" eaLnBrk="0" hangingPunct="0">
+                <a:defRPr sz="2900">
+                  <a:solidFill>
+                    <a:schemeClr val="tx1"/>
+                  </a:solidFill>
+                  <a:latin typeface="Arial" panose="020B0604020202020204" pitchFamily="34" charset="0"/>
+                </a:defRPr>
+              </a:lvl3pPr>
+              <a:lvl4pPr marL="1600200" indent="-228600" eaLnBrk="0" hangingPunct="0">
+                <a:defRPr sz="2900">
+                  <a:solidFill>
+                    <a:schemeClr val="tx1"/>
+                  </a:solidFill>
+                  <a:latin typeface="Arial" panose="020B0604020202020204" pitchFamily="34" charset="0"/>
+                </a:defRPr>
+              </a:lvl4pPr>
+              <a:lvl5pPr marL="2057400" indent="-228600" eaLnBrk="0" hangingPunct="0">
+                <a:defRPr sz="2900">
+                  <a:solidFill>
+                    <a:schemeClr val="tx1"/>
+                  </a:solidFill>
+                  <a:latin typeface="Arial" panose="020B0604020202020204" pitchFamily="34" charset="0"/>
+                </a:defRPr>
+              </a:lvl5pPr>
+              <a:lvl6pPr marL="2514600" indent="-228600" eaLnBrk="0" fontAlgn="base" hangingPunct="0">
+                <a:spcBef>
+                  <a:spcPct val="0"/>
+                </a:spcBef>
+                <a:spcAft>
+                  <a:spcPct val="0"/>
+                </a:spcAft>
+                <a:defRPr sz="2900">
+                  <a:solidFill>
+                    <a:schemeClr val="tx1"/>
+                  </a:solidFill>
+                  <a:latin typeface="Arial" panose="020B0604020202020204" pitchFamily="34" charset="0"/>
+                </a:defRPr>
+              </a:lvl6pPr>
+              <a:lvl7pPr marL="2971800" indent="-228600" eaLnBrk="0" fontAlgn="base" hangingPunct="0">
+                <a:spcBef>
+                  <a:spcPct val="0"/>
+                </a:spcBef>
+                <a:spcAft>
+                  <a:spcPct val="0"/>
+                </a:spcAft>
+                <a:defRPr sz="2900">
+                  <a:solidFill>
+                    <a:schemeClr val="tx1"/>
+                  </a:solidFill>
+                  <a:latin typeface="Arial" panose="020B0604020202020204" pitchFamily="34" charset="0"/>
+                </a:defRPr>
+              </a:lvl7pPr>
+              <a:lvl8pPr marL="3429000" indent="-228600" eaLnBrk="0" fontAlgn="base" hangingPunct="0">
+                <a:spcBef>
+                  <a:spcPct val="0"/>
+                </a:spcBef>
+                <a:spcAft>
+                  <a:spcPct val="0"/>
+                </a:spcAft>
+                <a:defRPr sz="2900">
+                  <a:solidFill>
+                    <a:schemeClr val="tx1"/>
+                  </a:solidFill>
+                  <a:latin typeface="Arial" panose="020B0604020202020204" pitchFamily="34" charset="0"/>
+                </a:defRPr>
+              </a:lvl8pPr>
+              <a:lvl9pPr marL="3886200" indent="-228600" eaLnBrk="0" fontAlgn="base" hangingPunct="0">
+                <a:spcBef>
+                  <a:spcPct val="0"/>
+                </a:spcBef>
+                <a:spcAft>
+                  <a:spcPct val="0"/>
+                </a:spcAft>
+                <a:defRPr sz="2900">
+                  <a:solidFill>
+                    <a:schemeClr val="tx1"/>
+                  </a:solidFill>
+                  <a:latin typeface="Arial" panose="020B0604020202020204" pitchFamily="34" charset="0"/>
+                </a:defRPr>
+              </a:lvl9pPr>
+            </a:lstStyle>
+            <a:p>
+              <a:pPr algn="ctr" eaLnBrk="1" hangingPunct="1"/>
+              <a:r>
+                <a:rPr lang="en-US" altLang="en-GB" sz="2000"/>
+                <a:t>Feature Diagram</a:t>
+              </a:r>
+              <a:endParaRPr lang="en-US" altLang="en-GB" sz="1800"/>
+            </a:p>
+          </p:txBody>
+        </p:sp>
+        <p:pic>
+          <p:nvPicPr>
+            <p:cNvPr id="51" name="Picture 50"/>
+            <p:cNvPicPr preferRelativeResize="0">
+              <a:picLocks noChangeAspect="1"/>
+            </p:cNvPicPr>
+            <p:nvPr/>
+          </p:nvPicPr>
+          <p:blipFill>
+            <a:blip r:embed="rId6"/>
+            <a:stretch>
+              <a:fillRect/>
+            </a:stretch>
+          </p:blipFill>
+          <p:spPr>
+            <a:xfrm>
+              <a:off x="12164" y="6833"/>
+              <a:ext cx="11181" cy="7310"/>
+            </a:xfrm>
+            <a:prstGeom prst="rect">
+              <a:avLst/>
+            </a:prstGeom>
+            <a:noFill/>
+            <a:ln>
+              <a:noFill/>
+            </a:ln>
+            <a:effectLst/>
+          </p:spPr>
+        </p:pic>
+      </p:grpSp>
+      <p:sp>
+        <p:nvSpPr>
+          <p:cNvPr id="36" name="Rectangle 7"/>
+          <p:cNvSpPr>
             <a:spLocks noChangeArrowheads="1"/>
           </p:cNvSpPr>
           <p:nvPr/>
         </p:nvSpPr>
         <p:spPr bwMode="auto">
           <a:xfrm>
-            <a:off x="4989513" y="346075"/>
-            <a:ext cx="5286375" cy="983615"/>
-          </a:xfrm>
-          <a:prstGeom prst="rect">
-            <a:avLst/>
-          </a:prstGeom>
-          <a:noFill/>
-          <a:ln>
-            <a:noFill/>
-          </a:ln>
-          <a:extLst>
-            <a:ext uri="{909E8E84-426E-40DD-AFC4-6F175D3DCCD1}">
-              <a14:hiddenFill xmlns:a14="http://schemas.microsoft.com/office/drawing/2010/main">
-                <a:solidFill>
-                  <a:srgbClr val="FFFFFF"/>
-                </a:solidFill>
-              </a14:hiddenFill>
-            </a:ext>
-            <a:ext uri="{91240B29-F687-4F45-9708-019B960494DF}">
-              <a14:hiddenLine xmlns:a14="http://schemas.microsoft.com/office/drawing/2010/main" w="9525">
-                <a:solidFill>
-                  <a:srgbClr val="000000"/>
-                </a:solidFill>
-                <a:miter lim="800000"/>
-                <a:headEnd/>
-                <a:tailEnd/>
-              </a14:hiddenLine>
-            </a:ext>
-          </a:extLst>
-        </p:spPr>
-        <p:txBody>
-          <a:bodyPr>
-            <a:spAutoFit/>
-          </a:bodyPr>
-          <a:lstStyle>
-            <a:lvl1pPr eaLnBrk="0" hangingPunct="0">
-              <a:defRPr sz="2900">
-                <a:solidFill>
-                  <a:schemeClr val="tx1"/>
-                </a:solidFill>
-                <a:latin typeface="Arial" panose="020B0604020202020204" pitchFamily="34" charset="0"/>
-              </a:defRPr>
-            </a:lvl1pPr>
-            <a:lvl2pPr marL="742950" indent="-285750" eaLnBrk="0" hangingPunct="0">
-              <a:defRPr sz="2900">
-                <a:solidFill>
-                  <a:schemeClr val="tx1"/>
-                </a:solidFill>
-                <a:latin typeface="Arial" panose="020B0604020202020204" pitchFamily="34" charset="0"/>
-              </a:defRPr>
-            </a:lvl2pPr>
-            <a:lvl3pPr marL="1143000" indent="-228600" eaLnBrk="0" hangingPunct="0">
-              <a:defRPr sz="2900">
-                <a:solidFill>
-                  <a:schemeClr val="tx1"/>
-                </a:solidFill>
-                <a:latin typeface="Arial" panose="020B0604020202020204" pitchFamily="34" charset="0"/>
-              </a:defRPr>
-            </a:lvl3pPr>
-            <a:lvl4pPr marL="1600200" indent="-228600" eaLnBrk="0" hangingPunct="0">
-              <a:defRPr sz="2900">
-                <a:solidFill>
-                  <a:schemeClr val="tx1"/>
-                </a:solidFill>
-                <a:latin typeface="Arial" panose="020B0604020202020204" pitchFamily="34" charset="0"/>
-              </a:defRPr>
-            </a:lvl4pPr>
-            <a:lvl5pPr marL="2057400" indent="-228600" eaLnBrk="0" hangingPunct="0">
-              <a:defRPr sz="2900">
-                <a:solidFill>
-                  <a:schemeClr val="tx1"/>
-                </a:solidFill>
-                <a:latin typeface="Arial" panose="020B0604020202020204" pitchFamily="34" charset="0"/>
-              </a:defRPr>
-            </a:lvl5pPr>
-            <a:lvl6pPr marL="2514600" indent="-228600" eaLnBrk="0" fontAlgn="base" hangingPunct="0">
-              <a:spcBef>
-                <a:spcPct val="0"/>
-              </a:spcBef>
-              <a:spcAft>
-                <a:spcPct val="0"/>
-              </a:spcAft>
-              <a:defRPr sz="2900">
-                <a:solidFill>
-                  <a:schemeClr val="tx1"/>
-                </a:solidFill>
-                <a:latin typeface="Arial" panose="020B0604020202020204" pitchFamily="34" charset="0"/>
-              </a:defRPr>
-            </a:lvl6pPr>
-            <a:lvl7pPr marL="2971800" indent="-228600" eaLnBrk="0" fontAlgn="base" hangingPunct="0">
-              <a:spcBef>
-                <a:spcPct val="0"/>
-              </a:spcBef>
-              <a:spcAft>
-                <a:spcPct val="0"/>
-              </a:spcAft>
-              <a:defRPr sz="2900">
-                <a:solidFill>
-                  <a:schemeClr val="tx1"/>
-                </a:solidFill>
-                <a:latin typeface="Arial" panose="020B0604020202020204" pitchFamily="34" charset="0"/>
-              </a:defRPr>
-            </a:lvl7pPr>
-            <a:lvl8pPr marL="3429000" indent="-228600" eaLnBrk="0" fontAlgn="base" hangingPunct="0">
-              <a:spcBef>
-                <a:spcPct val="0"/>
-              </a:spcBef>
-              <a:spcAft>
-                <a:spcPct val="0"/>
-              </a:spcAft>
-              <a:defRPr sz="2900">
-                <a:solidFill>
-                  <a:schemeClr val="tx1"/>
-                </a:solidFill>
-                <a:latin typeface="Arial" panose="020B0604020202020204" pitchFamily="34" charset="0"/>
-              </a:defRPr>
-            </a:lvl8pPr>
-            <a:lvl9pPr marL="3886200" indent="-228600" eaLnBrk="0" fontAlgn="base" hangingPunct="0">
-              <a:spcBef>
-                <a:spcPct val="0"/>
-              </a:spcBef>
-              <a:spcAft>
-                <a:spcPct val="0"/>
-              </a:spcAft>
-              <a:defRPr sz="2900">
-                <a:solidFill>
-                  <a:schemeClr val="tx1"/>
-                </a:solidFill>
-                <a:latin typeface="Arial" panose="020B0604020202020204" pitchFamily="34" charset="0"/>
-              </a:defRPr>
-            </a:lvl9pPr>
-          </a:lstStyle>
-          <a:p>
-            <a:pPr algn="ctr" eaLnBrk="1" hangingPunct="1"/>
-            <a:r>
-              <a:rPr lang="en-GB" altLang="en-US"/>
-              <a:t>Recreate a classic arcade game</a:t>
-            </a:r>
-            <a:endParaRPr lang="en-GB" altLang="en-US"/>
-          </a:p>
-        </p:txBody>
-      </p:sp>
-      <p:sp>
-        <p:nvSpPr>
-          <p:cNvPr id="2" name="Rectangle 7"/>
-          <p:cNvSpPr>
-            <a:spLocks noChangeArrowheads="1"/>
-          </p:cNvSpPr>
-          <p:nvPr/>
-        </p:nvSpPr>
-        <p:spPr bwMode="auto">
-          <a:xfrm>
-            <a:off x="216535" y="4410710"/>
-            <a:ext cx="7322820" cy="3140075"/>
+            <a:off x="7741920" y="9235440"/>
+            <a:ext cx="7082155" cy="1149350"/>
           </a:xfrm>
           <a:prstGeom prst="rect">
             <a:avLst/>
@@ -5117,205 +5492,23 @@
             </a:lvl9pPr>
           </a:lstStyle>
           <a:p>
-            <a:pPr algn="ctr" eaLnBrk="1" hangingPunct="1"/>
-            <a:r>
-              <a:rPr lang="en-GB" altLang="en-US" sz="2000"/>
-              <a:t>Why?</a:t>
-            </a:r>
-            <a:endParaRPr lang="en-GB" altLang="en-US" sz="2000"/>
-          </a:p>
-          <a:p>
-            <a:pPr algn="just" eaLnBrk="1" hangingPunct="1"/>
-            <a:r>
-              <a:rPr lang="en-GB" altLang="en-US" sz="1800">
-                <a:sym typeface="+mn-ea"/>
-              </a:rPr>
-              <a:t>When I was younger I enjoyed platformers such as Donkey Kong and Mario. Although my issue with these games was that they were too basic and were missing something. </a:t>
-            </a:r>
-            <a:r>
-              <a:rPr lang="en-US" altLang="x-none" sz="1800">
-                <a:sym typeface="+mn-ea"/>
-              </a:rPr>
-              <a:t>This had </a:t>
-            </a:r>
-            <a:r>
-              <a:rPr lang="en-GB" altLang="en-US" sz="1800">
-                <a:sym typeface="+mn-ea"/>
-              </a:rPr>
-              <a:t>influenced </a:t>
-            </a:r>
-            <a:r>
-              <a:rPr lang="en-US" altLang="x-none" sz="1800">
-                <a:sym typeface="+mn-ea"/>
-              </a:rPr>
-              <a:t>me to to recreate the classic side-scrolling Super Mario Bros experience with my own twist on the formula. My game will take</a:t>
-            </a:r>
-            <a:r>
-              <a:rPr lang="en-GB" altLang="en-US" sz="1800">
-                <a:sym typeface="+mn-ea"/>
-              </a:rPr>
-              <a:t> a different design</a:t>
-            </a:r>
-            <a:r>
-              <a:rPr lang="en-US" altLang="x-none" sz="1800">
-                <a:sym typeface="+mn-ea"/>
-              </a:rPr>
-              <a:t> approach. </a:t>
-            </a:r>
-            <a:r>
-              <a:rPr lang="en-GB" altLang="en-US" sz="1800">
-                <a:sym typeface="+mn-ea"/>
-              </a:rPr>
-              <a:t>Furthermore despite the Mobile market being perfect for a casual side-scrolling platforming game there aren’t many such games. </a:t>
-            </a:r>
-            <a:endParaRPr lang="en-US" altLang="x-none" sz="1800"/>
-          </a:p>
-          <a:p>
-            <a:pPr algn="ctr" eaLnBrk="1" hangingPunct="1"/>
-            <a:endParaRPr lang="en-US" altLang="x-none" sz="1800"/>
-          </a:p>
-        </p:txBody>
-      </p:sp>
-      <p:sp>
-        <p:nvSpPr>
-          <p:cNvPr id="9" name="Rectangle 7"/>
-          <p:cNvSpPr>
-            <a:spLocks noChangeArrowheads="1"/>
-          </p:cNvSpPr>
-          <p:nvPr/>
-        </p:nvSpPr>
-        <p:spPr bwMode="auto">
-          <a:xfrm>
-            <a:off x="217170" y="7651115"/>
-            <a:ext cx="7322185" cy="2708910"/>
-          </a:xfrm>
-          <a:prstGeom prst="rect">
-            <a:avLst/>
-          </a:prstGeom>
-          <a:solidFill>
-            <a:schemeClr val="bg1">
-              <a:alpha val="75000"/>
-            </a:schemeClr>
-          </a:solidFill>
-          <a:ln w="9525">
-            <a:solidFill>
-              <a:schemeClr val="tx1"/>
-            </a:solidFill>
-            <a:miter lim="800000"/>
-          </a:ln>
-        </p:spPr>
-        <p:txBody>
-          <a:bodyPr/>
-          <a:lstStyle>
-            <a:lvl1pPr eaLnBrk="0" hangingPunct="0">
-              <a:defRPr sz="2900">
-                <a:solidFill>
-                  <a:schemeClr val="tx1"/>
-                </a:solidFill>
-                <a:latin typeface="Arial" panose="020B0604020202020204" pitchFamily="34" charset="0"/>
-              </a:defRPr>
-            </a:lvl1pPr>
-            <a:lvl2pPr marL="742950" indent="-285750" eaLnBrk="0" hangingPunct="0">
-              <a:defRPr sz="2900">
-                <a:solidFill>
-                  <a:schemeClr val="tx1"/>
-                </a:solidFill>
-                <a:latin typeface="Arial" panose="020B0604020202020204" pitchFamily="34" charset="0"/>
-              </a:defRPr>
-            </a:lvl2pPr>
-            <a:lvl3pPr marL="1143000" indent="-228600" eaLnBrk="0" hangingPunct="0">
-              <a:defRPr sz="2900">
-                <a:solidFill>
-                  <a:schemeClr val="tx1"/>
-                </a:solidFill>
-                <a:latin typeface="Arial" panose="020B0604020202020204" pitchFamily="34" charset="0"/>
-              </a:defRPr>
-            </a:lvl3pPr>
-            <a:lvl4pPr marL="1600200" indent="-228600" eaLnBrk="0" hangingPunct="0">
-              <a:defRPr sz="2900">
-                <a:solidFill>
-                  <a:schemeClr val="tx1"/>
-                </a:solidFill>
-                <a:latin typeface="Arial" panose="020B0604020202020204" pitchFamily="34" charset="0"/>
-              </a:defRPr>
-            </a:lvl4pPr>
-            <a:lvl5pPr marL="2057400" indent="-228600" eaLnBrk="0" hangingPunct="0">
-              <a:defRPr sz="2900">
-                <a:solidFill>
-                  <a:schemeClr val="tx1"/>
-                </a:solidFill>
-                <a:latin typeface="Arial" panose="020B0604020202020204" pitchFamily="34" charset="0"/>
-              </a:defRPr>
-            </a:lvl5pPr>
-            <a:lvl6pPr marL="2514600" indent="-228600" eaLnBrk="0" fontAlgn="base" hangingPunct="0">
-              <a:spcBef>
-                <a:spcPct val="0"/>
-              </a:spcBef>
-              <a:spcAft>
-                <a:spcPct val="0"/>
-              </a:spcAft>
-              <a:defRPr sz="2900">
-                <a:solidFill>
-                  <a:schemeClr val="tx1"/>
-                </a:solidFill>
-                <a:latin typeface="Arial" panose="020B0604020202020204" pitchFamily="34" charset="0"/>
-              </a:defRPr>
-            </a:lvl6pPr>
-            <a:lvl7pPr marL="2971800" indent="-228600" eaLnBrk="0" fontAlgn="base" hangingPunct="0">
-              <a:spcBef>
-                <a:spcPct val="0"/>
-              </a:spcBef>
-              <a:spcAft>
-                <a:spcPct val="0"/>
-              </a:spcAft>
-              <a:defRPr sz="2900">
-                <a:solidFill>
-                  <a:schemeClr val="tx1"/>
-                </a:solidFill>
-                <a:latin typeface="Arial" panose="020B0604020202020204" pitchFamily="34" charset="0"/>
-              </a:defRPr>
-            </a:lvl7pPr>
-            <a:lvl8pPr marL="3429000" indent="-228600" eaLnBrk="0" fontAlgn="base" hangingPunct="0">
-              <a:spcBef>
-                <a:spcPct val="0"/>
-              </a:spcBef>
-              <a:spcAft>
-                <a:spcPct val="0"/>
-              </a:spcAft>
-              <a:defRPr sz="2900">
-                <a:solidFill>
-                  <a:schemeClr val="tx1"/>
-                </a:solidFill>
-                <a:latin typeface="Arial" panose="020B0604020202020204" pitchFamily="34" charset="0"/>
-              </a:defRPr>
-            </a:lvl8pPr>
-            <a:lvl9pPr marL="3886200" indent="-228600" eaLnBrk="0" fontAlgn="base" hangingPunct="0">
-              <a:spcBef>
-                <a:spcPct val="0"/>
-              </a:spcBef>
-              <a:spcAft>
-                <a:spcPct val="0"/>
-              </a:spcAft>
-              <a:defRPr sz="2900">
-                <a:solidFill>
-                  <a:schemeClr val="tx1"/>
-                </a:solidFill>
-                <a:latin typeface="Arial" panose="020B0604020202020204" pitchFamily="34" charset="0"/>
-              </a:defRPr>
-            </a:lvl9pPr>
-          </a:lstStyle>
-          <a:p>
-            <a:pPr marL="0" indent="0" algn="ctr" eaLnBrk="1" hangingPunct="1">
+            <a:pPr marL="457200" lvl="1" indent="0" algn="ctr" eaLnBrk="1" hangingPunct="1">
               <a:buFont typeface="Arial" panose="020B0604020202020204" pitchFamily="34" charset="0"/>
               <a:buNone/>
             </a:pPr>
             <a:r>
+              <a:rPr lang="en-US" altLang="en-GB" sz="2000" b="1">
+                <a:sym typeface="+mn-ea"/>
+              </a:rPr>
+              <a:t>How?</a:t>
+            </a:r>
+            <a:r>
               <a:rPr lang="en-US" altLang="en-GB" sz="1800">
                 <a:sym typeface="+mn-ea"/>
               </a:rPr>
-              <a:t>Things still to do.</a:t>
-            </a:r>
-            <a:endParaRPr lang="en-GB" altLang="en-US" sz="1800">
+              <a:t> </a:t>
+            </a:r>
+            <a:endParaRPr lang="en-US" altLang="en-GB" sz="1800">
               <a:sym typeface="+mn-ea"/>
             </a:endParaRPr>
           </a:p>
@@ -5328,13 +5521,7 @@
               <a:rPr lang="en-US" altLang="en-GB" sz="1800">
                 <a:sym typeface="+mn-ea"/>
               </a:rPr>
-              <a:t>R</a:t>
-            </a:r>
-            <a:r>
-              <a:rPr lang="en-GB" altLang="en-US" sz="1800">
-                <a:sym typeface="+mn-ea"/>
-              </a:rPr>
-              <a:t>elease the game on the Android app store.</a:t>
+              <a:t>Built on</a:t>
             </a:r>
             <a:endParaRPr lang="en-GB" altLang="en-US" sz="1800">
               <a:sym typeface="+mn-ea"/>
@@ -5349,63 +5536,9 @@
               <a:rPr lang="en-US" altLang="en-GB" sz="1800">
                 <a:sym typeface="+mn-ea"/>
               </a:rPr>
-              <a:t>Online highscores saving using an SQL database.</a:t>
-            </a:r>
-            <a:endParaRPr lang="en-US" altLang="en-GB" sz="1800">
-              <a:sym typeface="+mn-ea"/>
-            </a:endParaRPr>
-          </a:p>
-          <a:p>
-            <a:pPr marL="285750" indent="-285750" algn="just" eaLnBrk="1" hangingPunct="1">
-              <a:buFont typeface="Arial" panose="020B0604020202020204" pitchFamily="34" charset="0"/>
-              <a:buChar char="•"/>
-            </a:pPr>
-            <a:r>
-              <a:rPr lang="en-US" altLang="en-GB" sz="1800">
-                <a:sym typeface="+mn-ea"/>
-              </a:rPr>
-              <a:t>More levels</a:t>
-            </a:r>
-            <a:endParaRPr lang="en-US" altLang="en-GB" sz="1800">
-              <a:sym typeface="+mn-ea"/>
-            </a:endParaRPr>
-          </a:p>
-          <a:p>
-            <a:pPr marL="285750" indent="-285750" algn="l" eaLnBrk="1" hangingPunct="1">
-              <a:buFont typeface="Arial" panose="020B0604020202020204" pitchFamily="34" charset="0"/>
-              <a:buChar char="•"/>
-            </a:pPr>
-            <a:r>
-              <a:rPr lang="en-US" altLang="en-GB" sz="1800">
-                <a:sym typeface="+mn-ea"/>
-              </a:rPr>
-              <a:t>Endless ‘survival’ game-mode with an infinite procedureally generated map.</a:t>
-            </a:r>
-            <a:endParaRPr lang="en-US" altLang="en-GB" sz="1800">
-              <a:sym typeface="+mn-ea"/>
-            </a:endParaRPr>
-          </a:p>
-          <a:p>
-            <a:pPr marL="285750" indent="-285750" algn="l" eaLnBrk="1" hangingPunct="1">
-              <a:buFont typeface="Arial" panose="020B0604020202020204" pitchFamily="34" charset="0"/>
-              <a:buChar char="•"/>
-            </a:pPr>
-            <a:r>
-              <a:rPr lang="en-US" altLang="en-GB" sz="1800">
-                <a:sym typeface="+mn-ea"/>
-              </a:rPr>
-              <a:t>More types of and better enemy AI</a:t>
-            </a:r>
-            <a:endParaRPr lang="en-US" altLang="en-GB" sz="1800">
-              <a:sym typeface="+mn-ea"/>
-            </a:endParaRPr>
-          </a:p>
-          <a:p>
-            <a:pPr marL="285750" indent="-285750" algn="just" eaLnBrk="1" hangingPunct="1">
-              <a:buFont typeface="Arial" panose="020B0604020202020204" pitchFamily="34" charset="0"/>
-              <a:buChar char="•"/>
-            </a:pPr>
-            <a:endParaRPr lang="en-US" altLang="en-GB" sz="1800">
+              <a:t>Using</a:t>
+            </a:r>
+            <a:endParaRPr lang="en-GB" altLang="en-US" sz="1800">
               <a:sym typeface="+mn-ea"/>
             </a:endParaRPr>
           </a:p>
@@ -5423,46 +5556,169 @@
               <a:buFont typeface="Arial" panose="020B0604020202020204" pitchFamily="34" charset="0"/>
               <a:buChar char="•"/>
             </a:pPr>
-            <a:endParaRPr lang="en-GB" altLang="en-US" sz="1800">
-              <a:sym typeface="+mn-ea"/>
-            </a:endParaRPr>
-          </a:p>
-          <a:p>
-            <a:pPr marL="285750" indent="-285750" algn="just" eaLnBrk="1" hangingPunct="1">
-              <a:buFont typeface="Arial" panose="020B0604020202020204" pitchFamily="34" charset="0"/>
-              <a:buChar char="•"/>
-            </a:pPr>
-            <a:endParaRPr lang="en-GB" altLang="en-US" sz="1800">
-              <a:sym typeface="+mn-ea"/>
-            </a:endParaRPr>
-          </a:p>
-          <a:p>
-            <a:pPr marL="285750" indent="-285750" algn="just" eaLnBrk="1" hangingPunct="1">
-              <a:buFont typeface="Arial" panose="020B0604020202020204" pitchFamily="34" charset="0"/>
-              <a:buChar char="•"/>
-            </a:pPr>
-            <a:endParaRPr lang="en-GB" altLang="en-US" sz="1800">
-              <a:sym typeface="+mn-ea"/>
-            </a:endParaRPr>
-          </a:p>
-          <a:p>
-            <a:pPr marL="285750" indent="-285750" algn="just" eaLnBrk="1" hangingPunct="1">
-              <a:buFont typeface="Arial" panose="020B0604020202020204" pitchFamily="34" charset="0"/>
-              <a:buChar char="•"/>
-            </a:pPr>
-            <a:endParaRPr lang="en-GB" altLang="en-US" sz="1800">
-              <a:sym typeface="+mn-ea"/>
-            </a:endParaRPr>
-          </a:p>
-          <a:p>
-            <a:pPr marL="285750" indent="-285750" algn="just" eaLnBrk="1" hangingPunct="1">
-              <a:buFont typeface="Arial" panose="020B0604020202020204" pitchFamily="34" charset="0"/>
-              <a:buChar char="•"/>
-            </a:pPr>
             <a:endParaRPr lang="en-US" altLang="x-none" sz="1800"/>
           </a:p>
         </p:txBody>
       </p:sp>
+      <p:grpSp>
+        <p:nvGrpSpPr>
+          <p:cNvPr id="39" name="Group 38"/>
+          <p:cNvGrpSpPr/>
+          <p:nvPr/>
+        </p:nvGrpSpPr>
+        <p:grpSpPr>
+          <a:xfrm>
+            <a:off x="8836025" y="9405620"/>
+            <a:ext cx="2160270" cy="862330"/>
+            <a:chOff x="13835" y="11864"/>
+            <a:chExt cx="3402" cy="1358"/>
+          </a:xfrm>
+        </p:grpSpPr>
+        <p:pic>
+          <p:nvPicPr>
+            <p:cNvPr id="37" name="Picture 36" descr="opengl-es-khronos-group-webgl-opengl-shading-language-others-08ee3a821bc684ef3ad7ee877a3ed2a8"/>
+            <p:cNvPicPr>
+              <a:picLocks noChangeAspect="1"/>
+            </p:cNvPicPr>
+            <p:nvPr/>
+          </p:nvPicPr>
+          <p:blipFill>
+            <a:blip r:embed="rId7"/>
+            <a:stretch>
+              <a:fillRect/>
+            </a:stretch>
+          </p:blipFill>
+          <p:spPr>
+            <a:xfrm>
+              <a:off x="16217" y="11864"/>
+              <a:ext cx="1020" cy="766"/>
+            </a:xfrm>
+            <a:prstGeom prst="rect">
+              <a:avLst/>
+            </a:prstGeom>
+          </p:spPr>
+        </p:pic>
+        <p:pic>
+          <p:nvPicPr>
+            <p:cNvPr id="38" name="Picture 37"/>
+            <p:cNvPicPr>
+              <a:picLocks noChangeAspect="1"/>
+            </p:cNvPicPr>
+            <p:nvPr/>
+          </p:nvPicPr>
+          <p:blipFill>
+            <a:blip r:embed="rId8"/>
+            <a:stretch>
+              <a:fillRect/>
+            </a:stretch>
+          </p:blipFill>
+          <p:spPr>
+            <a:xfrm>
+              <a:off x="14103" y="12049"/>
+              <a:ext cx="2000" cy="397"/>
+            </a:xfrm>
+            <a:prstGeom prst="rect">
+              <a:avLst/>
+            </a:prstGeom>
+          </p:spPr>
+        </p:pic>
+        <p:pic>
+          <p:nvPicPr>
+            <p:cNvPr id="24" name="Picture 23"/>
+            <p:cNvPicPr>
+              <a:picLocks noChangeAspect="1"/>
+            </p:cNvPicPr>
+            <p:nvPr/>
+          </p:nvPicPr>
+          <p:blipFill>
+            <a:blip r:embed="rId9"/>
+            <a:stretch>
+              <a:fillRect/>
+            </a:stretch>
+          </p:blipFill>
+          <p:spPr>
+            <a:xfrm>
+              <a:off x="14629" y="12530"/>
+              <a:ext cx="410" cy="693"/>
+            </a:xfrm>
+            <a:prstGeom prst="rect">
+              <a:avLst/>
+            </a:prstGeom>
+          </p:spPr>
+        </p:pic>
+        <p:pic>
+          <p:nvPicPr>
+            <p:cNvPr id="22" name="Picture 21"/>
+            <p:cNvPicPr>
+              <a:picLocks noChangeAspect="1"/>
+            </p:cNvPicPr>
+            <p:nvPr/>
+          </p:nvPicPr>
+          <p:blipFill>
+            <a:blip r:embed="rId10"/>
+            <a:stretch>
+              <a:fillRect/>
+            </a:stretch>
+          </p:blipFill>
+          <p:spPr>
+            <a:xfrm>
+              <a:off x="13835" y="12530"/>
+              <a:ext cx="607" cy="607"/>
+            </a:xfrm>
+            <a:prstGeom prst="rect">
+              <a:avLst/>
+            </a:prstGeom>
+          </p:spPr>
+        </p:pic>
+      </p:grpSp>
+      <p:pic>
+        <p:nvPicPr>
+          <p:cNvPr id="19" name="Picture 18"/>
+          <p:cNvPicPr>
+            <a:picLocks noChangeAspect="1"/>
+          </p:cNvPicPr>
+          <p:nvPr/>
+        </p:nvPicPr>
+        <p:blipFill>
+          <a:blip r:embed="rId11"/>
+          <a:stretch>
+            <a:fillRect/>
+          </a:stretch>
+        </p:blipFill>
+        <p:spPr>
+          <a:xfrm>
+            <a:off x="9217025" y="2927985"/>
+            <a:ext cx="1423035" cy="269875"/>
+          </a:xfrm>
+          <a:prstGeom prst="rect">
+            <a:avLst/>
+          </a:prstGeom>
+        </p:spPr>
+      </p:pic>
+      <p:pic>
+        <p:nvPicPr>
+          <p:cNvPr id="20" name="Picture 19"/>
+          <p:cNvPicPr>
+            <a:picLocks noChangeAspect="1"/>
+          </p:cNvPicPr>
+          <p:nvPr/>
+        </p:nvPicPr>
+        <p:blipFill>
+          <a:blip r:embed="rId12"/>
+          <a:stretch>
+            <a:fillRect/>
+          </a:stretch>
+        </p:blipFill>
+        <p:spPr>
+          <a:xfrm>
+            <a:off x="10676890" y="2903220"/>
+            <a:ext cx="319405" cy="319405"/>
+          </a:xfrm>
+          <a:prstGeom prst="rect">
+            <a:avLst/>
+          </a:prstGeom>
+        </p:spPr>
+      </p:pic>
     </p:spTree>
   </p:cSld>
   <p:clrMapOvr>

</xml_diff>

<commit_message>
Final version of poster created
</commit_message>
<xml_diff>
--- a/CE301 Open Day Poster.pptx
+++ b/CE301 Open Day Poster.pptx
@@ -519,17 +519,6 @@
         <p:txBody>
           <a:bodyPr/>
           <a:p>
-            <a:r>
-              <a:rPr lang="en-US" altLang="en-GB"/>
-              <a:t>aims and objectives, diagram of sorts for technical achievements, more visual description of tech achievements BREAK it down more, break it down into more sections, use symbols to show which tech I use.</a:t>
-            </a:r>
-            <a:endParaRPr lang="en-US" altLang="en-GB"/>
-          </a:p>
-          <a:p>
-            <a:r>
-              <a:rPr lang="en-US" altLang="en-GB"/>
-              <a:t>Break down into points rather than big paragraphs</a:t>
-            </a:r>
             <a:endParaRPr lang="en-US" altLang="en-GB"/>
           </a:p>
         </p:txBody>
@@ -4153,8 +4142,8 @@
         </p:blipFill>
         <p:spPr>
           <a:xfrm>
-            <a:off x="288290" y="5818505"/>
-            <a:ext cx="3923665" cy="2111375"/>
+            <a:off x="216535" y="4626610"/>
+            <a:ext cx="4425315" cy="2465070"/>
           </a:xfrm>
           <a:prstGeom prst="rect">
             <a:avLst/>
@@ -4172,7 +4161,7 @@
         <p:spPr bwMode="auto">
           <a:xfrm>
             <a:off x="216535" y="2322195"/>
-            <a:ext cx="7322820" cy="1482090"/>
+            <a:ext cx="8976995" cy="875030"/>
           </a:xfrm>
           <a:prstGeom prst="rect">
             <a:avLst/>
@@ -4292,26 +4281,38 @@
           <a:p>
             <a:pPr algn="ctr" eaLnBrk="1" hangingPunct="1"/>
             <a:r>
-              <a:rPr lang="en-GB" altLang="en-US" sz="2000" b="1"/>
+              <a:rPr lang="en-GB" altLang="en-US" sz="1800" b="1"/>
               <a:t>What?</a:t>
             </a:r>
-            <a:endParaRPr lang="en-US" altLang="x-none" sz="2000" b="1"/>
+            <a:endParaRPr lang="en-US" altLang="x-none" sz="1800" b="1"/>
           </a:p>
           <a:p>
             <a:pPr algn="just" eaLnBrk="1" hangingPunct="1"/>
             <a:r>
-              <a:rPr lang="en-US" altLang="x-none" sz="1800"/>
+              <a:rPr lang="en-US" altLang="x-none" sz="1600"/>
               <a:t>My project goals have been to create a </a:t>
             </a:r>
             <a:r>
-              <a:rPr lang="en-GB" altLang="en-US" sz="1800"/>
-              <a:t>side-scrolling 2D </a:t>
-            </a:r>
-            <a:r>
-              <a:rPr lang="en-US" altLang="x-none" sz="1800"/>
-              <a:t>Mario game with lite RPG-elements such as friendly NPCs, a text based story narrative and a basic inventory system. </a:t>
-            </a:r>
-            <a:endParaRPr lang="en-US" altLang="x-none" sz="1800"/>
+              <a:rPr lang="en-GB" altLang="en-US" sz="1600"/>
+              <a:t>side-scrolling 2D platformer </a:t>
+            </a:r>
+            <a:r>
+              <a:rPr lang="en-US" altLang="x-none" sz="1600"/>
+              <a:t>Mario</a:t>
+            </a:r>
+            <a:r>
+              <a:rPr lang="en-GB" altLang="en-US" sz="1600"/>
+              <a:t>-</a:t>
+            </a:r>
+            <a:r>
+              <a:rPr lang="en-GB" sz="1600"/>
+              <a:t>inspired </a:t>
+            </a:r>
+            <a:r>
+              <a:rPr lang="en-US" altLang="x-none" sz="1600"/>
+              <a:t>game with lite RPG-elements such as friendly NPCs, a text based story narrative and a basic inventory system. </a:t>
+            </a:r>
+            <a:endParaRPr lang="en-US" altLang="x-none" sz="1600"/>
           </a:p>
         </p:txBody>
       </p:sp>
@@ -4483,8 +4484,8 @@
         </p:blipFill>
         <p:spPr>
           <a:xfrm>
-            <a:off x="4248785" y="5818505"/>
-            <a:ext cx="2553335" cy="2042160"/>
+            <a:off x="5050155" y="5074920"/>
+            <a:ext cx="4143375" cy="2016760"/>
           </a:xfrm>
           <a:prstGeom prst="rect">
             <a:avLst/>
@@ -4501,8 +4502,8 @@
         </p:nvSpPr>
         <p:spPr bwMode="auto">
           <a:xfrm>
-            <a:off x="217170" y="3978910"/>
-            <a:ext cx="7322820" cy="1866265"/>
+            <a:off x="216535" y="3284220"/>
+            <a:ext cx="8976995" cy="2182495"/>
           </a:xfrm>
           <a:prstGeom prst="rect">
             <a:avLst/>
@@ -4622,42 +4623,76 @@
           <a:p>
             <a:pPr algn="ctr" eaLnBrk="1" hangingPunct="1"/>
             <a:r>
+              <a:rPr lang="en-GB" altLang="en-US" sz="1800" b="1"/>
+              <a:t>Why</a:t>
+            </a:r>
+            <a:r>
               <a:rPr lang="en-GB" altLang="en-US" sz="2000" b="1"/>
-              <a:t>Why?</a:t>
+              <a:t>?</a:t>
             </a:r>
             <a:endParaRPr lang="en-GB" altLang="en-US" sz="2000" b="1"/>
           </a:p>
           <a:p>
             <a:pPr algn="just" eaLnBrk="1" hangingPunct="1"/>
             <a:r>
-              <a:rPr lang="en-GB" altLang="en-US" sz="1800">
+              <a:rPr lang="en-GB" altLang="en-US" sz="1600">
                 <a:sym typeface="+mn-ea"/>
               </a:rPr>
-              <a:t>When I was younger I enjoyed platformers such as Donkey Kong and Mario. Although my issue with these games was that they were too basic and were missing something. </a:t>
-            </a:r>
-            <a:r>
-              <a:rPr lang="en-US" altLang="x-none" sz="1800">
+              <a:t>When I was younger I enjoyed platformers such as Donkey Kong and Mario. Although my issue with these games was that they were too basic </a:t>
+            </a:r>
+            <a:r>
+              <a:rPr lang="en-GB" altLang="en-US" sz="1600">
+                <a:sym typeface="+mn-ea"/>
+              </a:rPr>
+              <a:t>and felt that they were missing something </a:t>
+            </a:r>
+            <a:r>
+              <a:rPr lang="en-GB" altLang="en-US" sz="1600">
+                <a:sym typeface="+mn-ea"/>
+              </a:rPr>
+              <a:t>due to having a low amount of interactivity with the game world, eg there were no NPCs to talk to or anything other than avoiding/killing your enemies and reaching the end of the level. . </a:t>
+            </a:r>
+            <a:r>
+              <a:rPr lang="en-US" altLang="x-none" sz="1600">
                 <a:sym typeface="+mn-ea"/>
               </a:rPr>
               <a:t>This had </a:t>
             </a:r>
             <a:r>
-              <a:rPr lang="en-GB" altLang="en-US" sz="1800">
+              <a:rPr lang="en-GB" altLang="en-US" sz="1600">
                 <a:sym typeface="+mn-ea"/>
               </a:rPr>
               <a:t>influenced </a:t>
             </a:r>
             <a:r>
-              <a:rPr lang="en-US" altLang="x-none" sz="1800">
+              <a:rPr lang="en-US" altLang="x-none" sz="1600">
                 <a:sym typeface="+mn-ea"/>
               </a:rPr>
-              <a:t>me to to recreate the classic side-scrolling Super Mario Bros experience with my own twist on the formula. </a:t>
-            </a:r>
-            <a:endParaRPr lang="en-US" altLang="x-none" sz="1800"/>
+              <a:t>me to to recreate the classic side-scrolling Super Mario Bros experience with my own</a:t>
+            </a:r>
+            <a:r>
+              <a:rPr lang="en-GB" altLang="en-US" sz="1600">
+                <a:sym typeface="+mn-ea"/>
+              </a:rPr>
+              <a:t> RPG</a:t>
+            </a:r>
+            <a:r>
+              <a:rPr lang="en-US" altLang="x-none" sz="1600">
+                <a:sym typeface="+mn-ea"/>
+              </a:rPr>
+              <a:t> twist on the formula</a:t>
+            </a:r>
+            <a:r>
+              <a:rPr lang="en-GB" altLang="en-US" sz="1600">
+                <a:sym typeface="+mn-ea"/>
+              </a:rPr>
+              <a:t> and releasing the game on Android which doesn’t actually have many side-scrolling platformers despite being a perfect fit for the genre.</a:t>
+            </a:r>
+            <a:endParaRPr lang="en-US" altLang="x-none" sz="1600"/>
           </a:p>
           <a:p>
             <a:pPr algn="ctr" eaLnBrk="1" hangingPunct="1"/>
-            <a:endParaRPr lang="en-US" altLang="x-none" sz="1800"/>
+            <a:endParaRPr lang="en-US" altLang="x-none" sz="1600"/>
           </a:p>
         </p:txBody>
       </p:sp>
@@ -4671,8 +4706,8 @@
         </p:nvSpPr>
         <p:spPr bwMode="auto">
           <a:xfrm>
-            <a:off x="189230" y="7867015"/>
-            <a:ext cx="7322185" cy="2605405"/>
+            <a:off x="216535" y="8922385"/>
+            <a:ext cx="8976995" cy="1533525"/>
           </a:xfrm>
           <a:prstGeom prst="rect">
             <a:avLst/>
@@ -4795,12 +4830,12 @@
               <a:buNone/>
             </a:pPr>
             <a:r>
-              <a:rPr lang="en-US" altLang="en-GB" sz="2000" b="1">
+              <a:rPr lang="en-US" altLang="en-GB" sz="1800" b="1">
                 <a:sym typeface="+mn-ea"/>
               </a:rPr>
               <a:t>Ongoing work</a:t>
             </a:r>
-            <a:endParaRPr lang="en-US" altLang="en-GB" sz="2000" b="1">
+            <a:endParaRPr lang="en-US" altLang="en-GB" sz="1800" b="1">
               <a:sym typeface="+mn-ea"/>
             </a:endParaRPr>
           </a:p>
@@ -4810,18 +4845,12 @@
               <a:buChar char="•"/>
             </a:pPr>
             <a:r>
-              <a:rPr lang="en-US" altLang="en-GB" sz="1800">
+              <a:rPr lang="en-US" altLang="en-GB" sz="1600">
                 <a:sym typeface="+mn-ea"/>
               </a:rPr>
-              <a:t>R</a:t>
-            </a:r>
-            <a:r>
-              <a:rPr lang="en-GB" altLang="en-US" sz="1800">
-                <a:sym typeface="+mn-ea"/>
-              </a:rPr>
-              <a:t>elease the game on the Android app store.</a:t>
-            </a:r>
-            <a:endParaRPr lang="en-GB" altLang="en-US" sz="1800">
+              <a:t>Online highscores saving using an SQL database.</a:t>
+            </a:r>
+            <a:endParaRPr lang="en-US" altLang="en-GB" sz="1600">
               <a:sym typeface="+mn-ea"/>
             </a:endParaRPr>
           </a:p>
@@ -4831,27 +4860,12 @@
               <a:buChar char="•"/>
             </a:pPr>
             <a:r>
-              <a:rPr lang="en-US" altLang="en-GB" sz="1800">
-                <a:sym typeface="+mn-ea"/>
-              </a:rPr>
-              <a:t>Online highscores saving using an SQL database.</a:t>
-            </a:r>
-            <a:endParaRPr lang="en-US" altLang="en-GB" sz="1800">
-              <a:sym typeface="+mn-ea"/>
-            </a:endParaRPr>
-          </a:p>
-          <a:p>
-            <a:pPr marL="285750" indent="-285750" algn="just" eaLnBrk="1" hangingPunct="1">
-              <a:buFont typeface="Arial" panose="020B0604020202020204" pitchFamily="34" charset="0"/>
-              <a:buChar char="•"/>
-            </a:pPr>
-            <a:r>
-              <a:rPr lang="en-US" altLang="en-GB" sz="1800">
+              <a:rPr lang="en-US" altLang="en-GB" sz="1600">
                 <a:sym typeface="+mn-ea"/>
               </a:rPr>
               <a:t>More levels.</a:t>
             </a:r>
-            <a:endParaRPr lang="en-US" altLang="en-GB" sz="1800">
+            <a:endParaRPr lang="en-US" altLang="en-GB" sz="1600">
               <a:sym typeface="+mn-ea"/>
             </a:endParaRPr>
           </a:p>
@@ -4861,12 +4875,12 @@
               <a:buChar char="•"/>
             </a:pPr>
             <a:r>
-              <a:rPr lang="en-US" altLang="en-GB" sz="1800">
+              <a:rPr lang="en-US" altLang="en-GB" sz="1600">
                 <a:sym typeface="+mn-ea"/>
               </a:rPr>
               <a:t>Endless ‘survival’ game-mode with an infinite procedureally generated map.</a:t>
             </a:r>
-            <a:endParaRPr lang="en-US" altLang="en-GB" sz="1800">
+            <a:endParaRPr lang="en-US" altLang="en-GB" sz="1600">
               <a:sym typeface="+mn-ea"/>
             </a:endParaRPr>
           </a:p>
@@ -4876,12 +4890,27 @@
               <a:buChar char="•"/>
             </a:pPr>
             <a:r>
-              <a:rPr lang="en-US" altLang="en-GB" sz="1800">
+              <a:rPr lang="en-US" altLang="en-GB" sz="1600">
                 <a:sym typeface="+mn-ea"/>
               </a:rPr>
               <a:t>More types of and better enemy AI agents.</a:t>
             </a:r>
-            <a:endParaRPr lang="en-US" altLang="en-GB" sz="1800">
+            <a:endParaRPr lang="en-US" altLang="en-GB" sz="1600">
+              <a:sym typeface="+mn-ea"/>
+            </a:endParaRPr>
+          </a:p>
+          <a:p>
+            <a:pPr marL="285750" indent="-285750" algn="l" eaLnBrk="1" hangingPunct="1">
+              <a:buFont typeface="Arial" panose="020B0604020202020204" pitchFamily="34" charset="0"/>
+              <a:buChar char="•"/>
+            </a:pPr>
+            <a:r>
+              <a:rPr lang="en-GB" altLang="en-US" sz="1600">
+                <a:sym typeface="+mn-ea"/>
+              </a:rPr>
+              <a:t>More power-ups.</a:t>
+            </a:r>
+            <a:endParaRPr lang="en-US" altLang="en-GB" sz="1600">
               <a:sym typeface="+mn-ea"/>
             </a:endParaRPr>
           </a:p>
@@ -4958,8 +4987,8 @@
         </p:nvSpPr>
         <p:spPr bwMode="auto">
           <a:xfrm>
-            <a:off x="7741920" y="2301240"/>
-            <a:ext cx="7082155" cy="1503045"/>
+            <a:off x="9289415" y="2301240"/>
+            <a:ext cx="5534660" cy="1370330"/>
           </a:xfrm>
           <a:prstGeom prst="rect">
             <a:avLst/>
@@ -5093,31 +5122,12 @@
           <a:p>
             <a:pPr algn="ctr" eaLnBrk="1" hangingPunct="1"/>
             <a:r>
-              <a:rPr lang="en-GB" altLang="x-none" sz="2000" b="1">
+              <a:rPr lang="en-GB" altLang="x-none" sz="1800" b="1">
                 <a:solidFill>
                   <a:schemeClr val="tx1"/>
                 </a:solidFill>
               </a:rPr>
               <a:t>Technical Achievements</a:t>
-            </a:r>
-            <a:endParaRPr lang="en-GB" altLang="x-none" sz="1200">
-              <a:solidFill>
-                <a:schemeClr val="tx1"/>
-              </a:solidFill>
-            </a:endParaRPr>
-          </a:p>
-          <a:p>
-            <a:pPr marL="342900" indent="-342900" algn="l" eaLnBrk="1" hangingPunct="1">
-              <a:buFont typeface="Arial" panose="020B0604020202020204" pitchFamily="34" charset="0"/>
-              <a:buChar char="•"/>
-            </a:pPr>
-            <a:r>
-              <a:rPr lang="en-GB" altLang="x-none" sz="1800">
-                <a:solidFill>
-                  <a:schemeClr val="tx1"/>
-                </a:solidFill>
-              </a:rPr>
-              <a:t>All moving objects are animated using my own animation code</a:t>
             </a:r>
             <a:endParaRPr lang="en-GB" altLang="x-none" sz="1800">
               <a:solidFill>
@@ -5131,26 +5141,45 @@
               <a:buChar char="•"/>
             </a:pPr>
             <a:r>
-              <a:rPr lang="en-GB" altLang="x-none" sz="1800">
+              <a:rPr lang="en-GB" altLang="x-none" sz="1600">
                 <a:solidFill>
                   <a:schemeClr val="tx1"/>
                 </a:solidFill>
               </a:rPr>
-              <a:t>Works on  </a:t>
-            </a:r>
-            <a:endParaRPr lang="en-GB" altLang="x-none" sz="1800">
+              <a:t>All moving objects are animated using my own animation code.</a:t>
+            </a:r>
+            <a:endParaRPr lang="en-GB" altLang="x-none" sz="1600">
               <a:solidFill>
                 <a:schemeClr val="tx1"/>
               </a:solidFill>
             </a:endParaRPr>
           </a:p>
           <a:p>
+            <a:pPr marL="342900" indent="-342900" algn="l" eaLnBrk="1" hangingPunct="1">
+              <a:buFont typeface="Arial" panose="020B0604020202020204" pitchFamily="34" charset="0"/>
+              <a:buChar char="•"/>
+            </a:pPr>
+            <a:r>
+              <a:rPr lang="en-GB" altLang="x-none" sz="1600">
+                <a:solidFill>
+                  <a:schemeClr val="tx1"/>
+                </a:solidFill>
+              </a:rPr>
+              <a:t>Works on  </a:t>
+            </a:r>
+            <a:endParaRPr lang="en-GB" altLang="x-none" sz="1600">
+              <a:solidFill>
+                <a:schemeClr val="tx1"/>
+              </a:solidFill>
+            </a:endParaRPr>
+          </a:p>
+          <a:p>
             <a:pPr marL="342900" lvl="0" indent="-342900" algn="l" eaLnBrk="1" hangingPunct="1">
               <a:buFont typeface="Arial" panose="020B0604020202020204" pitchFamily="34" charset="0"/>
               <a:buChar char="•"/>
             </a:pPr>
             <a:r>
-              <a:rPr lang="en-GB" altLang="x-none" sz="1800">
+              <a:rPr lang="en-GB" altLang="x-none" sz="1600">
                 <a:solidFill>
                   <a:schemeClr val="tx1"/>
                 </a:solidFill>
@@ -5158,7 +5187,7 @@
               <a:t>Wide range of texture assets</a:t>
             </a:r>
             <a:r>
-              <a:rPr lang="en-US" altLang="en-GB" sz="1800">
+              <a:rPr lang="en-US" altLang="en-GB" sz="1600">
                 <a:solidFill>
                   <a:schemeClr val="tx1"/>
                 </a:solidFill>
@@ -5166,14 +5195,14 @@
               <a:t> &amp;</a:t>
             </a:r>
             <a:r>
-              <a:rPr lang="en-GB" altLang="x-none" sz="1800">
+              <a:rPr lang="en-GB" altLang="x-none" sz="1600">
                 <a:solidFill>
                   <a:schemeClr val="tx1"/>
                 </a:solidFill>
               </a:rPr>
               <a:t> sound effects employed.</a:t>
             </a:r>
-            <a:endParaRPr lang="en-GB" altLang="x-none" sz="1800">
+            <a:endParaRPr lang="en-GB" altLang="x-none" sz="1600">
               <a:solidFill>
                 <a:schemeClr val="tx1"/>
               </a:solidFill>
@@ -5183,16 +5212,590 @@
       </p:sp>
       <p:grpSp>
         <p:nvGrpSpPr>
-          <p:cNvPr id="58" name="Group 57"/>
+          <p:cNvPr id="4" name="Group 3"/>
           <p:cNvGrpSpPr/>
           <p:nvPr/>
         </p:nvGrpSpPr>
         <p:grpSpPr>
           <a:xfrm>
-            <a:off x="7722870" y="3978910"/>
-            <a:ext cx="7118350" cy="5194935"/>
-            <a:chOff x="12134" y="6266"/>
-            <a:chExt cx="11210" cy="7982"/>
+            <a:off x="9289415" y="8922385"/>
+            <a:ext cx="5510530" cy="1516380"/>
+            <a:chOff x="14629" y="13987"/>
+            <a:chExt cx="8768" cy="2452"/>
+          </a:xfrm>
+        </p:grpSpPr>
+        <p:sp>
+          <p:nvSpPr>
+            <p:cNvPr id="36" name="Rectangle 7"/>
+            <p:cNvSpPr>
+              <a:spLocks noChangeArrowheads="1"/>
+            </p:cNvSpPr>
+            <p:nvPr/>
+          </p:nvSpPr>
+          <p:spPr bwMode="auto">
+            <a:xfrm>
+              <a:off x="14629" y="13987"/>
+              <a:ext cx="8768" cy="2453"/>
+            </a:xfrm>
+            <a:prstGeom prst="rect">
+              <a:avLst/>
+            </a:prstGeom>
+            <a:solidFill>
+              <a:schemeClr val="bg1">
+                <a:alpha val="75000"/>
+              </a:schemeClr>
+            </a:solidFill>
+            <a:ln w="9525">
+              <a:solidFill>
+                <a:schemeClr val="tx1"/>
+              </a:solidFill>
+              <a:miter lim="800000"/>
+            </a:ln>
+          </p:spPr>
+          <p:txBody>
+            <a:bodyPr/>
+            <a:lstStyle>
+              <a:lvl1pPr eaLnBrk="0" hangingPunct="0">
+                <a:defRPr sz="2900">
+                  <a:solidFill>
+                    <a:schemeClr val="tx1"/>
+                  </a:solidFill>
+                  <a:latin typeface="Arial" panose="020B0604020202020204" pitchFamily="34" charset="0"/>
+                </a:defRPr>
+              </a:lvl1pPr>
+              <a:lvl2pPr marL="742950" indent="-285750" eaLnBrk="0" hangingPunct="0">
+                <a:defRPr sz="2900">
+                  <a:solidFill>
+                    <a:schemeClr val="tx1"/>
+                  </a:solidFill>
+                  <a:latin typeface="Arial" panose="020B0604020202020204" pitchFamily="34" charset="0"/>
+                </a:defRPr>
+              </a:lvl2pPr>
+              <a:lvl3pPr marL="1143000" indent="-228600" eaLnBrk="0" hangingPunct="0">
+                <a:defRPr sz="2900">
+                  <a:solidFill>
+                    <a:schemeClr val="tx1"/>
+                  </a:solidFill>
+                  <a:latin typeface="Arial" panose="020B0604020202020204" pitchFamily="34" charset="0"/>
+                </a:defRPr>
+              </a:lvl3pPr>
+              <a:lvl4pPr marL="1600200" indent="-228600" eaLnBrk="0" hangingPunct="0">
+                <a:defRPr sz="2900">
+                  <a:solidFill>
+                    <a:schemeClr val="tx1"/>
+                  </a:solidFill>
+                  <a:latin typeface="Arial" panose="020B0604020202020204" pitchFamily="34" charset="0"/>
+                </a:defRPr>
+              </a:lvl4pPr>
+              <a:lvl5pPr marL="2057400" indent="-228600" eaLnBrk="0" hangingPunct="0">
+                <a:defRPr sz="2900">
+                  <a:solidFill>
+                    <a:schemeClr val="tx1"/>
+                  </a:solidFill>
+                  <a:latin typeface="Arial" panose="020B0604020202020204" pitchFamily="34" charset="0"/>
+                </a:defRPr>
+              </a:lvl5pPr>
+              <a:lvl6pPr marL="2514600" indent="-228600" eaLnBrk="0" fontAlgn="base" hangingPunct="0">
+                <a:spcBef>
+                  <a:spcPct val="0"/>
+                </a:spcBef>
+                <a:spcAft>
+                  <a:spcPct val="0"/>
+                </a:spcAft>
+                <a:defRPr sz="2900">
+                  <a:solidFill>
+                    <a:schemeClr val="tx1"/>
+                  </a:solidFill>
+                  <a:latin typeface="Arial" panose="020B0604020202020204" pitchFamily="34" charset="0"/>
+                </a:defRPr>
+              </a:lvl6pPr>
+              <a:lvl7pPr marL="2971800" indent="-228600" eaLnBrk="0" fontAlgn="base" hangingPunct="0">
+                <a:spcBef>
+                  <a:spcPct val="0"/>
+                </a:spcBef>
+                <a:spcAft>
+                  <a:spcPct val="0"/>
+                </a:spcAft>
+                <a:defRPr sz="2900">
+                  <a:solidFill>
+                    <a:schemeClr val="tx1"/>
+                  </a:solidFill>
+                  <a:latin typeface="Arial" panose="020B0604020202020204" pitchFamily="34" charset="0"/>
+                </a:defRPr>
+              </a:lvl7pPr>
+              <a:lvl8pPr marL="3429000" indent="-228600" eaLnBrk="0" fontAlgn="base" hangingPunct="0">
+                <a:spcBef>
+                  <a:spcPct val="0"/>
+                </a:spcBef>
+                <a:spcAft>
+                  <a:spcPct val="0"/>
+                </a:spcAft>
+                <a:defRPr sz="2900">
+                  <a:solidFill>
+                    <a:schemeClr val="tx1"/>
+                  </a:solidFill>
+                  <a:latin typeface="Arial" panose="020B0604020202020204" pitchFamily="34" charset="0"/>
+                </a:defRPr>
+              </a:lvl8pPr>
+              <a:lvl9pPr marL="3886200" indent="-228600" eaLnBrk="0" fontAlgn="base" hangingPunct="0">
+                <a:spcBef>
+                  <a:spcPct val="0"/>
+                </a:spcBef>
+                <a:spcAft>
+                  <a:spcPct val="0"/>
+                </a:spcAft>
+                <a:defRPr sz="2900">
+                  <a:solidFill>
+                    <a:schemeClr val="tx1"/>
+                  </a:solidFill>
+                  <a:latin typeface="Arial" panose="020B0604020202020204" pitchFamily="34" charset="0"/>
+                </a:defRPr>
+              </a:lvl9pPr>
+            </a:lstStyle>
+            <a:p>
+              <a:pPr marL="457200" lvl="1" indent="0" algn="ctr" eaLnBrk="1" hangingPunct="1">
+                <a:buFont typeface="Arial" panose="020B0604020202020204" pitchFamily="34" charset="0"/>
+                <a:buNone/>
+              </a:pPr>
+              <a:r>
+                <a:rPr lang="en-US" altLang="en-GB" sz="2000" b="1">
+                  <a:sym typeface="+mn-ea"/>
+                </a:rPr>
+                <a:t>How?</a:t>
+              </a:r>
+              <a:r>
+                <a:rPr lang="en-US" altLang="en-GB" sz="1800">
+                  <a:sym typeface="+mn-ea"/>
+                </a:rPr>
+                <a:t> </a:t>
+              </a:r>
+              <a:endParaRPr lang="en-US" altLang="en-GB" sz="1800">
+                <a:sym typeface="+mn-ea"/>
+              </a:endParaRPr>
+            </a:p>
+            <a:p>
+              <a:pPr marL="285750" indent="-285750" algn="just" eaLnBrk="1" hangingPunct="1">
+                <a:buFont typeface="Arial" panose="020B0604020202020204" pitchFamily="34" charset="0"/>
+                <a:buChar char="•"/>
+              </a:pPr>
+              <a:r>
+                <a:rPr lang="en-US" altLang="en-GB" sz="1800">
+                  <a:sym typeface="+mn-ea"/>
+                </a:rPr>
+                <a:t>Built on</a:t>
+              </a:r>
+              <a:endParaRPr lang="en-GB" altLang="en-US" sz="1800">
+                <a:sym typeface="+mn-ea"/>
+              </a:endParaRPr>
+            </a:p>
+            <a:p>
+              <a:pPr marL="285750" indent="-285750" algn="just" eaLnBrk="1" hangingPunct="1">
+                <a:buFont typeface="Arial" panose="020B0604020202020204" pitchFamily="34" charset="0"/>
+                <a:buChar char="•"/>
+              </a:pPr>
+              <a:r>
+                <a:rPr lang="en-US" altLang="en-GB" sz="1800">
+                  <a:sym typeface="+mn-ea"/>
+                </a:rPr>
+                <a:t>Using</a:t>
+              </a:r>
+              <a:endParaRPr lang="en-GB" altLang="en-US" sz="1800">
+                <a:sym typeface="+mn-ea"/>
+              </a:endParaRPr>
+            </a:p>
+            <a:p>
+              <a:pPr marL="285750" indent="-285750" algn="just" eaLnBrk="1" hangingPunct="1">
+                <a:buFont typeface="Arial" panose="020B0604020202020204" pitchFamily="34" charset="0"/>
+                <a:buChar char="•"/>
+              </a:pPr>
+              <a:endParaRPr lang="en-GB" altLang="en-US" sz="1800">
+                <a:sym typeface="+mn-ea"/>
+              </a:endParaRPr>
+            </a:p>
+            <a:p>
+              <a:pPr marL="285750" indent="-285750" algn="just" eaLnBrk="1" hangingPunct="1">
+                <a:buFont typeface="Arial" panose="020B0604020202020204" pitchFamily="34" charset="0"/>
+                <a:buChar char="•"/>
+              </a:pPr>
+              <a:endParaRPr lang="en-US" altLang="x-none" sz="1800"/>
+            </a:p>
+          </p:txBody>
+        </p:sp>
+        <p:grpSp>
+          <p:nvGrpSpPr>
+            <p:cNvPr id="39" name="Group 38"/>
+            <p:cNvGrpSpPr/>
+            <p:nvPr/>
+          </p:nvGrpSpPr>
+          <p:grpSpPr>
+            <a:xfrm>
+              <a:off x="16402" y="14358"/>
+              <a:ext cx="3402" cy="1358"/>
+              <a:chOff x="13835" y="11864"/>
+              <a:chExt cx="3402" cy="1358"/>
+            </a:xfrm>
+          </p:grpSpPr>
+          <p:pic>
+            <p:nvPicPr>
+              <p:cNvPr id="37" name="Picture 36" descr="opengl-es-khronos-group-webgl-opengl-shading-language-others-08ee3a821bc684ef3ad7ee877a3ed2a8"/>
+              <p:cNvPicPr>
+                <a:picLocks noChangeAspect="1"/>
+              </p:cNvPicPr>
+              <p:nvPr/>
+            </p:nvPicPr>
+            <p:blipFill>
+              <a:blip r:embed="rId6"/>
+              <a:stretch>
+                <a:fillRect/>
+              </a:stretch>
+            </p:blipFill>
+            <p:spPr>
+              <a:xfrm>
+                <a:off x="16217" y="11864"/>
+                <a:ext cx="1020" cy="766"/>
+              </a:xfrm>
+              <a:prstGeom prst="rect">
+                <a:avLst/>
+              </a:prstGeom>
+            </p:spPr>
+          </p:pic>
+          <p:pic>
+            <p:nvPicPr>
+              <p:cNvPr id="38" name="Picture 37"/>
+              <p:cNvPicPr>
+                <a:picLocks noChangeAspect="1"/>
+              </p:cNvPicPr>
+              <p:nvPr/>
+            </p:nvPicPr>
+            <p:blipFill>
+              <a:blip r:embed="rId7"/>
+              <a:stretch>
+                <a:fillRect/>
+              </a:stretch>
+            </p:blipFill>
+            <p:spPr>
+              <a:xfrm>
+                <a:off x="14103" y="12049"/>
+                <a:ext cx="2000" cy="397"/>
+              </a:xfrm>
+              <a:prstGeom prst="rect">
+                <a:avLst/>
+              </a:prstGeom>
+            </p:spPr>
+          </p:pic>
+          <p:pic>
+            <p:nvPicPr>
+              <p:cNvPr id="24" name="Picture 23"/>
+              <p:cNvPicPr>
+                <a:picLocks noChangeAspect="1"/>
+              </p:cNvPicPr>
+              <p:nvPr/>
+            </p:nvPicPr>
+            <p:blipFill>
+              <a:blip r:embed="rId8"/>
+              <a:stretch>
+                <a:fillRect/>
+              </a:stretch>
+            </p:blipFill>
+            <p:spPr>
+              <a:xfrm>
+                <a:off x="14629" y="12530"/>
+                <a:ext cx="410" cy="693"/>
+              </a:xfrm>
+              <a:prstGeom prst="rect">
+                <a:avLst/>
+              </a:prstGeom>
+            </p:spPr>
+          </p:pic>
+          <p:pic>
+            <p:nvPicPr>
+              <p:cNvPr id="22" name="Picture 21"/>
+              <p:cNvPicPr>
+                <a:picLocks noChangeAspect="1"/>
+              </p:cNvPicPr>
+              <p:nvPr/>
+            </p:nvPicPr>
+            <p:blipFill>
+              <a:blip r:embed="rId9"/>
+              <a:stretch>
+                <a:fillRect/>
+              </a:stretch>
+            </p:blipFill>
+            <p:spPr>
+              <a:xfrm>
+                <a:off x="13835" y="12530"/>
+                <a:ext cx="607" cy="607"/>
+              </a:xfrm>
+              <a:prstGeom prst="rect">
+                <a:avLst/>
+              </a:prstGeom>
+            </p:spPr>
+          </p:pic>
+        </p:grpSp>
+      </p:grpSp>
+      <p:pic>
+        <p:nvPicPr>
+          <p:cNvPr id="19" name="Picture 18"/>
+          <p:cNvPicPr>
+            <a:picLocks noChangeAspect="1"/>
+          </p:cNvPicPr>
+          <p:nvPr/>
+        </p:nvPicPr>
+        <p:blipFill>
+          <a:blip r:embed="rId10"/>
+          <a:stretch>
+            <a:fillRect/>
+          </a:stretch>
+        </p:blipFill>
+        <p:spPr>
+          <a:xfrm>
+            <a:off x="10785475" y="3114675"/>
+            <a:ext cx="1423035" cy="269875"/>
+          </a:xfrm>
+          <a:prstGeom prst="rect">
+            <a:avLst/>
+          </a:prstGeom>
+        </p:spPr>
+      </p:pic>
+      <p:pic>
+        <p:nvPicPr>
+          <p:cNvPr id="20" name="Picture 19"/>
+          <p:cNvPicPr>
+            <a:picLocks noChangeAspect="1"/>
+          </p:cNvPicPr>
+          <p:nvPr/>
+        </p:nvPicPr>
+        <p:blipFill>
+          <a:blip r:embed="rId11"/>
+          <a:stretch>
+            <a:fillRect/>
+          </a:stretch>
+        </p:blipFill>
+        <p:spPr>
+          <a:xfrm>
+            <a:off x="12313285" y="3042285"/>
+            <a:ext cx="319405" cy="319405"/>
+          </a:xfrm>
+          <a:prstGeom prst="rect">
+            <a:avLst/>
+          </a:prstGeom>
+        </p:spPr>
+      </p:pic>
+      <p:sp>
+        <p:nvSpPr>
+          <p:cNvPr id="3" name="Rectangle 7"/>
+          <p:cNvSpPr>
+            <a:spLocks noChangeArrowheads="1"/>
+          </p:cNvSpPr>
+          <p:nvPr/>
+        </p:nvSpPr>
+        <p:spPr bwMode="auto">
+          <a:xfrm>
+            <a:off x="216535" y="6973570"/>
+            <a:ext cx="8976995" cy="1816100"/>
+          </a:xfrm>
+          <a:prstGeom prst="rect">
+            <a:avLst/>
+          </a:prstGeom>
+          <a:solidFill>
+            <a:schemeClr val="bg1">
+              <a:alpha val="75000"/>
+            </a:schemeClr>
+          </a:solidFill>
+          <a:ln w="9525">
+            <a:solidFill>
+              <a:schemeClr val="tx1"/>
+            </a:solidFill>
+            <a:miter lim="800000"/>
+          </a:ln>
+        </p:spPr>
+        <p:txBody>
+          <a:bodyPr/>
+          <a:lstStyle>
+            <a:lvl1pPr eaLnBrk="0" hangingPunct="0">
+              <a:defRPr sz="2900">
+                <a:solidFill>
+                  <a:schemeClr val="tx1"/>
+                </a:solidFill>
+                <a:latin typeface="Arial" panose="020B0604020202020204" pitchFamily="34" charset="0"/>
+              </a:defRPr>
+            </a:lvl1pPr>
+            <a:lvl2pPr marL="742950" indent="-285750" eaLnBrk="0" hangingPunct="0">
+              <a:defRPr sz="2900">
+                <a:solidFill>
+                  <a:schemeClr val="tx1"/>
+                </a:solidFill>
+                <a:latin typeface="Arial" panose="020B0604020202020204" pitchFamily="34" charset="0"/>
+              </a:defRPr>
+            </a:lvl2pPr>
+            <a:lvl3pPr marL="1143000" indent="-228600" eaLnBrk="0" hangingPunct="0">
+              <a:defRPr sz="2900">
+                <a:solidFill>
+                  <a:schemeClr val="tx1"/>
+                </a:solidFill>
+                <a:latin typeface="Arial" panose="020B0604020202020204" pitchFamily="34" charset="0"/>
+              </a:defRPr>
+            </a:lvl3pPr>
+            <a:lvl4pPr marL="1600200" indent="-228600" eaLnBrk="0" hangingPunct="0">
+              <a:defRPr sz="2900">
+                <a:solidFill>
+                  <a:schemeClr val="tx1"/>
+                </a:solidFill>
+                <a:latin typeface="Arial" panose="020B0604020202020204" pitchFamily="34" charset="0"/>
+              </a:defRPr>
+            </a:lvl4pPr>
+            <a:lvl5pPr marL="2057400" indent="-228600" eaLnBrk="0" hangingPunct="0">
+              <a:defRPr sz="2900">
+                <a:solidFill>
+                  <a:schemeClr val="tx1"/>
+                </a:solidFill>
+                <a:latin typeface="Arial" panose="020B0604020202020204" pitchFamily="34" charset="0"/>
+              </a:defRPr>
+            </a:lvl5pPr>
+            <a:lvl6pPr marL="2514600" indent="-228600" eaLnBrk="0" fontAlgn="base" hangingPunct="0">
+              <a:spcBef>
+                <a:spcPct val="0"/>
+              </a:spcBef>
+              <a:spcAft>
+                <a:spcPct val="0"/>
+              </a:spcAft>
+              <a:defRPr sz="2900">
+                <a:solidFill>
+                  <a:schemeClr val="tx1"/>
+                </a:solidFill>
+                <a:latin typeface="Arial" panose="020B0604020202020204" pitchFamily="34" charset="0"/>
+              </a:defRPr>
+            </a:lvl6pPr>
+            <a:lvl7pPr marL="2971800" indent="-228600" eaLnBrk="0" fontAlgn="base" hangingPunct="0">
+              <a:spcBef>
+                <a:spcPct val="0"/>
+              </a:spcBef>
+              <a:spcAft>
+                <a:spcPct val="0"/>
+              </a:spcAft>
+              <a:defRPr sz="2900">
+                <a:solidFill>
+                  <a:schemeClr val="tx1"/>
+                </a:solidFill>
+                <a:latin typeface="Arial" panose="020B0604020202020204" pitchFamily="34" charset="0"/>
+              </a:defRPr>
+            </a:lvl7pPr>
+            <a:lvl8pPr marL="3429000" indent="-228600" eaLnBrk="0" fontAlgn="base" hangingPunct="0">
+              <a:spcBef>
+                <a:spcPct val="0"/>
+              </a:spcBef>
+              <a:spcAft>
+                <a:spcPct val="0"/>
+              </a:spcAft>
+              <a:defRPr sz="2900">
+                <a:solidFill>
+                  <a:schemeClr val="tx1"/>
+                </a:solidFill>
+                <a:latin typeface="Arial" panose="020B0604020202020204" pitchFamily="34" charset="0"/>
+              </a:defRPr>
+            </a:lvl8pPr>
+            <a:lvl9pPr marL="3886200" indent="-228600" eaLnBrk="0" fontAlgn="base" hangingPunct="0">
+              <a:spcBef>
+                <a:spcPct val="0"/>
+              </a:spcBef>
+              <a:spcAft>
+                <a:spcPct val="0"/>
+              </a:spcAft>
+              <a:defRPr sz="2900">
+                <a:solidFill>
+                  <a:schemeClr val="tx1"/>
+                </a:solidFill>
+                <a:latin typeface="Arial" panose="020B0604020202020204" pitchFamily="34" charset="0"/>
+              </a:defRPr>
+            </a:lvl9pPr>
+          </a:lstStyle>
+          <a:p>
+            <a:pPr marL="457200" lvl="1" indent="0" algn="ctr" eaLnBrk="1" hangingPunct="1">
+              <a:buFont typeface="Arial" panose="020B0604020202020204" pitchFamily="34" charset="0"/>
+              <a:buNone/>
+            </a:pPr>
+            <a:r>
+              <a:rPr lang="en-GB" altLang="en-US" sz="1800" b="1">
+                <a:sym typeface="+mn-ea"/>
+              </a:rPr>
+              <a:t>Aims and Objectives</a:t>
+            </a:r>
+            <a:endParaRPr lang="en-GB" altLang="en-US" sz="1600">
+              <a:sym typeface="+mn-ea"/>
+            </a:endParaRPr>
+          </a:p>
+          <a:p>
+            <a:pPr marL="285750" indent="-285750" algn="just" eaLnBrk="1" hangingPunct="1">
+              <a:buFont typeface="Arial" panose="020B0604020202020204" pitchFamily="34" charset="0"/>
+              <a:buChar char="•"/>
+            </a:pPr>
+            <a:r>
+              <a:rPr lang="en-GB" altLang="en-US" sz="1600">
+                <a:sym typeface="+mn-ea"/>
+              </a:rPr>
+              <a:t>To create a fun and engaging experience.</a:t>
+            </a:r>
+            <a:endParaRPr lang="en-GB" altLang="en-US" sz="1600">
+              <a:sym typeface="+mn-ea"/>
+            </a:endParaRPr>
+          </a:p>
+          <a:p>
+            <a:pPr marL="742950" lvl="1" indent="-285750" algn="just" eaLnBrk="1" hangingPunct="1">
+              <a:buFont typeface="Arial" panose="020B0604020202020204" pitchFamily="34" charset="0"/>
+              <a:buChar char="•"/>
+            </a:pPr>
+            <a:r>
+              <a:rPr lang="en-GB" altLang="en-US" sz="1600">
+                <a:sym typeface="+mn-ea"/>
+              </a:rPr>
+              <a:t>By finishing ongoing work, having 3 working campaign levels with a coherent storyline and giving the player variety of content by having many different enemy agents, power-ups and dynamic interactive world features. </a:t>
+            </a:r>
+            <a:endParaRPr lang="en-US" altLang="en-GB" sz="1600">
+              <a:sym typeface="+mn-ea"/>
+            </a:endParaRPr>
+          </a:p>
+          <a:p>
+            <a:pPr marL="285750" indent="-285750" algn="just" eaLnBrk="1" hangingPunct="1">
+              <a:buFont typeface="Arial" panose="020B0604020202020204" pitchFamily="34" charset="0"/>
+              <a:buChar char="•"/>
+            </a:pPr>
+            <a:r>
+              <a:rPr lang="en-US" altLang="en-GB" sz="1600">
+                <a:sym typeface="+mn-ea"/>
+              </a:rPr>
+              <a:t>R</a:t>
+            </a:r>
+            <a:r>
+              <a:rPr lang="en-GB" altLang="en-US" sz="1600">
+                <a:sym typeface="+mn-ea"/>
+              </a:rPr>
+              <a:t>elease the game on the Android Google app store and itch.io or something similar on Windows.</a:t>
+            </a:r>
+            <a:endParaRPr lang="en-GB" altLang="en-US" sz="1600">
+              <a:sym typeface="+mn-ea"/>
+            </a:endParaRPr>
+          </a:p>
+          <a:p>
+            <a:pPr marL="285750" indent="-285750" algn="just" eaLnBrk="1" hangingPunct="1">
+              <a:buFont typeface="Arial" panose="020B0604020202020204" pitchFamily="34" charset="0"/>
+              <a:buChar char="•"/>
+            </a:pPr>
+            <a:endParaRPr lang="en-US" altLang="x-none" sz="1800"/>
+          </a:p>
+        </p:txBody>
+      </p:sp>
+      <p:grpSp>
+        <p:nvGrpSpPr>
+          <p:cNvPr id="6" name="Group 5"/>
+          <p:cNvGrpSpPr/>
+          <p:nvPr/>
+        </p:nvGrpSpPr>
+        <p:grpSpPr>
+          <a:xfrm>
+            <a:off x="9276715" y="3753485"/>
+            <a:ext cx="5549900" cy="5046980"/>
+            <a:chOff x="14609" y="5894"/>
+            <a:chExt cx="8740" cy="7625"/>
           </a:xfrm>
         </p:grpSpPr>
         <p:sp>
@@ -5205,8 +5808,8 @@
           </p:nvSpPr>
           <p:spPr bwMode="auto">
             <a:xfrm>
-              <a:off x="12134" y="6266"/>
-              <a:ext cx="11196" cy="7983"/>
+              <a:off x="14609" y="5894"/>
+              <a:ext cx="8740" cy="7625"/>
             </a:xfrm>
             <a:prstGeom prst="rect">
               <a:avLst/>
@@ -5326,344 +5929,31 @@
             <a:p>
               <a:pPr algn="ctr" eaLnBrk="1" hangingPunct="1"/>
               <a:r>
-                <a:rPr lang="en-US" altLang="en-GB" sz="2000"/>
+                <a:rPr lang="en-US" altLang="en-GB" sz="1800" b="1"/>
                 <a:t>Feature Diagram</a:t>
               </a:r>
-              <a:endParaRPr lang="en-US" altLang="en-GB" sz="1800"/>
+              <a:endParaRPr lang="en-US" altLang="en-GB" sz="1800" b="1"/>
             </a:p>
           </p:txBody>
         </p:sp>
         <p:pic>
           <p:nvPicPr>
-            <p:cNvPr id="51" name="Picture 50"/>
-            <p:cNvPicPr preferRelativeResize="0">
+            <p:cNvPr id="5" name="Picture 4" descr="lol (2)"/>
+            <p:cNvPicPr>
               <a:picLocks noChangeAspect="1"/>
             </p:cNvPicPr>
             <p:nvPr/>
           </p:nvPicPr>
           <p:blipFill>
-            <a:blip r:embed="rId6"/>
+            <a:blip r:embed="rId12"/>
             <a:stretch>
               <a:fillRect/>
             </a:stretch>
           </p:blipFill>
           <p:spPr>
             <a:xfrm>
-              <a:off x="12164" y="6833"/>
-              <a:ext cx="11181" cy="7310"/>
-            </a:xfrm>
-            <a:prstGeom prst="rect">
-              <a:avLst/>
-            </a:prstGeom>
-            <a:noFill/>
-            <a:ln>
-              <a:noFill/>
-            </a:ln>
-            <a:effectLst/>
-          </p:spPr>
-        </p:pic>
-      </p:grpSp>
-      <p:sp>
-        <p:nvSpPr>
-          <p:cNvPr id="36" name="Rectangle 7"/>
-          <p:cNvSpPr>
-            <a:spLocks noChangeArrowheads="1"/>
-          </p:cNvSpPr>
-          <p:nvPr/>
-        </p:nvSpPr>
-        <p:spPr bwMode="auto">
-          <a:xfrm>
-            <a:off x="7741920" y="9235440"/>
-            <a:ext cx="7082155" cy="1149350"/>
-          </a:xfrm>
-          <a:prstGeom prst="rect">
-            <a:avLst/>
-          </a:prstGeom>
-          <a:solidFill>
-            <a:schemeClr val="bg1">
-              <a:alpha val="75000"/>
-            </a:schemeClr>
-          </a:solidFill>
-          <a:ln w="9525">
-            <a:solidFill>
-              <a:schemeClr val="tx1"/>
-            </a:solidFill>
-            <a:miter lim="800000"/>
-          </a:ln>
-        </p:spPr>
-        <p:txBody>
-          <a:bodyPr/>
-          <a:lstStyle>
-            <a:lvl1pPr eaLnBrk="0" hangingPunct="0">
-              <a:defRPr sz="2900">
-                <a:solidFill>
-                  <a:schemeClr val="tx1"/>
-                </a:solidFill>
-                <a:latin typeface="Arial" panose="020B0604020202020204" pitchFamily="34" charset="0"/>
-              </a:defRPr>
-            </a:lvl1pPr>
-            <a:lvl2pPr marL="742950" indent="-285750" eaLnBrk="0" hangingPunct="0">
-              <a:defRPr sz="2900">
-                <a:solidFill>
-                  <a:schemeClr val="tx1"/>
-                </a:solidFill>
-                <a:latin typeface="Arial" panose="020B0604020202020204" pitchFamily="34" charset="0"/>
-              </a:defRPr>
-            </a:lvl2pPr>
-            <a:lvl3pPr marL="1143000" indent="-228600" eaLnBrk="0" hangingPunct="0">
-              <a:defRPr sz="2900">
-                <a:solidFill>
-                  <a:schemeClr val="tx1"/>
-                </a:solidFill>
-                <a:latin typeface="Arial" panose="020B0604020202020204" pitchFamily="34" charset="0"/>
-              </a:defRPr>
-            </a:lvl3pPr>
-            <a:lvl4pPr marL="1600200" indent="-228600" eaLnBrk="0" hangingPunct="0">
-              <a:defRPr sz="2900">
-                <a:solidFill>
-                  <a:schemeClr val="tx1"/>
-                </a:solidFill>
-                <a:latin typeface="Arial" panose="020B0604020202020204" pitchFamily="34" charset="0"/>
-              </a:defRPr>
-            </a:lvl4pPr>
-            <a:lvl5pPr marL="2057400" indent="-228600" eaLnBrk="0" hangingPunct="0">
-              <a:defRPr sz="2900">
-                <a:solidFill>
-                  <a:schemeClr val="tx1"/>
-                </a:solidFill>
-                <a:latin typeface="Arial" panose="020B0604020202020204" pitchFamily="34" charset="0"/>
-              </a:defRPr>
-            </a:lvl5pPr>
-            <a:lvl6pPr marL="2514600" indent="-228600" eaLnBrk="0" fontAlgn="base" hangingPunct="0">
-              <a:spcBef>
-                <a:spcPct val="0"/>
-              </a:spcBef>
-              <a:spcAft>
-                <a:spcPct val="0"/>
-              </a:spcAft>
-              <a:defRPr sz="2900">
-                <a:solidFill>
-                  <a:schemeClr val="tx1"/>
-                </a:solidFill>
-                <a:latin typeface="Arial" panose="020B0604020202020204" pitchFamily="34" charset="0"/>
-              </a:defRPr>
-            </a:lvl6pPr>
-            <a:lvl7pPr marL="2971800" indent="-228600" eaLnBrk="0" fontAlgn="base" hangingPunct="0">
-              <a:spcBef>
-                <a:spcPct val="0"/>
-              </a:spcBef>
-              <a:spcAft>
-                <a:spcPct val="0"/>
-              </a:spcAft>
-              <a:defRPr sz="2900">
-                <a:solidFill>
-                  <a:schemeClr val="tx1"/>
-                </a:solidFill>
-                <a:latin typeface="Arial" panose="020B0604020202020204" pitchFamily="34" charset="0"/>
-              </a:defRPr>
-            </a:lvl7pPr>
-            <a:lvl8pPr marL="3429000" indent="-228600" eaLnBrk="0" fontAlgn="base" hangingPunct="0">
-              <a:spcBef>
-                <a:spcPct val="0"/>
-              </a:spcBef>
-              <a:spcAft>
-                <a:spcPct val="0"/>
-              </a:spcAft>
-              <a:defRPr sz="2900">
-                <a:solidFill>
-                  <a:schemeClr val="tx1"/>
-                </a:solidFill>
-                <a:latin typeface="Arial" panose="020B0604020202020204" pitchFamily="34" charset="0"/>
-              </a:defRPr>
-            </a:lvl8pPr>
-            <a:lvl9pPr marL="3886200" indent="-228600" eaLnBrk="0" fontAlgn="base" hangingPunct="0">
-              <a:spcBef>
-                <a:spcPct val="0"/>
-              </a:spcBef>
-              <a:spcAft>
-                <a:spcPct val="0"/>
-              </a:spcAft>
-              <a:defRPr sz="2900">
-                <a:solidFill>
-                  <a:schemeClr val="tx1"/>
-                </a:solidFill>
-                <a:latin typeface="Arial" panose="020B0604020202020204" pitchFamily="34" charset="0"/>
-              </a:defRPr>
-            </a:lvl9pPr>
-          </a:lstStyle>
-          <a:p>
-            <a:pPr marL="457200" lvl="1" indent="0" algn="ctr" eaLnBrk="1" hangingPunct="1">
-              <a:buFont typeface="Arial" panose="020B0604020202020204" pitchFamily="34" charset="0"/>
-              <a:buNone/>
-            </a:pPr>
-            <a:r>
-              <a:rPr lang="en-US" altLang="en-GB" sz="2000" b="1">
-                <a:sym typeface="+mn-ea"/>
-              </a:rPr>
-              <a:t>How?</a:t>
-            </a:r>
-            <a:r>
-              <a:rPr lang="en-US" altLang="en-GB" sz="1800">
-                <a:sym typeface="+mn-ea"/>
-              </a:rPr>
-              <a:t> </a:t>
-            </a:r>
-            <a:endParaRPr lang="en-US" altLang="en-GB" sz="1800">
-              <a:sym typeface="+mn-ea"/>
-            </a:endParaRPr>
-          </a:p>
-          <a:p>
-            <a:pPr marL="285750" indent="-285750" algn="just" eaLnBrk="1" hangingPunct="1">
-              <a:buFont typeface="Arial" panose="020B0604020202020204" pitchFamily="34" charset="0"/>
-              <a:buChar char="•"/>
-            </a:pPr>
-            <a:r>
-              <a:rPr lang="en-US" altLang="en-GB" sz="1800">
-                <a:sym typeface="+mn-ea"/>
-              </a:rPr>
-              <a:t>Built on</a:t>
-            </a:r>
-            <a:endParaRPr lang="en-GB" altLang="en-US" sz="1800">
-              <a:sym typeface="+mn-ea"/>
-            </a:endParaRPr>
-          </a:p>
-          <a:p>
-            <a:pPr marL="285750" indent="-285750" algn="just" eaLnBrk="1" hangingPunct="1">
-              <a:buFont typeface="Arial" panose="020B0604020202020204" pitchFamily="34" charset="0"/>
-              <a:buChar char="•"/>
-            </a:pPr>
-            <a:r>
-              <a:rPr lang="en-US" altLang="en-GB" sz="1800">
-                <a:sym typeface="+mn-ea"/>
-              </a:rPr>
-              <a:t>Using</a:t>
-            </a:r>
-            <a:endParaRPr lang="en-GB" altLang="en-US" sz="1800">
-              <a:sym typeface="+mn-ea"/>
-            </a:endParaRPr>
-          </a:p>
-          <a:p>
-            <a:pPr marL="285750" indent="-285750" algn="just" eaLnBrk="1" hangingPunct="1">
-              <a:buFont typeface="Arial" panose="020B0604020202020204" pitchFamily="34" charset="0"/>
-              <a:buChar char="•"/>
-            </a:pPr>
-            <a:endParaRPr lang="en-GB" altLang="en-US" sz="1800">
-              <a:sym typeface="+mn-ea"/>
-            </a:endParaRPr>
-          </a:p>
-          <a:p>
-            <a:pPr marL="285750" indent="-285750" algn="just" eaLnBrk="1" hangingPunct="1">
-              <a:buFont typeface="Arial" panose="020B0604020202020204" pitchFamily="34" charset="0"/>
-              <a:buChar char="•"/>
-            </a:pPr>
-            <a:endParaRPr lang="en-US" altLang="x-none" sz="1800"/>
-          </a:p>
-        </p:txBody>
-      </p:sp>
-      <p:grpSp>
-        <p:nvGrpSpPr>
-          <p:cNvPr id="39" name="Group 38"/>
-          <p:cNvGrpSpPr/>
-          <p:nvPr/>
-        </p:nvGrpSpPr>
-        <p:grpSpPr>
-          <a:xfrm>
-            <a:off x="8836025" y="9405620"/>
-            <a:ext cx="2160270" cy="862330"/>
-            <a:chOff x="13835" y="11864"/>
-            <a:chExt cx="3402" cy="1358"/>
-          </a:xfrm>
-        </p:grpSpPr>
-        <p:pic>
-          <p:nvPicPr>
-            <p:cNvPr id="37" name="Picture 36" descr="opengl-es-khronos-group-webgl-opengl-shading-language-others-08ee3a821bc684ef3ad7ee877a3ed2a8"/>
-            <p:cNvPicPr>
-              <a:picLocks noChangeAspect="1"/>
-            </p:cNvPicPr>
-            <p:nvPr/>
-          </p:nvPicPr>
-          <p:blipFill>
-            <a:blip r:embed="rId7"/>
-            <a:stretch>
-              <a:fillRect/>
-            </a:stretch>
-          </p:blipFill>
-          <p:spPr>
-            <a:xfrm>
-              <a:off x="16217" y="11864"/>
-              <a:ext cx="1020" cy="766"/>
-            </a:xfrm>
-            <a:prstGeom prst="rect">
-              <a:avLst/>
-            </a:prstGeom>
-          </p:spPr>
-        </p:pic>
-        <p:pic>
-          <p:nvPicPr>
-            <p:cNvPr id="38" name="Picture 37"/>
-            <p:cNvPicPr>
-              <a:picLocks noChangeAspect="1"/>
-            </p:cNvPicPr>
-            <p:nvPr/>
-          </p:nvPicPr>
-          <p:blipFill>
-            <a:blip r:embed="rId8"/>
-            <a:stretch>
-              <a:fillRect/>
-            </a:stretch>
-          </p:blipFill>
-          <p:spPr>
-            <a:xfrm>
-              <a:off x="14103" y="12049"/>
-              <a:ext cx="2000" cy="397"/>
-            </a:xfrm>
-            <a:prstGeom prst="rect">
-              <a:avLst/>
-            </a:prstGeom>
-          </p:spPr>
-        </p:pic>
-        <p:pic>
-          <p:nvPicPr>
-            <p:cNvPr id="24" name="Picture 23"/>
-            <p:cNvPicPr>
-              <a:picLocks noChangeAspect="1"/>
-            </p:cNvPicPr>
-            <p:nvPr/>
-          </p:nvPicPr>
-          <p:blipFill>
-            <a:blip r:embed="rId9"/>
-            <a:stretch>
-              <a:fillRect/>
-            </a:stretch>
-          </p:blipFill>
-          <p:spPr>
-            <a:xfrm>
-              <a:off x="14629" y="12530"/>
-              <a:ext cx="410" cy="693"/>
-            </a:xfrm>
-            <a:prstGeom prst="rect">
-              <a:avLst/>
-            </a:prstGeom>
-          </p:spPr>
-        </p:pic>
-        <p:pic>
-          <p:nvPicPr>
-            <p:cNvPr id="22" name="Picture 21"/>
-            <p:cNvPicPr>
-              <a:picLocks noChangeAspect="1"/>
-            </p:cNvPicPr>
-            <p:nvPr/>
-          </p:nvPicPr>
-          <p:blipFill>
-            <a:blip r:embed="rId10"/>
-            <a:stretch>
-              <a:fillRect/>
-            </a:stretch>
-          </p:blipFill>
-          <p:spPr>
-            <a:xfrm>
-              <a:off x="13835" y="12530"/>
-              <a:ext cx="607" cy="607"/>
+              <a:off x="14639" y="6343"/>
+              <a:ext cx="8668" cy="7025"/>
             </a:xfrm>
             <a:prstGeom prst="rect">
               <a:avLst/>
@@ -5671,54 +5961,6 @@
           </p:spPr>
         </p:pic>
       </p:grpSp>
-      <p:pic>
-        <p:nvPicPr>
-          <p:cNvPr id="19" name="Picture 18"/>
-          <p:cNvPicPr>
-            <a:picLocks noChangeAspect="1"/>
-          </p:cNvPicPr>
-          <p:nvPr/>
-        </p:nvPicPr>
-        <p:blipFill>
-          <a:blip r:embed="rId11"/>
-          <a:stretch>
-            <a:fillRect/>
-          </a:stretch>
-        </p:blipFill>
-        <p:spPr>
-          <a:xfrm>
-            <a:off x="9217025" y="2927985"/>
-            <a:ext cx="1423035" cy="269875"/>
-          </a:xfrm>
-          <a:prstGeom prst="rect">
-            <a:avLst/>
-          </a:prstGeom>
-        </p:spPr>
-      </p:pic>
-      <p:pic>
-        <p:nvPicPr>
-          <p:cNvPr id="20" name="Picture 19"/>
-          <p:cNvPicPr>
-            <a:picLocks noChangeAspect="1"/>
-          </p:cNvPicPr>
-          <p:nvPr/>
-        </p:nvPicPr>
-        <p:blipFill>
-          <a:blip r:embed="rId12"/>
-          <a:stretch>
-            <a:fillRect/>
-          </a:stretch>
-        </p:blipFill>
-        <p:spPr>
-          <a:xfrm>
-            <a:off x="10676890" y="2903220"/>
-            <a:ext cx="319405" cy="319405"/>
-          </a:xfrm>
-          <a:prstGeom prst="rect">
-            <a:avLst/>
-          </a:prstGeom>
-        </p:spPr>
-      </p:pic>
     </p:spTree>
   </p:cSld>
   <p:clrMapOvr>

</xml_diff>